<commit_message>
a few more changes
</commit_message>
<xml_diff>
--- a/BerkeleyClass/CS290Spring2013/Lectures/entropy_talk.pptx
+++ b/BerkeleyClass/CS290Spring2013/Lectures/entropy_talk.pptx
@@ -12581,7 +12581,7 @@
             <a:pPr lvl="1"/>
             <a:r>
               <a:rPr lang="en-US" sz="2000" dirty="0"/>
-              <a:t>Thermodynamics</a:t>
+              <a:t>Thermodynamics (Johnson noise, …)</a:t>
             </a:r>
           </a:p>
           <a:p>
@@ -13279,7 +13279,7 @@
             </a:pPr>
             <a:r>
               <a:rPr lang="en-US" sz="2000" dirty="0"/>
-              <a:t>2016:  People who don’t have a good probability model for their noise sources, don’t have entropy</a:t>
+              <a:t>2016:  People who don’t have a good probability model for their noise sources, don’t have entropy.</a:t>
             </a:r>
           </a:p>
           <a:p>
@@ -13331,7 +13331,7 @@
             </a:pPr>
             <a:r>
               <a:rPr lang="en-US" sz="2000" dirty="0"/>
-              <a:t>2018: No, seriously, you have to justify entropy estimators even for a software noise source, so you need source probability models</a:t>
+              <a:t>2018: No, seriously, you have to justify entropy estimators even for a software noise source, so you need source probability models.</a:t>
             </a:r>
           </a:p>
           <a:p>
@@ -13507,7 +13507,7 @@
             </a:pPr>
             <a:r>
               <a:rPr lang="en-US" sz="2000" dirty="0"/>
-              <a:t>High quality and relatively easy (i.e.- possible) to analyze</a:t>
+              <a:t>High quality and relatively easy (i.e.- possible) to analyze.</a:t>
             </a:r>
           </a:p>
           <a:p>
@@ -13752,8 +13752,8 @@
           </a:p>
         </p:txBody>
       </p:sp>
-      <mc:AlternateContent xmlns:mc="http://schemas.openxmlformats.org/markup-compatibility/2006" xmlns:a14="http://schemas.microsoft.com/office/drawing/2010/main">
-        <mc:Choice Requires="a14">
+      <mc:AlternateContent xmlns:mc="http://schemas.openxmlformats.org/markup-compatibility/2006">
+        <mc:Choice xmlns:a14="http://schemas.microsoft.com/office/drawing/2010/main" Requires="a14">
           <p:sp>
             <p:nvSpPr>
               <p:cNvPr id="23557" name="Rectangle 3"/>
@@ -14018,7 +14018,7 @@
                 </a14:m>
                 <a:r>
                   <a:rPr lang="en-US" sz="2000" dirty="0"/>
-                  <a:t>‘s (usually one byte per sample as specified by NIST 800-90B) are the noise source for constructing a seed</a:t>
+                  <a:t>‘s (usually one byte per sample as specified by NIST 800-90B) are the noise source for constructing a seed.</a:t>
                 </a:r>
               </a:p>
               <a:p>
@@ -14089,7 +14089,7 @@
             </p:txBody>
           </p:sp>
         </mc:Choice>
-        <mc:Fallback xmlns="">
+        <mc:Fallback>
           <p:sp>
             <p:nvSpPr>
               <p:cNvPr id="23557" name="Rectangle 3"/>
@@ -15536,7 +15536,7 @@
             </a:pPr>
             <a:r>
               <a:rPr lang="en-US" sz="2000" dirty="0"/>
-              <a:t>I built a (basically) fully NIST compliant RNG in my existing open-source crypto project (which I use for teaching) with justified HW and SW entropy in about three weekends</a:t>
+              <a:t>I built a (basically) fully NIST compliant RNG in my existing open-source crypto project (which I use for teaching) with justified HW and SW entropy in about three weekends.</a:t>
             </a:r>
           </a:p>
           <a:p>
@@ -15547,7 +15547,7 @@
             </a:pPr>
             <a:r>
               <a:rPr lang="en-US" sz="2000" dirty="0"/>
-              <a:t>Used standard NIST 800-90B certified SHA-256 hash-df based DBRG</a:t>
+              <a:t>Used standard NIST 800-90A certified SHA-256 hash-df based DBRG.</a:t>
             </a:r>
           </a:p>
           <a:p>
@@ -15590,7 +15590,7 @@
             </a:r>
             <a:r>
               <a:rPr lang="en-US" sz="2000" dirty="0"/>
-              <a:t>)</a:t>
+              <a:t>).</a:t>
             </a:r>
           </a:p>
           <a:p>
@@ -16563,7 +16563,7 @@
                 <a:latin typeface="Arial" panose="020B0604020202020204" pitchFamily="34" charset="0"/>
                 <a:cs typeface="Arial" panose="020B0604020202020204" pitchFamily="34" charset="0"/>
               </a:rPr>
-              <a:t>For each 8-bit (as required by NIST) noise sample, the estimated entropy varied from 1 bit/sample to over 4 bits/sample over the jitter blocks</a:t>
+              <a:t>For each 8-bit (as required by NIST) noise sample, the estimated entropy varied from 1.8 bit/sample to over 6 bits/sample (!) over the jitter blocks</a:t>
             </a:r>
           </a:p>
           <a:p>
@@ -16577,21 +16577,7 @@
                 <a:latin typeface="Arial" panose="020B0604020202020204" pitchFamily="34" charset="0"/>
                 <a:cs typeface="Arial" panose="020B0604020202020204" pitchFamily="34" charset="0"/>
               </a:rPr>
-              <a:t>Interrupt samples are estimated (in a way that does not comply with 800-90B) at tenths of bits per sample</a:t>
-            </a:r>
-          </a:p>
-          <a:p>
-            <a:pPr>
-              <a:lnSpc>
-                <a:spcPct val="90000"/>
-              </a:lnSpc>
-            </a:pPr>
-            <a:r>
-              <a:rPr lang="en-US" sz="2000" dirty="0">
-                <a:latin typeface="Arial" panose="020B0604020202020204" pitchFamily="34" charset="0"/>
-                <a:cs typeface="Arial" panose="020B0604020202020204" pitchFamily="34" charset="0"/>
-              </a:rPr>
-              <a:t>Jitter gives amazingly high rate independent of other activity (This is why Linux and Apple adopted it especially for boot entropy)</a:t>
+              <a:t>Jitter gives amazingly high rate independent of other activity (This is why Linux and Apple adopted it especially for boot entropy).  By contrast, interrupt arrival samples are estimated (in a way that does not comply with 800-90B) at tenths of bits per sample</a:t>
             </a:r>
           </a:p>
           <a:p>
@@ -19163,7 +19149,21 @@
                 <a:latin typeface="Arial" panose="020B0604020202020204" pitchFamily="34" charset="0"/>
                 <a:cs typeface="Arial" panose="020B0604020202020204" pitchFamily="34" charset="0"/>
               </a:rPr>
-              <a:t>The level of proof in this presentation is informal or “heuristic” (which is all NIST demands for now) but NIST will increase level of rigor required.  However, these arguments can be developed to justify a full stochastic model NSA would be proud of.</a:t>
+              <a:t>The level of proof in this presentation is informal or “heuristic” (which is all NIST demands for now).</a:t>
+            </a:r>
+          </a:p>
+          <a:p>
+            <a:pPr>
+              <a:lnSpc>
+                <a:spcPct val="90000"/>
+              </a:lnSpc>
+            </a:pPr>
+            <a:r>
+              <a:rPr lang="en-US" sz="2000" dirty="0">
+                <a:latin typeface="Arial" panose="020B0604020202020204" pitchFamily="34" charset="0"/>
+                <a:cs typeface="Arial" panose="020B0604020202020204" pitchFamily="34" charset="0"/>
+              </a:rPr>
+              <a:t>NIST will increase level of rigor required.  However, these arguments can be developed to justify a full stochastic model NSA would be proud of.</a:t>
             </a:r>
           </a:p>
           <a:p>
@@ -19610,7 +19610,7 @@
         <p:spPr>
           <a:xfrm>
             <a:off x="338014" y="1828800"/>
-            <a:ext cx="8348786" cy="4419600"/>
+            <a:ext cx="8348786" cy="4770537"/>
           </a:xfrm>
           <a:prstGeom prst="rect">
             <a:avLst/>
@@ -19658,8 +19658,22 @@
                 <a:latin typeface="+mn-lt"/>
                 <a:cs typeface="Calibri" panose="020F0502020204030204" pitchFamily="34" charset="0"/>
               </a:rPr>
-              <a:t>Entropy Subsystem including characterized noise source, health tests, entropy conditioning.  This is the critical component which prevents adversaries from guessing keys.  The output of this system is a seed containing enough “entropy” (more later) to generate keys</a:t>
-            </a:r>
+              <a:t>Entropy Subsystem including characterized noise source, health </a:t>
+            </a:r>
+            <a:r>
+              <a:rPr lang="en-US" sz="2000" dirty="0">
+                <a:latin typeface="Arial" panose="020B0604020202020204" pitchFamily="34" charset="0"/>
+                <a:cs typeface="Arial" panose="020B0604020202020204" pitchFamily="34" charset="0"/>
+              </a:rPr>
+              <a:t>tests, entropy conditioning.  This is the critical component which prevents adversaries from guessing keys.  The output of this system is a seed containing enough “entropy” (more later) to generate keys. The entropy subsystem (the hard part) is specified in NIST 800-90B.  This is the hard part.</a:t>
+            </a:r>
+          </a:p>
+          <a:p>
+            <a:pPr lvl="1"/>
+            <a:endParaRPr lang="en-US" sz="2000" dirty="0">
+              <a:latin typeface="+mn-lt"/>
+              <a:cs typeface="Calibri" panose="020F0502020204030204" pitchFamily="34" charset="0"/>
+            </a:endParaRPr>
           </a:p>
           <a:p>
             <a:pPr marL="800100" lvl="1" indent="-342900">
@@ -19671,20 +19685,7 @@
                 <a:latin typeface="+mn-lt"/>
                 <a:cs typeface="Calibri" panose="020F0502020204030204" pitchFamily="34" charset="0"/>
               </a:rPr>
-              <a:t>A deterministic random number generator (DRNG).  This takes a seed and safely produces a long sequence of cryptographically secure random numbers.  This is specified in NIST 800-90A</a:t>
-            </a:r>
-          </a:p>
-          <a:p>
-            <a:pPr marL="800100" lvl="1" indent="-342900">
-              <a:buFont typeface="Arial" panose="020B0604020202020204" pitchFamily="34" charset="0"/>
-              <a:buChar char="•"/>
-            </a:pPr>
-            <a:r>
-              <a:rPr lang="en-US" sz="2000" dirty="0">
-                <a:latin typeface="+mn-lt"/>
-                <a:cs typeface="Calibri" panose="020F0502020204030204" pitchFamily="34" charset="0"/>
-              </a:rPr>
-              <a:t>The entropy subsystem (the hard part) is specified in NIST 800-90B.  This is the hard part.</a:t>
+              <a:t>A deterministic random number generator (DRNG).  This takes a seed and safely produces a long sequence of cryptographically secure random numbers.  This is specified in NIST 800-90A.  This is the easy part.</a:t>
             </a:r>
           </a:p>
           <a:p>
@@ -20598,8 +20599,8 @@
           </a:p>
         </p:txBody>
       </p:sp>
-      <mc:AlternateContent xmlns:mc="http://schemas.openxmlformats.org/markup-compatibility/2006" xmlns:a14="http://schemas.microsoft.com/office/drawing/2010/main">
-        <mc:Choice Requires="a14">
+      <mc:AlternateContent xmlns:mc="http://schemas.openxmlformats.org/markup-compatibility/2006">
+        <mc:Choice xmlns:a14="http://schemas.microsoft.com/office/drawing/2010/main" Requires="a14">
           <p:sp>
             <p:nvSpPr>
               <p:cNvPr id="24581" name="Rectangle 3"/>
@@ -20627,7 +20628,7 @@
                 </a:pPr>
                 <a:r>
                   <a:rPr lang="en-US" sz="2000" dirty="0"/>
-                  <a:t>Entropy is a measure of uncertainty or equivocation; It comes from thermal physics.</a:t>
+                  <a:t>Entropy is a measure of uncertainty or equivocation. It comes from thermal physics.</a:t>
                 </a:r>
               </a:p>
               <a:p>
@@ -20920,7 +20921,7 @@
             </p:txBody>
           </p:sp>
         </mc:Choice>
-        <mc:Fallback xmlns="">
+        <mc:Fallback>
           <p:sp>
             <p:nvSpPr>
               <p:cNvPr id="24581" name="Rectangle 3"/>
@@ -21045,8 +21046,8 @@
           </a:p>
         </p:txBody>
       </p:sp>
-      <mc:AlternateContent xmlns:mc="http://schemas.openxmlformats.org/markup-compatibility/2006" xmlns:a14="http://schemas.microsoft.com/office/drawing/2010/main">
-        <mc:Choice Requires="a14">
+      <mc:AlternateContent xmlns:mc="http://schemas.openxmlformats.org/markup-compatibility/2006">
+        <mc:Choice xmlns:a14="http://schemas.microsoft.com/office/drawing/2010/main" Requires="a14">
           <p:sp>
             <p:nvSpPr>
               <p:cNvPr id="24581" name="Rectangle 3"/>
@@ -21581,7 +21582,7 @@
                 </a:pPr>
                 <a:r>
                   <a:rPr lang="en-US" sz="2000" dirty="0"/>
-                  <a:t>For a probability distribution to be useful, is should be </a:t>
+                  <a:t>For a probability distribution to be useful, it should be </a:t>
                 </a:r>
                 <a:r>
                   <a:rPr lang="en-US" sz="2000" i="1" dirty="0">
@@ -21593,7 +21594,7 @@
                 </a:r>
                 <a:r>
                   <a:rPr lang="en-US" sz="2000" dirty="0"/>
-                  <a:t>, that is every time you perform an experiment, the probability distribution should be the same.  This does </a:t>
+                  <a:t>, that is, every time you perform an experiment, the probability distribution should be the same.  This does </a:t>
                 </a:r>
                 <a:r>
                   <a:rPr lang="en-US" sz="2000" i="1" dirty="0"/>
@@ -21893,7 +21894,7 @@
             </p:txBody>
           </p:sp>
         </mc:Choice>
-        <mc:Fallback xmlns="">
+        <mc:Fallback>
           <p:sp>
             <p:nvSpPr>
               <p:cNvPr id="24581" name="Rectangle 3"/>
@@ -21912,7 +21913,7 @@
               <a:blipFill>
                 <a:blip r:embed="rId3"/>
                 <a:stretch>
-                  <a:fillRect l="-614" t="-1319" r="-461"/>
+                  <a:fillRect l="-614" t="-1319"/>
                 </a:stretch>
               </a:blipFill>
             </p:spPr>

</xml_diff>

<commit_message>
added a few things
</commit_message>
<xml_diff>
--- a/BerkeleyClass/CS290Spring2013/Lectures/entropy_talk.pptx
+++ b/BerkeleyClass/CS290Spring2013/Lectures/entropy_talk.pptx
@@ -12725,7 +12725,7 @@
         </p:blipFill>
         <p:spPr bwMode="auto">
           <a:xfrm>
-            <a:off x="5397140" y="3886200"/>
+            <a:off x="5397140" y="3581400"/>
             <a:ext cx="3739932" cy="2667000"/>
           </a:xfrm>
           <a:prstGeom prst="rect">
@@ -12808,7 +12808,7 @@
         </p:nvSpPr>
         <p:spPr>
           <a:xfrm>
-            <a:off x="304800" y="1143000"/>
+            <a:off x="304800" y="990600"/>
             <a:ext cx="8473440" cy="5181600"/>
           </a:xfrm>
         </p:spPr>
@@ -12836,7 +12836,7 @@
             </a:r>
             <a:r>
               <a:rPr lang="en-US" sz="2000" dirty="0"/>
-              <a:t> is bad. Why? Don’t know distribution, also entropy starvation, non-stationarity. </a:t>
+              <a:t> is bad. Why? Don’t know distribution, also entropy starvation, non-stationarity. Vulnerable to side channels. </a:t>
             </a:r>
             <a:r>
               <a:rPr lang="en-US" sz="2000" dirty="0">
@@ -12848,7 +12848,7 @@
             </a:r>
             <a:r>
               <a:rPr lang="en-US" sz="2000" dirty="0"/>
-              <a:t> is good but new.)</a:t>
+              <a:t> is new and evidently does not have these drawbacks.)</a:t>
             </a:r>
           </a:p>
           <a:p>
@@ -13119,7 +13119,7 @@
         </p:blipFill>
         <p:spPr bwMode="auto">
           <a:xfrm>
-            <a:off x="4191000" y="3276600"/>
+            <a:off x="4114800" y="3048000"/>
             <a:ext cx="4876800" cy="3048000"/>
           </a:xfrm>
           <a:prstGeom prst="rect">
@@ -13137,6 +13137,44 @@
           </a:extLst>
         </p:spPr>
       </p:pic>
+      <p:sp>
+        <p:nvSpPr>
+          <p:cNvPr id="2" name="TextBox 1">
+            <a:extLst>
+              <a:ext uri="{FF2B5EF4-FFF2-40B4-BE49-F238E27FC236}">
+                <a16:creationId xmlns:a16="http://schemas.microsoft.com/office/drawing/2014/main" id="{8926CA5D-2F0F-2241-B1EF-B54C131F2C9A}"/>
+              </a:ext>
+            </a:extLst>
+          </p:cNvPr>
+          <p:cNvSpPr txBox="1"/>
+          <p:nvPr/>
+        </p:nvSpPr>
+        <p:spPr>
+          <a:xfrm>
+            <a:off x="4541520" y="6096000"/>
+            <a:ext cx="2468880" cy="307777"/>
+          </a:xfrm>
+          <a:prstGeom prst="rect">
+            <a:avLst/>
+          </a:prstGeom>
+          <a:noFill/>
+        </p:spPr>
+        <p:txBody>
+          <a:bodyPr wrap="square" rtlCol="0">
+            <a:spAutoFit/>
+          </a:bodyPr>
+          <a:lstStyle/>
+          <a:p>
+            <a:r>
+              <a:rPr lang="en-US" sz="1400" dirty="0">
+                <a:latin typeface="Arial" panose="020B0604020202020204" pitchFamily="34" charset="0"/>
+                <a:cs typeface="Arial" panose="020B0604020202020204" pitchFamily="34" charset="0"/>
+              </a:rPr>
+              <a:t>Jitter entropy from Mueller</a:t>
+            </a:r>
+          </a:p>
+        </p:txBody>
+      </p:sp>
     </p:spTree>
     <p:extLst>
       <p:ext uri="{BB962C8B-B14F-4D97-AF65-F5344CB8AC3E}">
@@ -13739,8 +13777,8 @@
           </a:p>
         </p:txBody>
       </p:sp>
-      <mc:AlternateContent xmlns:mc="http://schemas.openxmlformats.org/markup-compatibility/2006">
-        <mc:Choice xmlns:a14="http://schemas.microsoft.com/office/drawing/2010/main" Requires="a14">
+      <mc:AlternateContent xmlns:mc="http://schemas.openxmlformats.org/markup-compatibility/2006" xmlns:a14="http://schemas.microsoft.com/office/drawing/2010/main">
+        <mc:Choice Requires="a14">
           <p:sp>
             <p:nvSpPr>
               <p:cNvPr id="23557" name="Rectangle 3"/>
@@ -14083,7 +14121,7 @@
             </p:txBody>
           </p:sp>
         </mc:Choice>
-        <mc:Fallback>
+        <mc:Fallback xmlns="">
           <p:sp>
             <p:nvSpPr>
               <p:cNvPr id="23557" name="Rectangle 3"/>
@@ -14476,36 +14514,66 @@
           <a:bodyPr/>
           <a:lstStyle/>
           <a:p>
+            <a:pPr>
+              <a:spcBef>
+                <a:spcPts val="0"/>
+              </a:spcBef>
+            </a:pPr>
             <a:r>
               <a:rPr lang="en-US" sz="2000" dirty="0"/>
               <a:t>CPU frequency scaling depending on the work-load.</a:t>
             </a:r>
           </a:p>
           <a:p>
+            <a:pPr>
+              <a:spcBef>
+                <a:spcPts val="0"/>
+              </a:spcBef>
+            </a:pPr>
             <a:r>
               <a:rPr lang="en-US" sz="2000" dirty="0"/>
               <a:t>Branch prediction units</a:t>
             </a:r>
           </a:p>
           <a:p>
+            <a:pPr>
+              <a:spcBef>
+                <a:spcPts val="0"/>
+              </a:spcBef>
+            </a:pPr>
             <a:r>
               <a:rPr lang="en-US" sz="2000" dirty="0"/>
               <a:t>TLB hits and misses </a:t>
             </a:r>
           </a:p>
           <a:p>
+            <a:pPr>
+              <a:spcBef>
+                <a:spcPts val="0"/>
+              </a:spcBef>
+            </a:pPr>
             <a:r>
               <a:rPr lang="en-US" sz="2000" dirty="0"/>
               <a:t>Kernel locks</a:t>
             </a:r>
           </a:p>
           <a:p>
+            <a:pPr>
+              <a:spcBef>
+                <a:spcPts val="0"/>
+              </a:spcBef>
+            </a:pPr>
             <a:r>
               <a:rPr lang="en-US" sz="2000" dirty="0"/>
               <a:t>Moving processes from one CPU to another</a:t>
             </a:r>
           </a:p>
           <a:p>
+            <a:pPr>
+              <a:spcBef>
+                <a:spcPts val="0"/>
+              </a:spcBef>
+            </a:pPr>
             <a:r>
               <a:rPr lang="en-US" sz="2000" dirty="0"/>
               <a:t>Hardware interrupts can occur regardless what the operating system was doing in the meanwhile.  [</a:t>
@@ -14520,22 +14588,56 @@
             </a:r>
           </a:p>
           <a:p>
+            <a:pPr>
+              <a:spcBef>
+                <a:spcPts val="0"/>
+              </a:spcBef>
+            </a:pPr>
             <a:r>
               <a:rPr lang="en-US" sz="2000" dirty="0"/>
               <a:t>Large memory segments whose access times vary due to the physical distance from the CPU. </a:t>
             </a:r>
           </a:p>
           <a:p>
+            <a:pPr marL="0" indent="0">
+              <a:spcBef>
+                <a:spcPts val="0"/>
+              </a:spcBef>
+              <a:buNone/>
+            </a:pPr>
+            <a:endParaRPr lang="en-US" sz="2000" dirty="0"/>
+          </a:p>
+          <a:p>
+            <a:pPr>
+              <a:spcBef>
+                <a:spcPts val="0"/>
+              </a:spcBef>
+            </a:pPr>
             <a:r>
               <a:rPr lang="en-US" sz="2000" dirty="0"/>
               <a:t>Aren’t these variations predictable?</a:t>
             </a:r>
           </a:p>
           <a:p>
-            <a:pPr lvl="1"/>
+            <a:pPr lvl="1">
+              <a:spcBef>
+                <a:spcPts val="0"/>
+              </a:spcBef>
+            </a:pPr>
             <a:r>
               <a:rPr lang="en-US" sz="2000" dirty="0"/>
-              <a:t>Amazingly, no!</a:t>
+              <a:t>Amazingly, no </a:t>
+            </a:r>
+          </a:p>
+          <a:p>
+            <a:pPr lvl="1">
+              <a:spcBef>
+                <a:spcPts val="0"/>
+              </a:spcBef>
+            </a:pPr>
+            <a:r>
+              <a:rPr lang="en-US" sz="2000" dirty="0"/>
+              <a:t>An adversary outside the kernel basically can’t affect them.</a:t>
             </a:r>
           </a:p>
           <a:p>
@@ -14573,7 +14675,7 @@
               </a:pPr>
               <a:t>18</a:t>
             </a:fld>
-            <a:endParaRPr lang="en-US"/>
+            <a:endParaRPr lang="en-US" dirty="0"/>
           </a:p>
         </p:txBody>
       </p:sp>
@@ -14682,8 +14784,8 @@
         </p:nvSpPr>
         <p:spPr>
           <a:xfrm>
-            <a:off x="152400" y="1295400"/>
-            <a:ext cx="8763000" cy="4648200"/>
+            <a:off x="76200" y="1295400"/>
+            <a:ext cx="8991600" cy="4648200"/>
           </a:xfrm>
         </p:spPr>
         <p:txBody>
@@ -14730,7 +14832,7 @@
             </a:pPr>
             <a:r>
               <a:rPr lang="en-US" sz="1800" dirty="0"/>
-              <a:t>Some sources of variation derived from physical phase jitter where there are existing models.  Like hardware in this respect.  </a:t>
+              <a:t>Some sources of variation derived from physical phase jitter (HW).</a:t>
             </a:r>
           </a:p>
           <a:p>
@@ -14741,7 +14843,7 @@
             </a:pPr>
             <a:r>
               <a:rPr lang="en-US" sz="1800" dirty="0"/>
-              <a:t>Easy to pick good, short blocks to measure on any CPU, each CPU varies only slightly in measurable entropy even as architectures change.</a:t>
+              <a:t>Easy to pick good, short blocks to measure on any CPU even as architectures change.</a:t>
             </a:r>
           </a:p>
           <a:p>
@@ -14752,7 +14854,18 @@
             </a:pPr>
             <a:r>
               <a:rPr lang="en-US" sz="1800" dirty="0"/>
-              <a:t>All the models are stationary.  You can validate stationarity with chi squared tests.</a:t>
+              <a:t>You can validate stationarity with chi squared tests.</a:t>
+            </a:r>
+          </a:p>
+          <a:p>
+            <a:pPr lvl="2">
+              <a:spcBef>
+                <a:spcPts val="0"/>
+              </a:spcBef>
+            </a:pPr>
+            <a:r>
+              <a:rPr lang="en-US" sz="1800" dirty="0"/>
+              <a:t>Important for “boot entropy,” where critical machine keys are derived.</a:t>
             </a:r>
           </a:p>
           <a:p>
@@ -14763,29 +14876,7 @@
             </a:pPr>
             <a:r>
               <a:rPr lang="en-US" sz="1800" dirty="0"/>
-              <a:t>Basically, doesn’t depend on activity</a:t>
-            </a:r>
-          </a:p>
-          <a:p>
-            <a:pPr lvl="2">
-              <a:spcBef>
-                <a:spcPts val="0"/>
-              </a:spcBef>
-            </a:pPr>
-            <a:r>
-              <a:rPr lang="en-US" sz="1800" dirty="0"/>
-              <a:t>Important for “boot entropy,” where critical machine keys are derived.</a:t>
-            </a:r>
-          </a:p>
-          <a:p>
-            <a:pPr lvl="1">
-              <a:spcBef>
-                <a:spcPts val="0"/>
-              </a:spcBef>
-            </a:pPr>
-            <a:r>
-              <a:rPr lang="en-US" sz="1800" dirty="0"/>
-              <a:t>Naturally “unobservable” by adversary</a:t>
+              <a:t>Naturally “unobservable” by adversary. Protected from side channels.</a:t>
             </a:r>
           </a:p>
           <a:p>
@@ -15295,7 +15386,7 @@
         </p:nvSpPr>
         <p:spPr>
           <a:xfrm>
-            <a:off x="152400" y="1752600"/>
+            <a:off x="190500" y="1523010"/>
             <a:ext cx="8763000" cy="4648200"/>
           </a:xfrm>
         </p:spPr>
@@ -15365,7 +15456,15 @@
             </a:pPr>
             <a:r>
               <a:rPr lang="en-US" sz="1800" dirty="0"/>
-              <a:t>Past attacks exploited “observable” interrupt artifacts by adversary.</a:t>
+              <a:t>Past attacks exploited “observable” interrupt artifacts by adversary.  Also subject to side channel attacks (see </a:t>
+            </a:r>
+            <a:r>
+              <a:rPr lang="en-US" sz="1800" dirty="0" err="1"/>
+              <a:t>Dodis</a:t>
+            </a:r>
+            <a:r>
+              <a:rPr lang="en-US" sz="1800" dirty="0"/>
+              <a:t> et. al., 2014).</a:t>
             </a:r>
           </a:p>
           <a:p>
@@ -16726,6 +16825,24 @@
         <p:txBody>
           <a:bodyPr/>
           <a:lstStyle/>
+          <a:p>
+            <a:r>
+              <a:rPr lang="en-US" sz="1800" dirty="0">
+                <a:latin typeface="Calibri" panose="020F0502020204030204" pitchFamily="34" charset="0"/>
+                <a:cs typeface="Calibri" panose="020F0502020204030204" pitchFamily="34" charset="0"/>
+              </a:rPr>
+              <a:t>Based on a simple loop adding to an accumulator (Optimization turned off!)</a:t>
+            </a:r>
+          </a:p>
+          <a:p>
+            <a:pPr marL="0" indent="0">
+              <a:buNone/>
+            </a:pPr>
+            <a:endParaRPr lang="en-US" sz="1800" dirty="0">
+              <a:latin typeface="Calibri" panose="020F0502020204030204" pitchFamily="34" charset="0"/>
+              <a:cs typeface="Calibri" panose="020F0502020204030204" pitchFamily="34" charset="0"/>
+            </a:endParaRPr>
+          </a:p>
           <a:p>
             <a:pPr marL="0" indent="0">
               <a:buNone/>
@@ -17873,20 +17990,6 @@
             </a:pPr>
             <a:r>
               <a:rPr lang="en-US" sz="1800" dirty="0"/>
-              <a:t>“No one can predict interrupt arrival times”</a:t>
-            </a:r>
-          </a:p>
-          <a:p>
-            <a:pPr lvl="2">
-              <a:lnSpc>
-                <a:spcPct val="90000"/>
-              </a:lnSpc>
-              <a:spcBef>
-                <a:spcPts val="0"/>
-              </a:spcBef>
-            </a:pPr>
-            <a:r>
-              <a:rPr lang="en-US" sz="1800" dirty="0"/>
               <a:t>“No one could guess the sample values, it’s too complex”</a:t>
             </a:r>
           </a:p>
@@ -18158,13 +18261,31 @@
         </p:nvSpPr>
         <p:spPr>
           <a:xfrm>
-            <a:off x="609600" y="1828800"/>
-            <a:ext cx="8229600" cy="4404360"/>
+            <a:off x="609600" y="1447800"/>
+            <a:ext cx="8229600" cy="4785360"/>
           </a:xfrm>
         </p:spPr>
         <p:txBody>
           <a:bodyPr/>
           <a:lstStyle/>
+          <a:p>
+            <a:r>
+              <a:rPr lang="en-US" sz="1800" dirty="0">
+                <a:latin typeface="Calibri" panose="020F0502020204030204" pitchFamily="34" charset="0"/>
+                <a:cs typeface="Calibri" panose="020F0502020204030204" pitchFamily="34" charset="0"/>
+              </a:rPr>
+              <a:t>Memory jitter comes from CPU/DRAM clock differences and cache fill wait states.</a:t>
+            </a:r>
+          </a:p>
+          <a:p>
+            <a:pPr marL="0" indent="0">
+              <a:buNone/>
+            </a:pPr>
+            <a:endParaRPr lang="en-US" sz="1800" dirty="0">
+              <a:latin typeface="Calibri" panose="020F0502020204030204" pitchFamily="34" charset="0"/>
+              <a:cs typeface="Calibri" panose="020F0502020204030204" pitchFamily="34" charset="0"/>
+            </a:endParaRPr>
+          </a:p>
           <a:p>
             <a:pPr marL="0" indent="0">
               <a:buNone/>
@@ -18592,13 +18713,31 @@
         </p:nvSpPr>
         <p:spPr>
           <a:xfrm>
-            <a:off x="571500" y="1981200"/>
-            <a:ext cx="8001000" cy="4023360"/>
+            <a:off x="571500" y="1676400"/>
+            <a:ext cx="8001000" cy="4328160"/>
           </a:xfrm>
         </p:spPr>
         <p:txBody>
           <a:bodyPr/>
           <a:lstStyle/>
+          <a:p>
+            <a:r>
+              <a:rPr lang="en-US" sz="1800" dirty="0">
+                <a:latin typeface="Calibri" panose="020F0502020204030204" pitchFamily="34" charset="0"/>
+                <a:cs typeface="Calibri" panose="020F0502020204030204" pitchFamily="34" charset="0"/>
+              </a:rPr>
+              <a:t>Hash jitter is based on the combined effect of all the sources of variation exhibited in the course of multiple SHA-3 digest computations.</a:t>
+            </a:r>
+          </a:p>
+          <a:p>
+            <a:pPr marL="0" indent="0">
+              <a:buNone/>
+            </a:pPr>
+            <a:endParaRPr lang="en-US" sz="1800" dirty="0">
+              <a:latin typeface="Calibri" panose="020F0502020204030204" pitchFamily="34" charset="0"/>
+              <a:cs typeface="Calibri" panose="020F0502020204030204" pitchFamily="34" charset="0"/>
+            </a:endParaRPr>
+          </a:p>
           <a:p>
             <a:pPr marL="0" indent="0">
               <a:buNone/>
@@ -20368,8 +20507,8 @@
         </p:blipFill>
         <p:spPr bwMode="auto">
           <a:xfrm>
-            <a:off x="1981200" y="2224587"/>
-            <a:ext cx="5617554" cy="4557213"/>
+            <a:off x="1981200" y="2306503"/>
+            <a:ext cx="4953000" cy="4018097"/>
           </a:xfrm>
           <a:prstGeom prst="rect">
             <a:avLst/>
@@ -20422,7 +20561,7 @@
               <a:rPr lang="en-US" sz="2400" dirty="0">
                 <a:latin typeface="+mn-lt"/>
               </a:rPr>
-              <a:t>This is the hard part</a:t>
+              <a:t>This is the hard part we’ll talk about.</a:t>
             </a:r>
           </a:p>
           <a:p>

</xml_diff>

<commit_message>
Added security model background for computational entropy.
</commit_message>
<xml_diff>
--- a/BerkeleyClass/CS290Spring2013/Lectures/entropy_talk.pptx
+++ b/BerkeleyClass/CS290Spring2013/Lectures/entropy_talk.pptx
@@ -5,10 +5,10 @@
     <p:sldMasterId id="2147483649" r:id="rId1"/>
   </p:sldMasterIdLst>
   <p:notesMasterIdLst>
-    <p:notesMasterId r:id="rId38"/>
+    <p:notesMasterId r:id="rId41"/>
   </p:notesMasterIdLst>
   <p:handoutMasterIdLst>
-    <p:handoutMasterId r:id="rId39"/>
+    <p:handoutMasterId r:id="rId42"/>
   </p:handoutMasterIdLst>
   <p:sldIdLst>
     <p:sldId id="3175" r:id="rId2"/>
@@ -47,6 +47,9 @@
     <p:sldId id="3798" r:id="rId35"/>
     <p:sldId id="3787" r:id="rId36"/>
     <p:sldId id="3789" r:id="rId37"/>
+    <p:sldId id="3804" r:id="rId38"/>
+    <p:sldId id="3805" r:id="rId39"/>
+    <p:sldId id="3806" r:id="rId40"/>
   </p:sldIdLst>
   <p:sldSz cx="9144000" cy="6858000" type="screen4x3"/>
   <p:notesSz cx="7010400" cy="9296400"/>
@@ -3493,6 +3496,306 @@
     <p:extLst>
       <p:ext uri="{BB962C8B-B14F-4D97-AF65-F5344CB8AC3E}">
         <p14:creationId xmlns:p14="http://schemas.microsoft.com/office/powerpoint/2010/main" val="1035154100"/>
+      </p:ext>
+    </p:extLst>
+  </p:cSld>
+  <p:clrMapOvr>
+    <a:masterClrMapping/>
+  </p:clrMapOvr>
+</p:notes>
+</file>
+
+<file path=ppt/notesSlides/notesSlide33.xml><?xml version="1.0" encoding="utf-8"?>
+<p:notes xmlns:a="http://schemas.openxmlformats.org/drawingml/2006/main" xmlns:r="http://schemas.openxmlformats.org/officeDocument/2006/relationships" xmlns:p="http://schemas.openxmlformats.org/presentationml/2006/main">
+  <p:cSld>
+    <p:spTree>
+      <p:nvGrpSpPr>
+        <p:cNvPr id="1" name=""/>
+        <p:cNvGrpSpPr/>
+        <p:nvPr/>
+      </p:nvGrpSpPr>
+      <p:grpSpPr>
+        <a:xfrm>
+          <a:off x="0" y="0"/>
+          <a:ext cx="0" cy="0"/>
+          <a:chOff x="0" y="0"/>
+          <a:chExt cx="0" cy="0"/>
+        </a:xfrm>
+      </p:grpSpPr>
+      <p:sp>
+        <p:nvSpPr>
+          <p:cNvPr id="95234" name="Rectangle 7"/>
+          <p:cNvSpPr>
+            <a:spLocks noGrp="1" noChangeArrowheads="1"/>
+          </p:cNvSpPr>
+          <p:nvPr>
+            <p:ph type="sldNum" sz="quarter" idx="5"/>
+          </p:nvPr>
+        </p:nvSpPr>
+        <p:spPr>
+          <a:noFill/>
+        </p:spPr>
+        <p:txBody>
+          <a:bodyPr/>
+          <a:lstStyle/>
+          <a:p>
+            <a:fld id="{86016DC7-F49B-4F50-9A32-E9E9CFA38878}" type="slidenum">
+              <a:rPr lang="en-US" smtClean="0"/>
+              <a:pPr/>
+              <a:t>37</a:t>
+            </a:fld>
+            <a:endParaRPr lang="en-US"/>
+          </a:p>
+        </p:txBody>
+      </p:sp>
+      <p:sp>
+        <p:nvSpPr>
+          <p:cNvPr id="95235" name="Rectangle 2"/>
+          <p:cNvSpPr>
+            <a:spLocks noGrp="1" noRot="1" noChangeAspect="1" noChangeArrowheads="1" noTextEdit="1"/>
+          </p:cNvSpPr>
+          <p:nvPr>
+            <p:ph type="sldImg"/>
+          </p:nvPr>
+        </p:nvSpPr>
+        <p:spPr>
+          <a:xfrm>
+            <a:off x="1169988" y="687388"/>
+            <a:ext cx="4673600" cy="3505200"/>
+          </a:xfrm>
+          <a:ln/>
+        </p:spPr>
+      </p:sp>
+      <p:sp>
+        <p:nvSpPr>
+          <p:cNvPr id="95236" name="Rectangle 3"/>
+          <p:cNvSpPr>
+            <a:spLocks noGrp="1" noChangeArrowheads="1"/>
+          </p:cNvSpPr>
+          <p:nvPr>
+            <p:ph type="body" idx="1"/>
+          </p:nvPr>
+        </p:nvSpPr>
+        <p:spPr>
+          <a:xfrm>
+            <a:off x="914400" y="4421188"/>
+            <a:ext cx="5184775" cy="4191000"/>
+          </a:xfrm>
+          <a:noFill/>
+          <a:ln w="9525"/>
+        </p:spPr>
+        <p:txBody>
+          <a:bodyPr/>
+          <a:lstStyle/>
+          <a:p>
+            <a:endParaRPr lang="en-US"/>
+          </a:p>
+        </p:txBody>
+      </p:sp>
+    </p:spTree>
+    <p:extLst>
+      <p:ext uri="{BB962C8B-B14F-4D97-AF65-F5344CB8AC3E}">
+        <p14:creationId xmlns:p14="http://schemas.microsoft.com/office/powerpoint/2010/main" val="1880692314"/>
+      </p:ext>
+    </p:extLst>
+  </p:cSld>
+  <p:clrMapOvr>
+    <a:masterClrMapping/>
+  </p:clrMapOvr>
+</p:notes>
+</file>
+
+<file path=ppt/notesSlides/notesSlide34.xml><?xml version="1.0" encoding="utf-8"?>
+<p:notes xmlns:a="http://schemas.openxmlformats.org/drawingml/2006/main" xmlns:r="http://schemas.openxmlformats.org/officeDocument/2006/relationships" xmlns:p="http://schemas.openxmlformats.org/presentationml/2006/main">
+  <p:cSld>
+    <p:spTree>
+      <p:nvGrpSpPr>
+        <p:cNvPr id="1" name=""/>
+        <p:cNvGrpSpPr/>
+        <p:nvPr/>
+      </p:nvGrpSpPr>
+      <p:grpSpPr>
+        <a:xfrm>
+          <a:off x="0" y="0"/>
+          <a:ext cx="0" cy="0"/>
+          <a:chOff x="0" y="0"/>
+          <a:chExt cx="0" cy="0"/>
+        </a:xfrm>
+      </p:grpSpPr>
+      <p:sp>
+        <p:nvSpPr>
+          <p:cNvPr id="95234" name="Rectangle 7"/>
+          <p:cNvSpPr>
+            <a:spLocks noGrp="1" noChangeArrowheads="1"/>
+          </p:cNvSpPr>
+          <p:nvPr>
+            <p:ph type="sldNum" sz="quarter" idx="5"/>
+          </p:nvPr>
+        </p:nvSpPr>
+        <p:spPr>
+          <a:noFill/>
+        </p:spPr>
+        <p:txBody>
+          <a:bodyPr/>
+          <a:lstStyle/>
+          <a:p>
+            <a:fld id="{86016DC7-F49B-4F50-9A32-E9E9CFA38878}" type="slidenum">
+              <a:rPr lang="en-US" smtClean="0"/>
+              <a:pPr/>
+              <a:t>38</a:t>
+            </a:fld>
+            <a:endParaRPr lang="en-US"/>
+          </a:p>
+        </p:txBody>
+      </p:sp>
+      <p:sp>
+        <p:nvSpPr>
+          <p:cNvPr id="95235" name="Rectangle 2"/>
+          <p:cNvSpPr>
+            <a:spLocks noGrp="1" noRot="1" noChangeAspect="1" noChangeArrowheads="1" noTextEdit="1"/>
+          </p:cNvSpPr>
+          <p:nvPr>
+            <p:ph type="sldImg"/>
+          </p:nvPr>
+        </p:nvSpPr>
+        <p:spPr>
+          <a:xfrm>
+            <a:off x="1169988" y="687388"/>
+            <a:ext cx="4673600" cy="3505200"/>
+          </a:xfrm>
+          <a:ln/>
+        </p:spPr>
+      </p:sp>
+      <p:sp>
+        <p:nvSpPr>
+          <p:cNvPr id="95236" name="Rectangle 3"/>
+          <p:cNvSpPr>
+            <a:spLocks noGrp="1" noChangeArrowheads="1"/>
+          </p:cNvSpPr>
+          <p:nvPr>
+            <p:ph type="body" idx="1"/>
+          </p:nvPr>
+        </p:nvSpPr>
+        <p:spPr>
+          <a:xfrm>
+            <a:off x="914400" y="4421188"/>
+            <a:ext cx="5184775" cy="4191000"/>
+          </a:xfrm>
+          <a:noFill/>
+          <a:ln w="9525"/>
+        </p:spPr>
+        <p:txBody>
+          <a:bodyPr/>
+          <a:lstStyle/>
+          <a:p>
+            <a:endParaRPr lang="en-US"/>
+          </a:p>
+        </p:txBody>
+      </p:sp>
+    </p:spTree>
+    <p:extLst>
+      <p:ext uri="{BB962C8B-B14F-4D97-AF65-F5344CB8AC3E}">
+        <p14:creationId xmlns:p14="http://schemas.microsoft.com/office/powerpoint/2010/main" val="34259583"/>
+      </p:ext>
+    </p:extLst>
+  </p:cSld>
+  <p:clrMapOvr>
+    <a:masterClrMapping/>
+  </p:clrMapOvr>
+</p:notes>
+</file>
+
+<file path=ppt/notesSlides/notesSlide35.xml><?xml version="1.0" encoding="utf-8"?>
+<p:notes xmlns:a="http://schemas.openxmlformats.org/drawingml/2006/main" xmlns:r="http://schemas.openxmlformats.org/officeDocument/2006/relationships" xmlns:p="http://schemas.openxmlformats.org/presentationml/2006/main">
+  <p:cSld>
+    <p:spTree>
+      <p:nvGrpSpPr>
+        <p:cNvPr id="1" name=""/>
+        <p:cNvGrpSpPr/>
+        <p:nvPr/>
+      </p:nvGrpSpPr>
+      <p:grpSpPr>
+        <a:xfrm>
+          <a:off x="0" y="0"/>
+          <a:ext cx="0" cy="0"/>
+          <a:chOff x="0" y="0"/>
+          <a:chExt cx="0" cy="0"/>
+        </a:xfrm>
+      </p:grpSpPr>
+      <p:sp>
+        <p:nvSpPr>
+          <p:cNvPr id="95234" name="Rectangle 7"/>
+          <p:cNvSpPr>
+            <a:spLocks noGrp="1" noChangeArrowheads="1"/>
+          </p:cNvSpPr>
+          <p:nvPr>
+            <p:ph type="sldNum" sz="quarter" idx="5"/>
+          </p:nvPr>
+        </p:nvSpPr>
+        <p:spPr>
+          <a:noFill/>
+        </p:spPr>
+        <p:txBody>
+          <a:bodyPr/>
+          <a:lstStyle/>
+          <a:p>
+            <a:fld id="{86016DC7-F49B-4F50-9A32-E9E9CFA38878}" type="slidenum">
+              <a:rPr lang="en-US" smtClean="0"/>
+              <a:pPr/>
+              <a:t>39</a:t>
+            </a:fld>
+            <a:endParaRPr lang="en-US"/>
+          </a:p>
+        </p:txBody>
+      </p:sp>
+      <p:sp>
+        <p:nvSpPr>
+          <p:cNvPr id="95235" name="Rectangle 2"/>
+          <p:cNvSpPr>
+            <a:spLocks noGrp="1" noRot="1" noChangeAspect="1" noChangeArrowheads="1" noTextEdit="1"/>
+          </p:cNvSpPr>
+          <p:nvPr>
+            <p:ph type="sldImg"/>
+          </p:nvPr>
+        </p:nvSpPr>
+        <p:spPr>
+          <a:xfrm>
+            <a:off x="1169988" y="687388"/>
+            <a:ext cx="4673600" cy="3505200"/>
+          </a:xfrm>
+          <a:ln/>
+        </p:spPr>
+      </p:sp>
+      <p:sp>
+        <p:nvSpPr>
+          <p:cNvPr id="95236" name="Rectangle 3"/>
+          <p:cNvSpPr>
+            <a:spLocks noGrp="1" noChangeArrowheads="1"/>
+          </p:cNvSpPr>
+          <p:nvPr>
+            <p:ph type="body" idx="1"/>
+          </p:nvPr>
+        </p:nvSpPr>
+        <p:spPr>
+          <a:xfrm>
+            <a:off x="914400" y="4421188"/>
+            <a:ext cx="5184775" cy="4191000"/>
+          </a:xfrm>
+          <a:noFill/>
+          <a:ln w="9525"/>
+        </p:spPr>
+        <p:txBody>
+          <a:bodyPr/>
+          <a:lstStyle/>
+          <a:p>
+            <a:endParaRPr lang="en-US"/>
+          </a:p>
+        </p:txBody>
+      </p:sp>
+    </p:spTree>
+    <p:extLst>
+      <p:ext uri="{BB962C8B-B14F-4D97-AF65-F5344CB8AC3E}">
+        <p14:creationId xmlns:p14="http://schemas.microsoft.com/office/powerpoint/2010/main" val="128029670"/>
       </p:ext>
     </p:extLst>
   </p:cSld>
@@ -9915,58 +10218,6 @@
       </p:sp>
       <p:sp>
         <p:nvSpPr>
-          <p:cNvPr id="16389" name="Text Box 5"/>
-          <p:cNvSpPr txBox="1">
-            <a:spLocks noChangeArrowheads="1"/>
-          </p:cNvSpPr>
-          <p:nvPr/>
-        </p:nvSpPr>
-        <p:spPr bwMode="auto">
-          <a:xfrm>
-            <a:off x="5104673" y="4256782"/>
-            <a:ext cx="3638261" cy="769441"/>
-          </a:xfrm>
-          <a:prstGeom prst="rect">
-            <a:avLst/>
-          </a:prstGeom>
-          <a:noFill/>
-          <a:ln w="12700" cap="sq">
-            <a:noFill/>
-            <a:miter lim="800000"/>
-            <a:headEnd type="none" w="sm" len="sm"/>
-            <a:tailEnd type="none" w="sm" len="sm"/>
-          </a:ln>
-        </p:spPr>
-        <p:txBody>
-          <a:bodyPr wrap="none">
-            <a:spAutoFit/>
-          </a:bodyPr>
-          <a:lstStyle/>
-          <a:p>
-            <a:pPr algn="r"/>
-            <a:r>
-              <a:rPr lang="en-US" sz="2400">
-                <a:latin typeface="Arial" charset="0"/>
-              </a:rPr>
-              <a:t>John Manferdelli</a:t>
-            </a:r>
-            <a:endParaRPr lang="en-US" sz="2000" dirty="0">
-              <a:latin typeface="Arial" charset="0"/>
-            </a:endParaRPr>
-          </a:p>
-          <a:p>
-            <a:pPr algn="r"/>
-            <a:r>
-              <a:rPr lang="en-US" sz="2000" dirty="0">
-                <a:latin typeface="Arial" charset="0"/>
-              </a:rPr>
-              <a:t>JohnManferdelli@hotmail.com</a:t>
-            </a:r>
-          </a:p>
-        </p:txBody>
-      </p:sp>
-      <p:sp>
-        <p:nvSpPr>
           <p:cNvPr id="16390" name="Text Box 1028"/>
           <p:cNvSpPr txBox="1">
             <a:spLocks noChangeArrowheads="1"/>
@@ -10023,6 +10274,64 @@
             <a:endParaRPr lang="en-US" sz="2400" dirty="0">
               <a:latin typeface="Arial" charset="0"/>
             </a:endParaRPr>
+          </a:p>
+        </p:txBody>
+      </p:sp>
+      <p:sp>
+        <p:nvSpPr>
+          <p:cNvPr id="6" name="Text Box 5">
+            <a:extLst>
+              <a:ext uri="{FF2B5EF4-FFF2-40B4-BE49-F238E27FC236}">
+                <a16:creationId xmlns:a16="http://schemas.microsoft.com/office/drawing/2014/main" id="{564F1712-0EEC-784E-BB3D-B70B186AF937}"/>
+              </a:ext>
+            </a:extLst>
+          </p:cNvPr>
+          <p:cNvSpPr txBox="1">
+            <a:spLocks noChangeArrowheads="1"/>
+          </p:cNvSpPr>
+          <p:nvPr/>
+        </p:nvSpPr>
+        <p:spPr bwMode="auto">
+          <a:xfrm>
+            <a:off x="5105400" y="4419600"/>
+            <a:ext cx="3638261" cy="769441"/>
+          </a:xfrm>
+          <a:prstGeom prst="rect">
+            <a:avLst/>
+          </a:prstGeom>
+          <a:noFill/>
+          <a:ln w="12700" cap="sq">
+            <a:noFill/>
+            <a:miter lim="800000"/>
+            <a:headEnd type="none" w="sm" len="sm"/>
+            <a:tailEnd type="none" w="sm" len="sm"/>
+          </a:ln>
+        </p:spPr>
+        <p:txBody>
+          <a:bodyPr wrap="none">
+            <a:spAutoFit/>
+          </a:bodyPr>
+          <a:lstStyle/>
+          <a:p>
+            <a:pPr algn="r"/>
+            <a:r>
+              <a:rPr lang="en-US" sz="2400">
+                <a:latin typeface="Arial" charset="0"/>
+              </a:rPr>
+              <a:t>John Manferdelli</a:t>
+            </a:r>
+            <a:endParaRPr lang="en-US" sz="2000" dirty="0">
+              <a:latin typeface="Arial" charset="0"/>
+            </a:endParaRPr>
+          </a:p>
+          <a:p>
+            <a:pPr algn="r"/>
+            <a:r>
+              <a:rPr lang="en-US" sz="2000" dirty="0">
+                <a:latin typeface="Arial" charset="0"/>
+              </a:rPr>
+              <a:t>JohnManferdelli@hotmail.com</a:t>
+            </a:r>
           </a:p>
         </p:txBody>
       </p:sp>
@@ -14946,7 +15255,7 @@
         </p:nvSpPr>
         <p:spPr>
           <a:xfrm>
-            <a:off x="363220" y="152400"/>
+            <a:off x="363220" y="183573"/>
             <a:ext cx="7791450" cy="1111827"/>
           </a:xfrm>
         </p:spPr>
@@ -19558,6 +19867,666 @@
     <p:extLst>
       <p:ext uri="{BB962C8B-B14F-4D97-AF65-F5344CB8AC3E}">
         <p14:creationId xmlns:p14="http://schemas.microsoft.com/office/powerpoint/2010/main" val="1468241226"/>
+      </p:ext>
+    </p:extLst>
+  </p:cSld>
+  <p:clrMapOvr>
+    <a:masterClrMapping/>
+  </p:clrMapOvr>
+  <p:transition/>
+</p:sld>
+</file>
+
+<file path=ppt/slides/slide37.xml><?xml version="1.0" encoding="utf-8"?>
+<p:sld xmlns:a="http://schemas.openxmlformats.org/drawingml/2006/main" xmlns:r="http://schemas.openxmlformats.org/officeDocument/2006/relationships" xmlns:p="http://schemas.openxmlformats.org/presentationml/2006/main">
+  <p:cSld>
+    <p:spTree>
+      <p:nvGrpSpPr>
+        <p:cNvPr id="1" name=""/>
+        <p:cNvGrpSpPr/>
+        <p:nvPr/>
+      </p:nvGrpSpPr>
+      <p:grpSpPr>
+        <a:xfrm>
+          <a:off x="0" y="0"/>
+          <a:ext cx="0" cy="0"/>
+          <a:chOff x="0" y="0"/>
+          <a:chExt cx="0" cy="0"/>
+        </a:xfrm>
+      </p:grpSpPr>
+      <p:sp>
+        <p:nvSpPr>
+          <p:cNvPr id="23556" name="Rectangle 2"/>
+          <p:cNvSpPr>
+            <a:spLocks noGrp="1" noChangeArrowheads="1"/>
+          </p:cNvSpPr>
+          <p:nvPr>
+            <p:ph type="title"/>
+          </p:nvPr>
+        </p:nvSpPr>
+        <p:spPr>
+          <a:xfrm>
+            <a:off x="682752" y="114300"/>
+            <a:ext cx="7772400" cy="838200"/>
+          </a:xfrm>
+        </p:spPr>
+        <p:txBody>
+          <a:bodyPr/>
+          <a:lstStyle/>
+          <a:p>
+            <a:r>
+              <a:rPr lang="en-US" sz="3600" dirty="0"/>
+              <a:t>Security Model</a:t>
+            </a:r>
+          </a:p>
+        </p:txBody>
+      </p:sp>
+      <p:sp>
+        <p:nvSpPr>
+          <p:cNvPr id="23557" name="Rectangle 3"/>
+          <p:cNvSpPr>
+            <a:spLocks noGrp="1" noChangeArrowheads="1"/>
+          </p:cNvSpPr>
+          <p:nvPr>
+            <p:ph type="body" idx="1"/>
+          </p:nvPr>
+        </p:nvSpPr>
+        <p:spPr>
+          <a:xfrm>
+            <a:off x="454152" y="1447800"/>
+            <a:ext cx="8229600" cy="4648200"/>
+          </a:xfrm>
+        </p:spPr>
+        <p:txBody>
+          <a:bodyPr/>
+          <a:lstStyle/>
+          <a:p>
+            <a:pPr>
+              <a:lnSpc>
+                <a:spcPct val="90000"/>
+              </a:lnSpc>
+            </a:pPr>
+            <a:r>
+              <a:rPr lang="en-US" sz="2000" dirty="0">
+                <a:latin typeface="Arial" panose="020B0604020202020204" pitchFamily="34" charset="0"/>
+                <a:cs typeface="Arial" panose="020B0604020202020204" pitchFamily="34" charset="0"/>
+              </a:rPr>
+              <a:t>There are two different security foundations for “execution jitter” as an entropy source.</a:t>
+            </a:r>
+          </a:p>
+          <a:p>
+            <a:pPr lvl="1">
+              <a:lnSpc>
+                <a:spcPct val="90000"/>
+              </a:lnSpc>
+            </a:pPr>
+            <a:r>
+              <a:rPr lang="en-US" sz="2000" dirty="0">
+                <a:latin typeface="Arial" panose="020B0604020202020204" pitchFamily="34" charset="0"/>
+                <a:cs typeface="Arial" panose="020B0604020202020204" pitchFamily="34" charset="0"/>
+              </a:rPr>
+              <a:t>Unpredictable timing artifacts that are caused by pure physical processes that affect jitter.  For example, cross domain clocking environments which affects timing jitter.  This is physical. </a:t>
+            </a:r>
+          </a:p>
+          <a:p>
+            <a:pPr lvl="1">
+              <a:lnSpc>
+                <a:spcPct val="90000"/>
+              </a:lnSpc>
+            </a:pPr>
+            <a:r>
+              <a:rPr lang="en-US" sz="2000" dirty="0">
+                <a:latin typeface="Arial" panose="020B0604020202020204" pitchFamily="34" charset="0"/>
+                <a:cs typeface="Arial" panose="020B0604020202020204" pitchFamily="34" charset="0"/>
+              </a:rPr>
+              <a:t>The computational barrier to recreate complex CPU state: caches, branch prediction, frequency scaling, intervening interrupts, locks, cross CPU performance differences, TLB misses, speculative execution.</a:t>
+            </a:r>
+          </a:p>
+          <a:p>
+            <a:pPr lvl="1">
+              <a:lnSpc>
+                <a:spcPct val="90000"/>
+              </a:lnSpc>
+            </a:pPr>
+            <a:r>
+              <a:rPr lang="en-US" sz="2000" dirty="0">
+                <a:latin typeface="Arial" panose="020B0604020202020204" pitchFamily="34" charset="0"/>
+                <a:cs typeface="Arial" panose="020B0604020202020204" pitchFamily="34" charset="0"/>
+              </a:rPr>
+              <a:t>Both are present.</a:t>
+            </a:r>
+          </a:p>
+        </p:txBody>
+      </p:sp>
+      <p:sp>
+        <p:nvSpPr>
+          <p:cNvPr id="8" name="Slide Number Placeholder 7"/>
+          <p:cNvSpPr>
+            <a:spLocks noGrp="1"/>
+          </p:cNvSpPr>
+          <p:nvPr>
+            <p:ph type="sldNum" sz="quarter" idx="12"/>
+          </p:nvPr>
+        </p:nvSpPr>
+        <p:spPr/>
+        <p:txBody>
+          <a:bodyPr/>
+          <a:lstStyle/>
+          <a:p>
+            <a:pPr>
+              <a:defRPr/>
+            </a:pPr>
+            <a:fld id="{8E09DF16-9352-46A7-97F1-1D13A8547ADD}" type="slidenum">
+              <a:rPr lang="en-US" smtClean="0"/>
+              <a:pPr>
+                <a:defRPr/>
+              </a:pPr>
+              <a:t>37</a:t>
+            </a:fld>
+            <a:endParaRPr lang="en-US"/>
+          </a:p>
+        </p:txBody>
+      </p:sp>
+    </p:spTree>
+    <p:extLst>
+      <p:ext uri="{BB962C8B-B14F-4D97-AF65-F5344CB8AC3E}">
+        <p14:creationId xmlns:p14="http://schemas.microsoft.com/office/powerpoint/2010/main" val="3416314446"/>
+      </p:ext>
+    </p:extLst>
+  </p:cSld>
+  <p:clrMapOvr>
+    <a:masterClrMapping/>
+  </p:clrMapOvr>
+  <p:transition/>
+</p:sld>
+</file>
+
+<file path=ppt/slides/slide38.xml><?xml version="1.0" encoding="utf-8"?>
+<p:sld xmlns:a="http://schemas.openxmlformats.org/drawingml/2006/main" xmlns:r="http://schemas.openxmlformats.org/officeDocument/2006/relationships" xmlns:p="http://schemas.openxmlformats.org/presentationml/2006/main">
+  <p:cSld>
+    <p:spTree>
+      <p:nvGrpSpPr>
+        <p:cNvPr id="1" name=""/>
+        <p:cNvGrpSpPr/>
+        <p:nvPr/>
+      </p:nvGrpSpPr>
+      <p:grpSpPr>
+        <a:xfrm>
+          <a:off x="0" y="0"/>
+          <a:ext cx="0" cy="0"/>
+          <a:chOff x="0" y="0"/>
+          <a:chExt cx="0" cy="0"/>
+        </a:xfrm>
+      </p:grpSpPr>
+      <p:sp>
+        <p:nvSpPr>
+          <p:cNvPr id="23556" name="Rectangle 2"/>
+          <p:cNvSpPr>
+            <a:spLocks noGrp="1" noChangeArrowheads="1"/>
+          </p:cNvSpPr>
+          <p:nvPr>
+            <p:ph type="title"/>
+          </p:nvPr>
+        </p:nvSpPr>
+        <p:spPr>
+          <a:xfrm>
+            <a:off x="682752" y="114300"/>
+            <a:ext cx="7772400" cy="838200"/>
+          </a:xfrm>
+        </p:spPr>
+        <p:txBody>
+          <a:bodyPr/>
+          <a:lstStyle/>
+          <a:p>
+            <a:r>
+              <a:rPr lang="en-US" sz="3600" dirty="0"/>
+              <a:t>Security Model --- symmetric crypto</a:t>
+            </a:r>
+          </a:p>
+        </p:txBody>
+      </p:sp>
+      <p:sp>
+        <p:nvSpPr>
+          <p:cNvPr id="23557" name="Rectangle 3"/>
+          <p:cNvSpPr>
+            <a:spLocks noGrp="1" noChangeArrowheads="1"/>
+          </p:cNvSpPr>
+          <p:nvPr>
+            <p:ph type="body" idx="1"/>
+          </p:nvPr>
+        </p:nvSpPr>
+        <p:spPr>
+          <a:xfrm>
+            <a:off x="228600" y="1143000"/>
+            <a:ext cx="8610600" cy="5105400"/>
+          </a:xfrm>
+        </p:spPr>
+        <p:txBody>
+          <a:bodyPr/>
+          <a:lstStyle/>
+          <a:p>
+            <a:pPr>
+              <a:lnSpc>
+                <a:spcPct val="90000"/>
+              </a:lnSpc>
+            </a:pPr>
+            <a:r>
+              <a:rPr lang="en-US" sz="2000" dirty="0">
+                <a:latin typeface="Arial" panose="020B0604020202020204" pitchFamily="34" charset="0"/>
+                <a:cs typeface="Arial" panose="020B0604020202020204" pitchFamily="34" charset="0"/>
+              </a:rPr>
+              <a:t>Two security models</a:t>
+            </a:r>
+          </a:p>
+          <a:p>
+            <a:pPr lvl="1">
+              <a:lnSpc>
+                <a:spcPct val="90000"/>
+              </a:lnSpc>
+            </a:pPr>
+            <a:r>
+              <a:rPr lang="en-US" sz="2000" dirty="0">
+                <a:latin typeface="Arial" panose="020B0604020202020204" pitchFamily="34" charset="0"/>
+                <a:cs typeface="Arial" panose="020B0604020202020204" pitchFamily="34" charset="0"/>
+              </a:rPr>
+              <a:t>One time pad corresponds to “physical entropy.”  Safe regardless of computational assumptions.</a:t>
+            </a:r>
+          </a:p>
+          <a:p>
+            <a:pPr lvl="1">
+              <a:lnSpc>
+                <a:spcPct val="90000"/>
+              </a:lnSpc>
+            </a:pPr>
+            <a:r>
+              <a:rPr lang="en-US" sz="2000" dirty="0">
+                <a:latin typeface="Arial" panose="020B0604020202020204" pitchFamily="34" charset="0"/>
+                <a:cs typeface="Arial" panose="020B0604020202020204" pitchFamily="34" charset="0"/>
+              </a:rPr>
+              <a:t>Real security based on computation</a:t>
+            </a:r>
+          </a:p>
+          <a:p>
+            <a:pPr lvl="2">
+              <a:lnSpc>
+                <a:spcPct val="90000"/>
+              </a:lnSpc>
+            </a:pPr>
+            <a:r>
+              <a:rPr lang="en-US" sz="1800" dirty="0">
+                <a:latin typeface="Arial" panose="020B0604020202020204" pitchFamily="34" charset="0"/>
+                <a:cs typeface="Arial" panose="020B0604020202020204" pitchFamily="34" charset="0"/>
+              </a:rPr>
+              <a:t>Model: Given a known cipher (say AES) with a prescribed key size (say 128 bits) and one block of corresponding known plain and ciphertext. What is “gold standard” to evaluate its security?</a:t>
+            </a:r>
+          </a:p>
+          <a:p>
+            <a:pPr lvl="2">
+              <a:lnSpc>
+                <a:spcPct val="90000"/>
+              </a:lnSpc>
+            </a:pPr>
+            <a:r>
+              <a:rPr lang="en-US" sz="1800" dirty="0">
+                <a:latin typeface="Arial" panose="020B0604020202020204" pitchFamily="34" charset="0"/>
+                <a:cs typeface="Arial" panose="020B0604020202020204" pitchFamily="34" charset="0"/>
+              </a:rPr>
+              <a:t>Answer: If best adversary’s most efficient attack is brute force, cipher is good.   Guaranteed success in 2</a:t>
+            </a:r>
+            <a:r>
+              <a:rPr lang="en-US" sz="1800" baseline="30000" dirty="0">
+                <a:latin typeface="Arial" panose="020B0604020202020204" pitchFamily="34" charset="0"/>
+                <a:cs typeface="Arial" panose="020B0604020202020204" pitchFamily="34" charset="0"/>
+              </a:rPr>
+              <a:t>128</a:t>
+            </a:r>
+            <a:r>
+              <a:rPr lang="en-US" sz="1800" dirty="0">
+                <a:latin typeface="Arial" panose="020B0604020202020204" pitchFamily="34" charset="0"/>
+                <a:cs typeface="Arial" panose="020B0604020202020204" pitchFamily="34" charset="0"/>
+              </a:rPr>
+              <a:t> steps, expected cost is 2</a:t>
+            </a:r>
+            <a:r>
+              <a:rPr lang="en-US" sz="1800" baseline="30000" dirty="0">
+                <a:latin typeface="Arial" panose="020B0604020202020204" pitchFamily="34" charset="0"/>
+                <a:cs typeface="Arial" panose="020B0604020202020204" pitchFamily="34" charset="0"/>
+              </a:rPr>
+              <a:t>127</a:t>
+            </a:r>
+            <a:r>
+              <a:rPr lang="en-US" sz="1800" dirty="0">
+                <a:latin typeface="Arial" panose="020B0604020202020204" pitchFamily="34" charset="0"/>
+                <a:cs typeface="Arial" panose="020B0604020202020204" pitchFamily="34" charset="0"/>
+              </a:rPr>
+              <a:t> steps.</a:t>
+            </a:r>
+          </a:p>
+          <a:p>
+            <a:pPr>
+              <a:lnSpc>
+                <a:spcPct val="90000"/>
+              </a:lnSpc>
+            </a:pPr>
+            <a:r>
+              <a:rPr lang="en-US" sz="2000" dirty="0">
+                <a:latin typeface="Arial" panose="020B0604020202020204" pitchFamily="34" charset="0"/>
+                <a:cs typeface="Arial" panose="020B0604020202020204" pitchFamily="34" charset="0"/>
+              </a:rPr>
+              <a:t>Computational entropy</a:t>
+            </a:r>
+          </a:p>
+          <a:p>
+            <a:pPr lvl="1">
+              <a:lnSpc>
+                <a:spcPct val="90000"/>
+              </a:lnSpc>
+            </a:pPr>
+            <a:r>
+              <a:rPr lang="en-US" sz="1800" dirty="0">
+                <a:latin typeface="Arial" panose="020B0604020202020204" pitchFamily="34" charset="0"/>
+                <a:cs typeface="Arial" panose="020B0604020202020204" pitchFamily="34" charset="0"/>
+              </a:rPr>
+              <a:t>If I produce n bits of entropy and any successful adversary must carry out 2</a:t>
+            </a:r>
+            <a:r>
+              <a:rPr lang="en-US" sz="1800" baseline="30000" dirty="0">
+                <a:latin typeface="Arial" panose="020B0604020202020204" pitchFamily="34" charset="0"/>
+                <a:cs typeface="Arial" panose="020B0604020202020204" pitchFamily="34" charset="0"/>
+              </a:rPr>
+              <a:t>n</a:t>
+            </a:r>
+            <a:r>
+              <a:rPr lang="en-US" sz="1800" dirty="0">
+                <a:latin typeface="Arial" panose="020B0604020202020204" pitchFamily="34" charset="0"/>
+                <a:cs typeface="Arial" panose="020B0604020202020204" pitchFamily="34" charset="0"/>
+              </a:rPr>
+              <a:t> operations (say, to recreate a deterministic process used to produce the entropy), the entropy generation has “equivalent” security to the underlying cipher that uses it.</a:t>
+            </a:r>
+          </a:p>
+          <a:p>
+            <a:pPr lvl="1">
+              <a:lnSpc>
+                <a:spcPct val="90000"/>
+              </a:lnSpc>
+            </a:pPr>
+            <a:r>
+              <a:rPr lang="en-US" sz="1800" dirty="0">
+                <a:latin typeface="Arial" panose="020B0604020202020204" pitchFamily="34" charset="0"/>
+                <a:cs typeface="Arial" panose="020B0604020202020204" pitchFamily="34" charset="0"/>
+              </a:rPr>
+              <a:t>So, we have to “prove” an adversary must perform 2</a:t>
+            </a:r>
+            <a:r>
+              <a:rPr lang="en-US" sz="1800" baseline="30000" dirty="0">
+                <a:latin typeface="Arial" panose="020B0604020202020204" pitchFamily="34" charset="0"/>
+                <a:cs typeface="Arial" panose="020B0604020202020204" pitchFamily="34" charset="0"/>
+              </a:rPr>
+              <a:t>n</a:t>
+            </a:r>
+            <a:r>
+              <a:rPr lang="en-US" sz="1800" dirty="0">
+                <a:latin typeface="Arial" panose="020B0604020202020204" pitchFamily="34" charset="0"/>
+                <a:cs typeface="Arial" panose="020B0604020202020204" pitchFamily="34" charset="0"/>
+              </a:rPr>
+              <a:t> operations to condition machine state to produce the environment that generated the entropy scheme.</a:t>
+            </a:r>
+          </a:p>
+        </p:txBody>
+      </p:sp>
+      <p:sp>
+        <p:nvSpPr>
+          <p:cNvPr id="8" name="Slide Number Placeholder 7"/>
+          <p:cNvSpPr>
+            <a:spLocks noGrp="1"/>
+          </p:cNvSpPr>
+          <p:nvPr>
+            <p:ph type="sldNum" sz="quarter" idx="12"/>
+          </p:nvPr>
+        </p:nvSpPr>
+        <p:spPr/>
+        <p:txBody>
+          <a:bodyPr/>
+          <a:lstStyle/>
+          <a:p>
+            <a:pPr>
+              <a:defRPr/>
+            </a:pPr>
+            <a:fld id="{8E09DF16-9352-46A7-97F1-1D13A8547ADD}" type="slidenum">
+              <a:rPr lang="en-US" smtClean="0"/>
+              <a:pPr>
+                <a:defRPr/>
+              </a:pPr>
+              <a:t>38</a:t>
+            </a:fld>
+            <a:endParaRPr lang="en-US"/>
+          </a:p>
+        </p:txBody>
+      </p:sp>
+    </p:spTree>
+    <p:extLst>
+      <p:ext uri="{BB962C8B-B14F-4D97-AF65-F5344CB8AC3E}">
+        <p14:creationId xmlns:p14="http://schemas.microsoft.com/office/powerpoint/2010/main" val="800163729"/>
+      </p:ext>
+    </p:extLst>
+  </p:cSld>
+  <p:clrMapOvr>
+    <a:masterClrMapping/>
+  </p:clrMapOvr>
+  <p:transition/>
+</p:sld>
+</file>
+
+<file path=ppt/slides/slide39.xml><?xml version="1.0" encoding="utf-8"?>
+<p:sld xmlns:a="http://schemas.openxmlformats.org/drawingml/2006/main" xmlns:r="http://schemas.openxmlformats.org/officeDocument/2006/relationships" xmlns:p="http://schemas.openxmlformats.org/presentationml/2006/main">
+  <p:cSld>
+    <p:spTree>
+      <p:nvGrpSpPr>
+        <p:cNvPr id="1" name=""/>
+        <p:cNvGrpSpPr/>
+        <p:nvPr/>
+      </p:nvGrpSpPr>
+      <p:grpSpPr>
+        <a:xfrm>
+          <a:off x="0" y="0"/>
+          <a:ext cx="0" cy="0"/>
+          <a:chOff x="0" y="0"/>
+          <a:chExt cx="0" cy="0"/>
+        </a:xfrm>
+      </p:grpSpPr>
+      <p:sp>
+        <p:nvSpPr>
+          <p:cNvPr id="23556" name="Rectangle 2"/>
+          <p:cNvSpPr>
+            <a:spLocks noGrp="1" noChangeArrowheads="1"/>
+          </p:cNvSpPr>
+          <p:nvPr>
+            <p:ph type="title"/>
+          </p:nvPr>
+        </p:nvSpPr>
+        <p:spPr>
+          <a:xfrm>
+            <a:off x="682752" y="114300"/>
+            <a:ext cx="7772400" cy="838200"/>
+          </a:xfrm>
+        </p:spPr>
+        <p:txBody>
+          <a:bodyPr/>
+          <a:lstStyle/>
+          <a:p>
+            <a:r>
+              <a:rPr lang="en-US" sz="3600" dirty="0"/>
+              <a:t>Translating this to execution jitter</a:t>
+            </a:r>
+          </a:p>
+        </p:txBody>
+      </p:sp>
+      <p:sp>
+        <p:nvSpPr>
+          <p:cNvPr id="23557" name="Rectangle 3"/>
+          <p:cNvSpPr>
+            <a:spLocks noGrp="1" noChangeArrowheads="1"/>
+          </p:cNvSpPr>
+          <p:nvPr>
+            <p:ph type="body" idx="1"/>
+          </p:nvPr>
+        </p:nvSpPr>
+        <p:spPr>
+          <a:xfrm>
+            <a:off x="228600" y="1295400"/>
+            <a:ext cx="8610600" cy="4953000"/>
+          </a:xfrm>
+        </p:spPr>
+        <p:txBody>
+          <a:bodyPr/>
+          <a:lstStyle/>
+          <a:p>
+            <a:pPr>
+              <a:lnSpc>
+                <a:spcPct val="90000"/>
+              </a:lnSpc>
+            </a:pPr>
+            <a:r>
+              <a:rPr lang="en-US" sz="2000" dirty="0">
+                <a:latin typeface="Arial" panose="020B0604020202020204" pitchFamily="34" charset="0"/>
+                <a:cs typeface="Arial" panose="020B0604020202020204" pitchFamily="34" charset="0"/>
+              </a:rPr>
+              <a:t>What we want to show is that the expected effort to “recreate” the machine state to successfully reproduce the execution jitter purporting to provide n bits of </a:t>
+            </a:r>
+            <a:r>
+              <a:rPr lang="en-US" sz="2000">
+                <a:latin typeface="Arial" panose="020B0604020202020204" pitchFamily="34" charset="0"/>
+                <a:cs typeface="Arial" panose="020B0604020202020204" pitchFamily="34" charset="0"/>
+              </a:rPr>
+              <a:t>entropy requires </a:t>
+            </a:r>
+            <a:r>
+              <a:rPr lang="en-US" sz="2000" dirty="0">
+                <a:latin typeface="Arial" panose="020B0604020202020204" pitchFamily="34" charset="0"/>
+                <a:cs typeface="Arial" panose="020B0604020202020204" pitchFamily="34" charset="0"/>
+              </a:rPr>
+              <a:t>2</a:t>
+            </a:r>
+            <a:r>
+              <a:rPr lang="en-US" sz="2000" baseline="30000" dirty="0">
+                <a:latin typeface="Arial" panose="020B0604020202020204" pitchFamily="34" charset="0"/>
+                <a:cs typeface="Arial" panose="020B0604020202020204" pitchFamily="34" charset="0"/>
+              </a:rPr>
+              <a:t>n</a:t>
+            </a:r>
+            <a:r>
+              <a:rPr lang="en-US" sz="2000" dirty="0">
+                <a:latin typeface="Arial" panose="020B0604020202020204" pitchFamily="34" charset="0"/>
+                <a:cs typeface="Arial" panose="020B0604020202020204" pitchFamily="34" charset="0"/>
+              </a:rPr>
+              <a:t> operations (this includes guesses or conditioning)</a:t>
+            </a:r>
+          </a:p>
+          <a:p>
+            <a:pPr>
+              <a:lnSpc>
+                <a:spcPct val="90000"/>
+              </a:lnSpc>
+            </a:pPr>
+            <a:r>
+              <a:rPr lang="en-US" sz="2000" dirty="0">
+                <a:latin typeface="Arial" panose="020B0604020202020204" pitchFamily="34" charset="0"/>
+                <a:cs typeface="Arial" panose="020B0604020202020204" pitchFamily="34" charset="0"/>
+              </a:rPr>
+              <a:t>How?</a:t>
+            </a:r>
+          </a:p>
+          <a:p>
+            <a:pPr lvl="1">
+              <a:lnSpc>
+                <a:spcPct val="90000"/>
+              </a:lnSpc>
+            </a:pPr>
+            <a:r>
+              <a:rPr lang="en-US" sz="2000" dirty="0">
+                <a:latin typeface="Arial" panose="020B0604020202020204" pitchFamily="34" charset="0"/>
+                <a:cs typeface="Arial" panose="020B0604020202020204" pitchFamily="34" charset="0"/>
+              </a:rPr>
+              <a:t>Reduction to scheduling problem (given actual physical jitter)</a:t>
+            </a:r>
+          </a:p>
+          <a:p>
+            <a:pPr lvl="1">
+              <a:lnSpc>
+                <a:spcPct val="90000"/>
+              </a:lnSpc>
+            </a:pPr>
+            <a:r>
+              <a:rPr lang="en-US" sz="2000" dirty="0">
+                <a:latin typeface="Arial" panose="020B0604020202020204" pitchFamily="34" charset="0"/>
+                <a:cs typeface="Arial" panose="020B0604020202020204" pitchFamily="34" charset="0"/>
+              </a:rPr>
+              <a:t>Thousands of bits of machine state contribute to producing the precise environment:</a:t>
+            </a:r>
+          </a:p>
+          <a:p>
+            <a:pPr lvl="2">
+              <a:lnSpc>
+                <a:spcPct val="90000"/>
+              </a:lnSpc>
+            </a:pPr>
+            <a:r>
+              <a:rPr lang="en-US" sz="1800" dirty="0">
+                <a:latin typeface="Arial" panose="020B0604020202020204" pitchFamily="34" charset="0"/>
+                <a:cs typeface="Arial" panose="020B0604020202020204" pitchFamily="34" charset="0"/>
+              </a:rPr>
+              <a:t>Cache state, TLB, branches, precise timing of board level interrupts and their affect on state, races that affect physical maps, microcode.</a:t>
+            </a:r>
+          </a:p>
+          <a:p>
+            <a:pPr lvl="2">
+              <a:lnSpc>
+                <a:spcPct val="90000"/>
+              </a:lnSpc>
+            </a:pPr>
+            <a:r>
+              <a:rPr lang="en-US" sz="1800" dirty="0">
+                <a:latin typeface="Arial" panose="020B0604020202020204" pitchFamily="34" charset="0"/>
+                <a:cs typeface="Arial" panose="020B0604020202020204" pitchFamily="34" charset="0"/>
+              </a:rPr>
+              <a:t>Not all internal state can be “set.” Some require reproducing execution traces and interrupts as well as full knowledge of all associated software affecting the platform and even data associated with the computation.</a:t>
+            </a:r>
+          </a:p>
+        </p:txBody>
+      </p:sp>
+      <p:sp>
+        <p:nvSpPr>
+          <p:cNvPr id="8" name="Slide Number Placeholder 7"/>
+          <p:cNvSpPr>
+            <a:spLocks noGrp="1"/>
+          </p:cNvSpPr>
+          <p:nvPr>
+            <p:ph type="sldNum" sz="quarter" idx="12"/>
+          </p:nvPr>
+        </p:nvSpPr>
+        <p:spPr/>
+        <p:txBody>
+          <a:bodyPr/>
+          <a:lstStyle/>
+          <a:p>
+            <a:pPr>
+              <a:defRPr/>
+            </a:pPr>
+            <a:fld id="{8E09DF16-9352-46A7-97F1-1D13A8547ADD}" type="slidenum">
+              <a:rPr lang="en-US" smtClean="0"/>
+              <a:pPr>
+                <a:defRPr/>
+              </a:pPr>
+              <a:t>39</a:t>
+            </a:fld>
+            <a:endParaRPr lang="en-US"/>
+          </a:p>
+        </p:txBody>
+      </p:sp>
+    </p:spTree>
+    <p:extLst>
+      <p:ext uri="{BB962C8B-B14F-4D97-AF65-F5344CB8AC3E}">
+        <p14:creationId xmlns:p14="http://schemas.microsoft.com/office/powerpoint/2010/main" val="1423581058"/>
       </p:ext>
     </p:extLst>
   </p:cSld>

</xml_diff>

<commit_message>
some interrupt and microarchitecture
</commit_message>
<xml_diff>
--- a/BerkeleyClass/CS290Spring2013/Lectures/entropy_talk.pptx
+++ b/BerkeleyClass/CS290Spring2013/Lectures/entropy_talk.pptx
@@ -5,10 +5,10 @@
     <p:sldMasterId id="2147483649" r:id="rId1"/>
   </p:sldMasterIdLst>
   <p:notesMasterIdLst>
-    <p:notesMasterId r:id="rId41"/>
+    <p:notesMasterId r:id="rId47"/>
   </p:notesMasterIdLst>
   <p:handoutMasterIdLst>
-    <p:handoutMasterId r:id="rId42"/>
+    <p:handoutMasterId r:id="rId48"/>
   </p:handoutMasterIdLst>
   <p:sldIdLst>
     <p:sldId id="3175" r:id="rId2"/>
@@ -50,6 +50,12 @@
     <p:sldId id="3804" r:id="rId38"/>
     <p:sldId id="3805" r:id="rId39"/>
     <p:sldId id="3806" r:id="rId40"/>
+    <p:sldId id="3808" r:id="rId41"/>
+    <p:sldId id="3811" r:id="rId42"/>
+    <p:sldId id="3809" r:id="rId43"/>
+    <p:sldId id="3812" r:id="rId44"/>
+    <p:sldId id="3807" r:id="rId45"/>
+    <p:sldId id="3810" r:id="rId46"/>
   </p:sldIdLst>
   <p:sldSz cx="9144000" cy="6858000" type="screen4x3"/>
   <p:notesSz cx="7010400" cy="9296400"/>
@@ -3805,6 +3811,406 @@
 </p:notes>
 </file>
 
+<file path=ppt/notesSlides/notesSlide36.xml><?xml version="1.0" encoding="utf-8"?>
+<p:notes xmlns:a="http://schemas.openxmlformats.org/drawingml/2006/main" xmlns:r="http://schemas.openxmlformats.org/officeDocument/2006/relationships" xmlns:p="http://schemas.openxmlformats.org/presentationml/2006/main">
+  <p:cSld>
+    <p:spTree>
+      <p:nvGrpSpPr>
+        <p:cNvPr id="1" name=""/>
+        <p:cNvGrpSpPr/>
+        <p:nvPr/>
+      </p:nvGrpSpPr>
+      <p:grpSpPr>
+        <a:xfrm>
+          <a:off x="0" y="0"/>
+          <a:ext cx="0" cy="0"/>
+          <a:chOff x="0" y="0"/>
+          <a:chExt cx="0" cy="0"/>
+        </a:xfrm>
+      </p:grpSpPr>
+      <p:sp>
+        <p:nvSpPr>
+          <p:cNvPr id="95234" name="Rectangle 7"/>
+          <p:cNvSpPr>
+            <a:spLocks noGrp="1" noChangeArrowheads="1"/>
+          </p:cNvSpPr>
+          <p:nvPr>
+            <p:ph type="sldNum" sz="quarter" idx="5"/>
+          </p:nvPr>
+        </p:nvSpPr>
+        <p:spPr>
+          <a:noFill/>
+        </p:spPr>
+        <p:txBody>
+          <a:bodyPr/>
+          <a:lstStyle/>
+          <a:p>
+            <a:fld id="{86016DC7-F49B-4F50-9A32-E9E9CFA38878}" type="slidenum">
+              <a:rPr lang="en-US" smtClean="0"/>
+              <a:pPr/>
+              <a:t>40</a:t>
+            </a:fld>
+            <a:endParaRPr lang="en-US"/>
+          </a:p>
+        </p:txBody>
+      </p:sp>
+      <p:sp>
+        <p:nvSpPr>
+          <p:cNvPr id="95235" name="Rectangle 2"/>
+          <p:cNvSpPr>
+            <a:spLocks noGrp="1" noRot="1" noChangeAspect="1" noChangeArrowheads="1" noTextEdit="1"/>
+          </p:cNvSpPr>
+          <p:nvPr>
+            <p:ph type="sldImg"/>
+          </p:nvPr>
+        </p:nvSpPr>
+        <p:spPr>
+          <a:xfrm>
+            <a:off x="1169988" y="687388"/>
+            <a:ext cx="4673600" cy="3505200"/>
+          </a:xfrm>
+          <a:ln/>
+        </p:spPr>
+      </p:sp>
+      <p:sp>
+        <p:nvSpPr>
+          <p:cNvPr id="95236" name="Rectangle 3"/>
+          <p:cNvSpPr>
+            <a:spLocks noGrp="1" noChangeArrowheads="1"/>
+          </p:cNvSpPr>
+          <p:nvPr>
+            <p:ph type="body" idx="1"/>
+          </p:nvPr>
+        </p:nvSpPr>
+        <p:spPr>
+          <a:xfrm>
+            <a:off x="914400" y="4421188"/>
+            <a:ext cx="5184775" cy="4191000"/>
+          </a:xfrm>
+          <a:noFill/>
+          <a:ln w="9525"/>
+        </p:spPr>
+        <p:txBody>
+          <a:bodyPr/>
+          <a:lstStyle/>
+          <a:p>
+            <a:endParaRPr lang="en-US"/>
+          </a:p>
+        </p:txBody>
+      </p:sp>
+    </p:spTree>
+    <p:extLst>
+      <p:ext uri="{BB962C8B-B14F-4D97-AF65-F5344CB8AC3E}">
+        <p14:creationId xmlns:p14="http://schemas.microsoft.com/office/powerpoint/2010/main" val="351177776"/>
+      </p:ext>
+    </p:extLst>
+  </p:cSld>
+  <p:clrMapOvr>
+    <a:masterClrMapping/>
+  </p:clrMapOvr>
+</p:notes>
+</file>
+
+<file path=ppt/notesSlides/notesSlide37.xml><?xml version="1.0" encoding="utf-8"?>
+<p:notes xmlns:a="http://schemas.openxmlformats.org/drawingml/2006/main" xmlns:r="http://schemas.openxmlformats.org/officeDocument/2006/relationships" xmlns:p="http://schemas.openxmlformats.org/presentationml/2006/main">
+  <p:cSld>
+    <p:spTree>
+      <p:nvGrpSpPr>
+        <p:cNvPr id="1" name=""/>
+        <p:cNvGrpSpPr/>
+        <p:nvPr/>
+      </p:nvGrpSpPr>
+      <p:grpSpPr>
+        <a:xfrm>
+          <a:off x="0" y="0"/>
+          <a:ext cx="0" cy="0"/>
+          <a:chOff x="0" y="0"/>
+          <a:chExt cx="0" cy="0"/>
+        </a:xfrm>
+      </p:grpSpPr>
+      <p:sp>
+        <p:nvSpPr>
+          <p:cNvPr id="95234" name="Rectangle 7"/>
+          <p:cNvSpPr>
+            <a:spLocks noGrp="1" noChangeArrowheads="1"/>
+          </p:cNvSpPr>
+          <p:nvPr>
+            <p:ph type="sldNum" sz="quarter" idx="5"/>
+          </p:nvPr>
+        </p:nvSpPr>
+        <p:spPr>
+          <a:noFill/>
+        </p:spPr>
+        <p:txBody>
+          <a:bodyPr/>
+          <a:lstStyle/>
+          <a:p>
+            <a:fld id="{86016DC7-F49B-4F50-9A32-E9E9CFA38878}" type="slidenum">
+              <a:rPr lang="en-US" smtClean="0"/>
+              <a:pPr/>
+              <a:t>41</a:t>
+            </a:fld>
+            <a:endParaRPr lang="en-US"/>
+          </a:p>
+        </p:txBody>
+      </p:sp>
+      <p:sp>
+        <p:nvSpPr>
+          <p:cNvPr id="95235" name="Rectangle 2"/>
+          <p:cNvSpPr>
+            <a:spLocks noGrp="1" noRot="1" noChangeAspect="1" noChangeArrowheads="1" noTextEdit="1"/>
+          </p:cNvSpPr>
+          <p:nvPr>
+            <p:ph type="sldImg"/>
+          </p:nvPr>
+        </p:nvSpPr>
+        <p:spPr>
+          <a:xfrm>
+            <a:off x="1169988" y="687388"/>
+            <a:ext cx="4673600" cy="3505200"/>
+          </a:xfrm>
+          <a:ln/>
+        </p:spPr>
+      </p:sp>
+      <p:sp>
+        <p:nvSpPr>
+          <p:cNvPr id="95236" name="Rectangle 3"/>
+          <p:cNvSpPr>
+            <a:spLocks noGrp="1" noChangeArrowheads="1"/>
+          </p:cNvSpPr>
+          <p:nvPr>
+            <p:ph type="body" idx="1"/>
+          </p:nvPr>
+        </p:nvSpPr>
+        <p:spPr>
+          <a:xfrm>
+            <a:off x="914400" y="4421188"/>
+            <a:ext cx="5184775" cy="4191000"/>
+          </a:xfrm>
+          <a:noFill/>
+          <a:ln w="9525"/>
+        </p:spPr>
+        <p:txBody>
+          <a:bodyPr/>
+          <a:lstStyle/>
+          <a:p>
+            <a:endParaRPr lang="en-US"/>
+          </a:p>
+        </p:txBody>
+      </p:sp>
+    </p:spTree>
+    <p:extLst>
+      <p:ext uri="{BB962C8B-B14F-4D97-AF65-F5344CB8AC3E}">
+        <p14:creationId xmlns:p14="http://schemas.microsoft.com/office/powerpoint/2010/main" val="1624951326"/>
+      </p:ext>
+    </p:extLst>
+  </p:cSld>
+  <p:clrMapOvr>
+    <a:masterClrMapping/>
+  </p:clrMapOvr>
+</p:notes>
+</file>
+
+<file path=ppt/notesSlides/notesSlide38.xml><?xml version="1.0" encoding="utf-8"?>
+<p:notes xmlns:a="http://schemas.openxmlformats.org/drawingml/2006/main" xmlns:r="http://schemas.openxmlformats.org/officeDocument/2006/relationships" xmlns:p="http://schemas.openxmlformats.org/presentationml/2006/main">
+  <p:cSld>
+    <p:spTree>
+      <p:nvGrpSpPr>
+        <p:cNvPr id="1" name=""/>
+        <p:cNvGrpSpPr/>
+        <p:nvPr/>
+      </p:nvGrpSpPr>
+      <p:grpSpPr>
+        <a:xfrm>
+          <a:off x="0" y="0"/>
+          <a:ext cx="0" cy="0"/>
+          <a:chOff x="0" y="0"/>
+          <a:chExt cx="0" cy="0"/>
+        </a:xfrm>
+      </p:grpSpPr>
+      <p:sp>
+        <p:nvSpPr>
+          <p:cNvPr id="95234" name="Rectangle 7"/>
+          <p:cNvSpPr>
+            <a:spLocks noGrp="1" noChangeArrowheads="1"/>
+          </p:cNvSpPr>
+          <p:nvPr>
+            <p:ph type="sldNum" sz="quarter" idx="5"/>
+          </p:nvPr>
+        </p:nvSpPr>
+        <p:spPr>
+          <a:noFill/>
+        </p:spPr>
+        <p:txBody>
+          <a:bodyPr/>
+          <a:lstStyle/>
+          <a:p>
+            <a:fld id="{86016DC7-F49B-4F50-9A32-E9E9CFA38878}" type="slidenum">
+              <a:rPr lang="en-US" smtClean="0"/>
+              <a:pPr/>
+              <a:t>42</a:t>
+            </a:fld>
+            <a:endParaRPr lang="en-US"/>
+          </a:p>
+        </p:txBody>
+      </p:sp>
+      <p:sp>
+        <p:nvSpPr>
+          <p:cNvPr id="95235" name="Rectangle 2"/>
+          <p:cNvSpPr>
+            <a:spLocks noGrp="1" noRot="1" noChangeAspect="1" noChangeArrowheads="1" noTextEdit="1"/>
+          </p:cNvSpPr>
+          <p:nvPr>
+            <p:ph type="sldImg"/>
+          </p:nvPr>
+        </p:nvSpPr>
+        <p:spPr>
+          <a:xfrm>
+            <a:off x="1169988" y="687388"/>
+            <a:ext cx="4673600" cy="3505200"/>
+          </a:xfrm>
+          <a:ln/>
+        </p:spPr>
+      </p:sp>
+      <p:sp>
+        <p:nvSpPr>
+          <p:cNvPr id="95236" name="Rectangle 3"/>
+          <p:cNvSpPr>
+            <a:spLocks noGrp="1" noChangeArrowheads="1"/>
+          </p:cNvSpPr>
+          <p:nvPr>
+            <p:ph type="body" idx="1"/>
+          </p:nvPr>
+        </p:nvSpPr>
+        <p:spPr>
+          <a:xfrm>
+            <a:off x="914400" y="4421188"/>
+            <a:ext cx="5184775" cy="4191000"/>
+          </a:xfrm>
+          <a:noFill/>
+          <a:ln w="9525"/>
+        </p:spPr>
+        <p:txBody>
+          <a:bodyPr/>
+          <a:lstStyle/>
+          <a:p>
+            <a:endParaRPr lang="en-US"/>
+          </a:p>
+        </p:txBody>
+      </p:sp>
+    </p:spTree>
+    <p:extLst>
+      <p:ext uri="{BB962C8B-B14F-4D97-AF65-F5344CB8AC3E}">
+        <p14:creationId xmlns:p14="http://schemas.microsoft.com/office/powerpoint/2010/main" val="491209556"/>
+      </p:ext>
+    </p:extLst>
+  </p:cSld>
+  <p:clrMapOvr>
+    <a:masterClrMapping/>
+  </p:clrMapOvr>
+</p:notes>
+</file>
+
+<file path=ppt/notesSlides/notesSlide39.xml><?xml version="1.0" encoding="utf-8"?>
+<p:notes xmlns:a="http://schemas.openxmlformats.org/drawingml/2006/main" xmlns:r="http://schemas.openxmlformats.org/officeDocument/2006/relationships" xmlns:p="http://schemas.openxmlformats.org/presentationml/2006/main">
+  <p:cSld>
+    <p:spTree>
+      <p:nvGrpSpPr>
+        <p:cNvPr id="1" name=""/>
+        <p:cNvGrpSpPr/>
+        <p:nvPr/>
+      </p:nvGrpSpPr>
+      <p:grpSpPr>
+        <a:xfrm>
+          <a:off x="0" y="0"/>
+          <a:ext cx="0" cy="0"/>
+          <a:chOff x="0" y="0"/>
+          <a:chExt cx="0" cy="0"/>
+        </a:xfrm>
+      </p:grpSpPr>
+      <p:sp>
+        <p:nvSpPr>
+          <p:cNvPr id="95234" name="Rectangle 7"/>
+          <p:cNvSpPr>
+            <a:spLocks noGrp="1" noChangeArrowheads="1"/>
+          </p:cNvSpPr>
+          <p:nvPr>
+            <p:ph type="sldNum" sz="quarter" idx="5"/>
+          </p:nvPr>
+        </p:nvSpPr>
+        <p:spPr>
+          <a:noFill/>
+        </p:spPr>
+        <p:txBody>
+          <a:bodyPr/>
+          <a:lstStyle/>
+          <a:p>
+            <a:fld id="{86016DC7-F49B-4F50-9A32-E9E9CFA38878}" type="slidenum">
+              <a:rPr lang="en-US" smtClean="0"/>
+              <a:pPr/>
+              <a:t>43</a:t>
+            </a:fld>
+            <a:endParaRPr lang="en-US"/>
+          </a:p>
+        </p:txBody>
+      </p:sp>
+      <p:sp>
+        <p:nvSpPr>
+          <p:cNvPr id="95235" name="Rectangle 2"/>
+          <p:cNvSpPr>
+            <a:spLocks noGrp="1" noRot="1" noChangeAspect="1" noChangeArrowheads="1" noTextEdit="1"/>
+          </p:cNvSpPr>
+          <p:nvPr>
+            <p:ph type="sldImg"/>
+          </p:nvPr>
+        </p:nvSpPr>
+        <p:spPr>
+          <a:xfrm>
+            <a:off x="1169988" y="687388"/>
+            <a:ext cx="4673600" cy="3505200"/>
+          </a:xfrm>
+          <a:ln/>
+        </p:spPr>
+      </p:sp>
+      <p:sp>
+        <p:nvSpPr>
+          <p:cNvPr id="95236" name="Rectangle 3"/>
+          <p:cNvSpPr>
+            <a:spLocks noGrp="1" noChangeArrowheads="1"/>
+          </p:cNvSpPr>
+          <p:nvPr>
+            <p:ph type="body" idx="1"/>
+          </p:nvPr>
+        </p:nvSpPr>
+        <p:spPr>
+          <a:xfrm>
+            <a:off x="914400" y="4421188"/>
+            <a:ext cx="5184775" cy="4191000"/>
+          </a:xfrm>
+          <a:noFill/>
+          <a:ln w="9525"/>
+        </p:spPr>
+        <p:txBody>
+          <a:bodyPr/>
+          <a:lstStyle/>
+          <a:p>
+            <a:endParaRPr lang="en-US"/>
+          </a:p>
+        </p:txBody>
+      </p:sp>
+    </p:spTree>
+    <p:extLst>
+      <p:ext uri="{BB962C8B-B14F-4D97-AF65-F5344CB8AC3E}">
+        <p14:creationId xmlns:p14="http://schemas.microsoft.com/office/powerpoint/2010/main" val="1897063154"/>
+      </p:ext>
+    </p:extLst>
+  </p:cSld>
+  <p:clrMapOvr>
+    <a:masterClrMapping/>
+  </p:clrMapOvr>
+</p:notes>
+</file>
+
 <file path=ppt/notesSlides/notesSlide4.xml><?xml version="1.0" encoding="utf-8"?>
 <p:notes xmlns:a="http://schemas.openxmlformats.org/drawingml/2006/main" xmlns:r="http://schemas.openxmlformats.org/officeDocument/2006/relationships" xmlns:p="http://schemas.openxmlformats.org/presentationml/2006/main">
   <p:cSld>
@@ -3896,6 +4302,206 @@
     <p:extLst>
       <p:ext uri="{BB962C8B-B14F-4D97-AF65-F5344CB8AC3E}">
         <p14:creationId xmlns:p14="http://schemas.microsoft.com/office/powerpoint/2010/main" val="2070332326"/>
+      </p:ext>
+    </p:extLst>
+  </p:cSld>
+  <p:clrMapOvr>
+    <a:masterClrMapping/>
+  </p:clrMapOvr>
+</p:notes>
+</file>
+
+<file path=ppt/notesSlides/notesSlide40.xml><?xml version="1.0" encoding="utf-8"?>
+<p:notes xmlns:a="http://schemas.openxmlformats.org/drawingml/2006/main" xmlns:r="http://schemas.openxmlformats.org/officeDocument/2006/relationships" xmlns:p="http://schemas.openxmlformats.org/presentationml/2006/main">
+  <p:cSld>
+    <p:spTree>
+      <p:nvGrpSpPr>
+        <p:cNvPr id="1" name=""/>
+        <p:cNvGrpSpPr/>
+        <p:nvPr/>
+      </p:nvGrpSpPr>
+      <p:grpSpPr>
+        <a:xfrm>
+          <a:off x="0" y="0"/>
+          <a:ext cx="0" cy="0"/>
+          <a:chOff x="0" y="0"/>
+          <a:chExt cx="0" cy="0"/>
+        </a:xfrm>
+      </p:grpSpPr>
+      <p:sp>
+        <p:nvSpPr>
+          <p:cNvPr id="95234" name="Rectangle 7"/>
+          <p:cNvSpPr>
+            <a:spLocks noGrp="1" noChangeArrowheads="1"/>
+          </p:cNvSpPr>
+          <p:nvPr>
+            <p:ph type="sldNum" sz="quarter" idx="5"/>
+          </p:nvPr>
+        </p:nvSpPr>
+        <p:spPr>
+          <a:noFill/>
+        </p:spPr>
+        <p:txBody>
+          <a:bodyPr/>
+          <a:lstStyle/>
+          <a:p>
+            <a:fld id="{86016DC7-F49B-4F50-9A32-E9E9CFA38878}" type="slidenum">
+              <a:rPr lang="en-US" smtClean="0"/>
+              <a:pPr/>
+              <a:t>44</a:t>
+            </a:fld>
+            <a:endParaRPr lang="en-US"/>
+          </a:p>
+        </p:txBody>
+      </p:sp>
+      <p:sp>
+        <p:nvSpPr>
+          <p:cNvPr id="95235" name="Rectangle 2"/>
+          <p:cNvSpPr>
+            <a:spLocks noGrp="1" noRot="1" noChangeAspect="1" noChangeArrowheads="1" noTextEdit="1"/>
+          </p:cNvSpPr>
+          <p:nvPr>
+            <p:ph type="sldImg"/>
+          </p:nvPr>
+        </p:nvSpPr>
+        <p:spPr>
+          <a:xfrm>
+            <a:off x="1169988" y="687388"/>
+            <a:ext cx="4673600" cy="3505200"/>
+          </a:xfrm>
+          <a:ln/>
+        </p:spPr>
+      </p:sp>
+      <p:sp>
+        <p:nvSpPr>
+          <p:cNvPr id="95236" name="Rectangle 3"/>
+          <p:cNvSpPr>
+            <a:spLocks noGrp="1" noChangeArrowheads="1"/>
+          </p:cNvSpPr>
+          <p:nvPr>
+            <p:ph type="body" idx="1"/>
+          </p:nvPr>
+        </p:nvSpPr>
+        <p:spPr>
+          <a:xfrm>
+            <a:off x="914400" y="4421188"/>
+            <a:ext cx="5184775" cy="4191000"/>
+          </a:xfrm>
+          <a:noFill/>
+          <a:ln w="9525"/>
+        </p:spPr>
+        <p:txBody>
+          <a:bodyPr/>
+          <a:lstStyle/>
+          <a:p>
+            <a:endParaRPr lang="en-US"/>
+          </a:p>
+        </p:txBody>
+      </p:sp>
+    </p:spTree>
+    <p:extLst>
+      <p:ext uri="{BB962C8B-B14F-4D97-AF65-F5344CB8AC3E}">
+        <p14:creationId xmlns:p14="http://schemas.microsoft.com/office/powerpoint/2010/main" val="3196520579"/>
+      </p:ext>
+    </p:extLst>
+  </p:cSld>
+  <p:clrMapOvr>
+    <a:masterClrMapping/>
+  </p:clrMapOvr>
+</p:notes>
+</file>
+
+<file path=ppt/notesSlides/notesSlide41.xml><?xml version="1.0" encoding="utf-8"?>
+<p:notes xmlns:a="http://schemas.openxmlformats.org/drawingml/2006/main" xmlns:r="http://schemas.openxmlformats.org/officeDocument/2006/relationships" xmlns:p="http://schemas.openxmlformats.org/presentationml/2006/main">
+  <p:cSld>
+    <p:spTree>
+      <p:nvGrpSpPr>
+        <p:cNvPr id="1" name=""/>
+        <p:cNvGrpSpPr/>
+        <p:nvPr/>
+      </p:nvGrpSpPr>
+      <p:grpSpPr>
+        <a:xfrm>
+          <a:off x="0" y="0"/>
+          <a:ext cx="0" cy="0"/>
+          <a:chOff x="0" y="0"/>
+          <a:chExt cx="0" cy="0"/>
+        </a:xfrm>
+      </p:grpSpPr>
+      <p:sp>
+        <p:nvSpPr>
+          <p:cNvPr id="95234" name="Rectangle 7"/>
+          <p:cNvSpPr>
+            <a:spLocks noGrp="1" noChangeArrowheads="1"/>
+          </p:cNvSpPr>
+          <p:nvPr>
+            <p:ph type="sldNum" sz="quarter" idx="5"/>
+          </p:nvPr>
+        </p:nvSpPr>
+        <p:spPr>
+          <a:noFill/>
+        </p:spPr>
+        <p:txBody>
+          <a:bodyPr/>
+          <a:lstStyle/>
+          <a:p>
+            <a:fld id="{86016DC7-F49B-4F50-9A32-E9E9CFA38878}" type="slidenum">
+              <a:rPr lang="en-US" smtClean="0"/>
+              <a:pPr/>
+              <a:t>45</a:t>
+            </a:fld>
+            <a:endParaRPr lang="en-US"/>
+          </a:p>
+        </p:txBody>
+      </p:sp>
+      <p:sp>
+        <p:nvSpPr>
+          <p:cNvPr id="95235" name="Rectangle 2"/>
+          <p:cNvSpPr>
+            <a:spLocks noGrp="1" noRot="1" noChangeAspect="1" noChangeArrowheads="1" noTextEdit="1"/>
+          </p:cNvSpPr>
+          <p:nvPr>
+            <p:ph type="sldImg"/>
+          </p:nvPr>
+        </p:nvSpPr>
+        <p:spPr>
+          <a:xfrm>
+            <a:off x="1169988" y="687388"/>
+            <a:ext cx="4673600" cy="3505200"/>
+          </a:xfrm>
+          <a:ln/>
+        </p:spPr>
+      </p:sp>
+      <p:sp>
+        <p:nvSpPr>
+          <p:cNvPr id="95236" name="Rectangle 3"/>
+          <p:cNvSpPr>
+            <a:spLocks noGrp="1" noChangeArrowheads="1"/>
+          </p:cNvSpPr>
+          <p:nvPr>
+            <p:ph type="body" idx="1"/>
+          </p:nvPr>
+        </p:nvSpPr>
+        <p:spPr>
+          <a:xfrm>
+            <a:off x="914400" y="4421188"/>
+            <a:ext cx="5184775" cy="4191000"/>
+          </a:xfrm>
+          <a:noFill/>
+          <a:ln w="9525"/>
+        </p:spPr>
+        <p:txBody>
+          <a:bodyPr/>
+          <a:lstStyle/>
+          <a:p>
+            <a:endParaRPr lang="en-US"/>
+          </a:p>
+        </p:txBody>
+      </p:sp>
+    </p:spTree>
+    <p:extLst>
+      <p:ext uri="{BB962C8B-B14F-4D97-AF65-F5344CB8AC3E}">
+        <p14:creationId xmlns:p14="http://schemas.microsoft.com/office/powerpoint/2010/main" val="1296706833"/>
       </p:ext>
     </p:extLst>
   </p:cSld>
@@ -20723,6 +21329,3367 @@
 </p:sld>
 </file>
 
+<file path=ppt/slides/slide40.xml><?xml version="1.0" encoding="utf-8"?>
+<p:sld xmlns:a="http://schemas.openxmlformats.org/drawingml/2006/main" xmlns:r="http://schemas.openxmlformats.org/officeDocument/2006/relationships" xmlns:p="http://schemas.openxmlformats.org/presentationml/2006/main">
+  <p:cSld>
+    <p:spTree>
+      <p:nvGrpSpPr>
+        <p:cNvPr id="1" name=""/>
+        <p:cNvGrpSpPr/>
+        <p:nvPr/>
+      </p:nvGrpSpPr>
+      <p:grpSpPr>
+        <a:xfrm>
+          <a:off x="0" y="0"/>
+          <a:ext cx="0" cy="0"/>
+          <a:chOff x="0" y="0"/>
+          <a:chExt cx="0" cy="0"/>
+        </a:xfrm>
+      </p:grpSpPr>
+      <p:sp>
+        <p:nvSpPr>
+          <p:cNvPr id="23556" name="Rectangle 2"/>
+          <p:cNvSpPr>
+            <a:spLocks noGrp="1" noChangeArrowheads="1"/>
+          </p:cNvSpPr>
+          <p:nvPr>
+            <p:ph type="title"/>
+          </p:nvPr>
+        </p:nvSpPr>
+        <p:spPr>
+          <a:xfrm>
+            <a:off x="682752" y="114300"/>
+            <a:ext cx="7772400" cy="838200"/>
+          </a:xfrm>
+        </p:spPr>
+        <p:txBody>
+          <a:bodyPr/>
+          <a:lstStyle/>
+          <a:p>
+            <a:r>
+              <a:rPr lang="en-US" sz="3600" dirty="0"/>
+              <a:t>Machine state (Intel x64)</a:t>
+            </a:r>
+          </a:p>
+        </p:txBody>
+      </p:sp>
+      <p:sp>
+        <p:nvSpPr>
+          <p:cNvPr id="23557" name="Rectangle 3"/>
+          <p:cNvSpPr>
+            <a:spLocks noGrp="1" noChangeArrowheads="1"/>
+          </p:cNvSpPr>
+          <p:nvPr>
+            <p:ph type="body" idx="1"/>
+          </p:nvPr>
+        </p:nvSpPr>
+        <p:spPr>
+          <a:xfrm>
+            <a:off x="304800" y="2095500"/>
+            <a:ext cx="2743200" cy="2667000"/>
+          </a:xfrm>
+        </p:spPr>
+        <p:txBody>
+          <a:bodyPr/>
+          <a:lstStyle/>
+          <a:p>
+            <a:pPr lvl="0"/>
+            <a:r>
+              <a:rPr lang="en-US" sz="2000" dirty="0"/>
+              <a:t>x</a:t>
+            </a:r>
+            <a:endParaRPr lang="en-US" sz="2000" dirty="0">
+              <a:latin typeface="Arial" panose="020B0604020202020204" pitchFamily="34" charset="0"/>
+              <a:cs typeface="Arial" panose="020B0604020202020204" pitchFamily="34" charset="0"/>
+            </a:endParaRPr>
+          </a:p>
+        </p:txBody>
+      </p:sp>
+      <p:sp>
+        <p:nvSpPr>
+          <p:cNvPr id="8" name="Slide Number Placeholder 7"/>
+          <p:cNvSpPr>
+            <a:spLocks noGrp="1"/>
+          </p:cNvSpPr>
+          <p:nvPr>
+            <p:ph type="sldNum" sz="quarter" idx="12"/>
+          </p:nvPr>
+        </p:nvSpPr>
+        <p:spPr/>
+        <p:txBody>
+          <a:bodyPr/>
+          <a:lstStyle/>
+          <a:p>
+            <a:pPr>
+              <a:defRPr/>
+            </a:pPr>
+            <a:fld id="{8E09DF16-9352-46A7-97F1-1D13A8547ADD}" type="slidenum">
+              <a:rPr lang="en-US" smtClean="0"/>
+              <a:pPr>
+                <a:defRPr/>
+              </a:pPr>
+              <a:t>40</a:t>
+            </a:fld>
+            <a:endParaRPr lang="en-US"/>
+          </a:p>
+        </p:txBody>
+      </p:sp>
+      <p:sp>
+        <p:nvSpPr>
+          <p:cNvPr id="2" name="Rectangle 2">
+            <a:extLst>
+              <a:ext uri="{FF2B5EF4-FFF2-40B4-BE49-F238E27FC236}">
+                <a16:creationId xmlns:a16="http://schemas.microsoft.com/office/drawing/2014/main" id="{C0D3418F-80B0-844C-8418-6CC7A95790AB}"/>
+              </a:ext>
+            </a:extLst>
+          </p:cNvPr>
+          <p:cNvSpPr>
+            <a:spLocks noChangeArrowheads="1"/>
+          </p:cNvSpPr>
+          <p:nvPr/>
+        </p:nvSpPr>
+        <p:spPr bwMode="auto">
+          <a:xfrm>
+            <a:off x="0" y="0"/>
+            <a:ext cx="9144000" cy="0"/>
+          </a:xfrm>
+          <a:prstGeom prst="rect">
+            <a:avLst/>
+          </a:prstGeom>
+          <a:noFill/>
+          <a:ln>
+            <a:noFill/>
+          </a:ln>
+          <a:effectLst/>
+          <a:extLst>
+            <a:ext uri="{909E8E84-426E-40DD-AFC4-6F175D3DCCD1}">
+              <a14:hiddenFill xmlns:a14="http://schemas.microsoft.com/office/drawing/2010/main">
+                <a:solidFill>
+                  <a:schemeClr val="accent1"/>
+                </a:solidFill>
+              </a14:hiddenFill>
+            </a:ext>
+            <a:ext uri="{91240B29-F687-4F45-9708-019B960494DF}">
+              <a14:hiddenLine xmlns:a14="http://schemas.microsoft.com/office/drawing/2010/main" w="9525">
+                <a:solidFill>
+                  <a:schemeClr val="tx1"/>
+                </a:solidFill>
+                <a:miter lim="800000"/>
+                <a:headEnd/>
+                <a:tailEnd/>
+              </a14:hiddenLine>
+            </a:ext>
+            <a:ext uri="{AF507438-7753-43E0-B8FC-AC1667EBCBE1}">
+              <a14:hiddenEffects xmlns:a14="http://schemas.microsoft.com/office/drawing/2010/main">
+                <a:effectLst>
+                  <a:outerShdw dist="35921" dir="2700000" algn="ctr" rotWithShape="0">
+                    <a:schemeClr val="bg2"/>
+                  </a:outerShdw>
+                </a:effectLst>
+              </a14:hiddenEffects>
+            </a:ext>
+          </a:extLst>
+        </p:spPr>
+        <p:txBody>
+          <a:bodyPr vert="horz" wrap="none" lIns="91440" tIns="45720" rIns="91440" bIns="45720" numCol="1" anchor="ctr" anchorCtr="0" compatLnSpc="1">
+            <a:prstTxWarp prst="textNoShape">
+              <a:avLst/>
+            </a:prstTxWarp>
+            <a:spAutoFit/>
+          </a:bodyPr>
+          <a:lstStyle/>
+          <a:p>
+            <a:endParaRPr lang="en-US"/>
+          </a:p>
+        </p:txBody>
+      </p:sp>
+      <p:sp>
+        <p:nvSpPr>
+          <p:cNvPr id="3" name="Rectangle 4">
+            <a:extLst>
+              <a:ext uri="{FF2B5EF4-FFF2-40B4-BE49-F238E27FC236}">
+                <a16:creationId xmlns:a16="http://schemas.microsoft.com/office/drawing/2014/main" id="{5B22B34C-3652-FE4D-8A82-402D5A71DE64}"/>
+              </a:ext>
+            </a:extLst>
+          </p:cNvPr>
+          <p:cNvSpPr>
+            <a:spLocks noChangeArrowheads="1"/>
+          </p:cNvSpPr>
+          <p:nvPr/>
+        </p:nvSpPr>
+        <p:spPr bwMode="auto">
+          <a:xfrm>
+            <a:off x="0" y="0"/>
+            <a:ext cx="9144000" cy="0"/>
+          </a:xfrm>
+          <a:prstGeom prst="rect">
+            <a:avLst/>
+          </a:prstGeom>
+          <a:noFill/>
+          <a:ln>
+            <a:noFill/>
+          </a:ln>
+          <a:effectLst/>
+          <a:extLst>
+            <a:ext uri="{909E8E84-426E-40DD-AFC4-6F175D3DCCD1}">
+              <a14:hiddenFill xmlns:a14="http://schemas.microsoft.com/office/drawing/2010/main">
+                <a:solidFill>
+                  <a:schemeClr val="accent1"/>
+                </a:solidFill>
+              </a14:hiddenFill>
+            </a:ext>
+            <a:ext uri="{91240B29-F687-4F45-9708-019B960494DF}">
+              <a14:hiddenLine xmlns:a14="http://schemas.microsoft.com/office/drawing/2010/main" w="9525">
+                <a:solidFill>
+                  <a:schemeClr val="tx1"/>
+                </a:solidFill>
+                <a:miter lim="800000"/>
+                <a:headEnd/>
+                <a:tailEnd/>
+              </a14:hiddenLine>
+            </a:ext>
+            <a:ext uri="{AF507438-7753-43E0-B8FC-AC1667EBCBE1}">
+              <a14:hiddenEffects xmlns:a14="http://schemas.microsoft.com/office/drawing/2010/main">
+                <a:effectLst>
+                  <a:outerShdw dist="35921" dir="2700000" algn="ctr" rotWithShape="0">
+                    <a:schemeClr val="bg2"/>
+                  </a:outerShdw>
+                </a:effectLst>
+              </a14:hiddenEffects>
+            </a:ext>
+          </a:extLst>
+        </p:spPr>
+        <p:txBody>
+          <a:bodyPr vert="horz" wrap="none" lIns="91440" tIns="45720" rIns="91440" bIns="45720" numCol="1" anchor="ctr" anchorCtr="0" compatLnSpc="1">
+            <a:prstTxWarp prst="textNoShape">
+              <a:avLst/>
+            </a:prstTxWarp>
+            <a:spAutoFit/>
+          </a:bodyPr>
+          <a:lstStyle/>
+          <a:p>
+            <a:endParaRPr lang="en-US"/>
+          </a:p>
+        </p:txBody>
+      </p:sp>
+      <p:pic>
+        <p:nvPicPr>
+          <p:cNvPr id="9" name="Picture 8" descr="Diagram, timeline&#10;&#10;Description automatically generated">
+            <a:extLst>
+              <a:ext uri="{FF2B5EF4-FFF2-40B4-BE49-F238E27FC236}">
+                <a16:creationId xmlns:a16="http://schemas.microsoft.com/office/drawing/2014/main" id="{D958CABD-EC22-2241-BD8B-D26D3A0D337E}"/>
+              </a:ext>
+            </a:extLst>
+          </p:cNvPr>
+          <p:cNvPicPr/>
+          <p:nvPr/>
+        </p:nvPicPr>
+        <p:blipFill>
+          <a:blip r:embed="rId3">
+            <a:extLst>
+              <a:ext uri="{28A0092B-C50C-407E-A947-70E740481C1C}">
+                <a14:useLocalDpi xmlns:a14="http://schemas.microsoft.com/office/drawing/2010/main" val="0"/>
+              </a:ext>
+            </a:extLst>
+          </a:blip>
+          <a:stretch>
+            <a:fillRect/>
+          </a:stretch>
+        </p:blipFill>
+        <p:spPr>
+          <a:xfrm>
+            <a:off x="2490675" y="1064260"/>
+            <a:ext cx="5943600" cy="4803140"/>
+          </a:xfrm>
+          <a:prstGeom prst="rect">
+            <a:avLst/>
+          </a:prstGeom>
+        </p:spPr>
+      </p:pic>
+    </p:spTree>
+    <p:extLst>
+      <p:ext uri="{BB962C8B-B14F-4D97-AF65-F5344CB8AC3E}">
+        <p14:creationId xmlns:p14="http://schemas.microsoft.com/office/powerpoint/2010/main" val="205336496"/>
+      </p:ext>
+    </p:extLst>
+  </p:cSld>
+  <p:clrMapOvr>
+    <a:masterClrMapping/>
+  </p:clrMapOvr>
+  <p:transition/>
+</p:sld>
+</file>
+
+<file path=ppt/slides/slide41.xml><?xml version="1.0" encoding="utf-8"?>
+<p:sld xmlns:a="http://schemas.openxmlformats.org/drawingml/2006/main" xmlns:r="http://schemas.openxmlformats.org/officeDocument/2006/relationships" xmlns:p="http://schemas.openxmlformats.org/presentationml/2006/main">
+  <p:cSld>
+    <p:spTree>
+      <p:nvGrpSpPr>
+        <p:cNvPr id="1" name=""/>
+        <p:cNvGrpSpPr/>
+        <p:nvPr/>
+      </p:nvGrpSpPr>
+      <p:grpSpPr>
+        <a:xfrm>
+          <a:off x="0" y="0"/>
+          <a:ext cx="0" cy="0"/>
+          <a:chOff x="0" y="0"/>
+          <a:chExt cx="0" cy="0"/>
+        </a:xfrm>
+      </p:grpSpPr>
+      <p:sp>
+        <p:nvSpPr>
+          <p:cNvPr id="23556" name="Rectangle 2"/>
+          <p:cNvSpPr>
+            <a:spLocks noGrp="1" noChangeArrowheads="1"/>
+          </p:cNvSpPr>
+          <p:nvPr>
+            <p:ph type="title"/>
+          </p:nvPr>
+        </p:nvSpPr>
+        <p:spPr>
+          <a:xfrm>
+            <a:off x="682752" y="-76200"/>
+            <a:ext cx="7772400" cy="838200"/>
+          </a:xfrm>
+        </p:spPr>
+        <p:txBody>
+          <a:bodyPr/>
+          <a:lstStyle/>
+          <a:p>
+            <a:r>
+              <a:rPr lang="en-US" sz="3600" dirty="0"/>
+              <a:t>Machine state (Intel x64)</a:t>
+            </a:r>
+          </a:p>
+        </p:txBody>
+      </p:sp>
+      <p:sp>
+        <p:nvSpPr>
+          <p:cNvPr id="8" name="Slide Number Placeholder 7"/>
+          <p:cNvSpPr>
+            <a:spLocks noGrp="1"/>
+          </p:cNvSpPr>
+          <p:nvPr>
+            <p:ph type="sldNum" sz="quarter" idx="12"/>
+          </p:nvPr>
+        </p:nvSpPr>
+        <p:spPr/>
+        <p:txBody>
+          <a:bodyPr/>
+          <a:lstStyle/>
+          <a:p>
+            <a:pPr>
+              <a:defRPr/>
+            </a:pPr>
+            <a:fld id="{8E09DF16-9352-46A7-97F1-1D13A8547ADD}" type="slidenum">
+              <a:rPr lang="en-US" smtClean="0"/>
+              <a:pPr>
+                <a:defRPr/>
+              </a:pPr>
+              <a:t>41</a:t>
+            </a:fld>
+            <a:endParaRPr lang="en-US"/>
+          </a:p>
+        </p:txBody>
+      </p:sp>
+      <p:sp>
+        <p:nvSpPr>
+          <p:cNvPr id="2" name="Rectangle 2">
+            <a:extLst>
+              <a:ext uri="{FF2B5EF4-FFF2-40B4-BE49-F238E27FC236}">
+                <a16:creationId xmlns:a16="http://schemas.microsoft.com/office/drawing/2014/main" id="{C0D3418F-80B0-844C-8418-6CC7A95790AB}"/>
+              </a:ext>
+            </a:extLst>
+          </p:cNvPr>
+          <p:cNvSpPr>
+            <a:spLocks noChangeArrowheads="1"/>
+          </p:cNvSpPr>
+          <p:nvPr/>
+        </p:nvSpPr>
+        <p:spPr bwMode="auto">
+          <a:xfrm>
+            <a:off x="0" y="0"/>
+            <a:ext cx="9144000" cy="0"/>
+          </a:xfrm>
+          <a:prstGeom prst="rect">
+            <a:avLst/>
+          </a:prstGeom>
+          <a:noFill/>
+          <a:ln>
+            <a:noFill/>
+          </a:ln>
+          <a:effectLst/>
+          <a:extLst>
+            <a:ext uri="{909E8E84-426E-40DD-AFC4-6F175D3DCCD1}">
+              <a14:hiddenFill xmlns:a14="http://schemas.microsoft.com/office/drawing/2010/main">
+                <a:solidFill>
+                  <a:schemeClr val="accent1"/>
+                </a:solidFill>
+              </a14:hiddenFill>
+            </a:ext>
+            <a:ext uri="{91240B29-F687-4F45-9708-019B960494DF}">
+              <a14:hiddenLine xmlns:a14="http://schemas.microsoft.com/office/drawing/2010/main" w="9525">
+                <a:solidFill>
+                  <a:schemeClr val="tx1"/>
+                </a:solidFill>
+                <a:miter lim="800000"/>
+                <a:headEnd/>
+                <a:tailEnd/>
+              </a14:hiddenLine>
+            </a:ext>
+            <a:ext uri="{AF507438-7753-43E0-B8FC-AC1667EBCBE1}">
+              <a14:hiddenEffects xmlns:a14="http://schemas.microsoft.com/office/drawing/2010/main">
+                <a:effectLst>
+                  <a:outerShdw dist="35921" dir="2700000" algn="ctr" rotWithShape="0">
+                    <a:schemeClr val="bg2"/>
+                  </a:outerShdw>
+                </a:effectLst>
+              </a14:hiddenEffects>
+            </a:ext>
+          </a:extLst>
+        </p:spPr>
+        <p:txBody>
+          <a:bodyPr vert="horz" wrap="none" lIns="91440" tIns="45720" rIns="91440" bIns="45720" numCol="1" anchor="ctr" anchorCtr="0" compatLnSpc="1">
+            <a:prstTxWarp prst="textNoShape">
+              <a:avLst/>
+            </a:prstTxWarp>
+            <a:spAutoFit/>
+          </a:bodyPr>
+          <a:lstStyle/>
+          <a:p>
+            <a:endParaRPr lang="en-US"/>
+          </a:p>
+        </p:txBody>
+      </p:sp>
+      <p:sp>
+        <p:nvSpPr>
+          <p:cNvPr id="3" name="Rectangle 4">
+            <a:extLst>
+              <a:ext uri="{FF2B5EF4-FFF2-40B4-BE49-F238E27FC236}">
+                <a16:creationId xmlns:a16="http://schemas.microsoft.com/office/drawing/2014/main" id="{5B22B34C-3652-FE4D-8A82-402D5A71DE64}"/>
+              </a:ext>
+            </a:extLst>
+          </p:cNvPr>
+          <p:cNvSpPr>
+            <a:spLocks noChangeArrowheads="1"/>
+          </p:cNvSpPr>
+          <p:nvPr/>
+        </p:nvSpPr>
+        <p:spPr bwMode="auto">
+          <a:xfrm>
+            <a:off x="0" y="0"/>
+            <a:ext cx="9144000" cy="0"/>
+          </a:xfrm>
+          <a:prstGeom prst="rect">
+            <a:avLst/>
+          </a:prstGeom>
+          <a:noFill/>
+          <a:ln>
+            <a:noFill/>
+          </a:ln>
+          <a:effectLst/>
+          <a:extLst>
+            <a:ext uri="{909E8E84-426E-40DD-AFC4-6F175D3DCCD1}">
+              <a14:hiddenFill xmlns:a14="http://schemas.microsoft.com/office/drawing/2010/main">
+                <a:solidFill>
+                  <a:schemeClr val="accent1"/>
+                </a:solidFill>
+              </a14:hiddenFill>
+            </a:ext>
+            <a:ext uri="{91240B29-F687-4F45-9708-019B960494DF}">
+              <a14:hiddenLine xmlns:a14="http://schemas.microsoft.com/office/drawing/2010/main" w="9525">
+                <a:solidFill>
+                  <a:schemeClr val="tx1"/>
+                </a:solidFill>
+                <a:miter lim="800000"/>
+                <a:headEnd/>
+                <a:tailEnd/>
+              </a14:hiddenLine>
+            </a:ext>
+            <a:ext uri="{AF507438-7753-43E0-B8FC-AC1667EBCBE1}">
+              <a14:hiddenEffects xmlns:a14="http://schemas.microsoft.com/office/drawing/2010/main">
+                <a:effectLst>
+                  <a:outerShdw dist="35921" dir="2700000" algn="ctr" rotWithShape="0">
+                    <a:schemeClr val="bg2"/>
+                  </a:outerShdw>
+                </a:effectLst>
+              </a14:hiddenEffects>
+            </a:ext>
+          </a:extLst>
+        </p:spPr>
+        <p:txBody>
+          <a:bodyPr vert="horz" wrap="none" lIns="91440" tIns="45720" rIns="91440" bIns="45720" numCol="1" anchor="ctr" anchorCtr="0" compatLnSpc="1">
+            <a:prstTxWarp prst="textNoShape">
+              <a:avLst/>
+            </a:prstTxWarp>
+            <a:spAutoFit/>
+          </a:bodyPr>
+          <a:lstStyle/>
+          <a:p>
+            <a:endParaRPr lang="en-US"/>
+          </a:p>
+        </p:txBody>
+      </p:sp>
+      <p:pic>
+        <p:nvPicPr>
+          <p:cNvPr id="1027" name="Picture 7" descr="Sandy Bridge block diagram | Download Scientific Diagram">
+            <a:extLst>
+              <a:ext uri="{FF2B5EF4-FFF2-40B4-BE49-F238E27FC236}">
+                <a16:creationId xmlns:a16="http://schemas.microsoft.com/office/drawing/2014/main" id="{F26C9E90-6962-C249-ADFB-8393E40CF197}"/>
+              </a:ext>
+            </a:extLst>
+          </p:cNvPr>
+          <p:cNvPicPr>
+            <a:picLocks noChangeAspect="1" noChangeArrowheads="1"/>
+          </p:cNvPicPr>
+          <p:nvPr/>
+        </p:nvPicPr>
+        <p:blipFill>
+          <a:blip r:embed="rId3" r:link="rId4">
+            <a:extLst>
+              <a:ext uri="{28A0092B-C50C-407E-A947-70E740481C1C}">
+                <a14:useLocalDpi xmlns:a14="http://schemas.microsoft.com/office/drawing/2010/main" val="0"/>
+              </a:ext>
+            </a:extLst>
+          </a:blip>
+          <a:srcRect/>
+          <a:stretch>
+            <a:fillRect/>
+          </a:stretch>
+        </p:blipFill>
+        <p:spPr bwMode="auto">
+          <a:xfrm>
+            <a:off x="1219200" y="1181100"/>
+            <a:ext cx="6972300" cy="5067300"/>
+          </a:xfrm>
+          <a:prstGeom prst="rect">
+            <a:avLst/>
+          </a:prstGeom>
+          <a:noFill/>
+          <a:extLst>
+            <a:ext uri="{909E8E84-426E-40DD-AFC4-6F175D3DCCD1}">
+              <a14:hiddenFill xmlns:a14="http://schemas.microsoft.com/office/drawing/2010/main">
+                <a:solidFill>
+                  <a:srgbClr val="FFFFFF"/>
+                </a:solidFill>
+              </a14:hiddenFill>
+            </a:ext>
+          </a:extLst>
+        </p:spPr>
+      </p:pic>
+    </p:spTree>
+    <p:extLst>
+      <p:ext uri="{BB962C8B-B14F-4D97-AF65-F5344CB8AC3E}">
+        <p14:creationId xmlns:p14="http://schemas.microsoft.com/office/powerpoint/2010/main" val="1600723619"/>
+      </p:ext>
+    </p:extLst>
+  </p:cSld>
+  <p:clrMapOvr>
+    <a:masterClrMapping/>
+  </p:clrMapOvr>
+  <p:transition/>
+</p:sld>
+</file>
+
+<file path=ppt/slides/slide42.xml><?xml version="1.0" encoding="utf-8"?>
+<p:sld xmlns:a="http://schemas.openxmlformats.org/drawingml/2006/main" xmlns:r="http://schemas.openxmlformats.org/officeDocument/2006/relationships" xmlns:p="http://schemas.openxmlformats.org/presentationml/2006/main">
+  <p:cSld>
+    <p:spTree>
+      <p:nvGrpSpPr>
+        <p:cNvPr id="1" name=""/>
+        <p:cNvGrpSpPr/>
+        <p:nvPr/>
+      </p:nvGrpSpPr>
+      <p:grpSpPr>
+        <a:xfrm>
+          <a:off x="0" y="0"/>
+          <a:ext cx="0" cy="0"/>
+          <a:chOff x="0" y="0"/>
+          <a:chExt cx="0" cy="0"/>
+        </a:xfrm>
+      </p:grpSpPr>
+      <p:sp>
+        <p:nvSpPr>
+          <p:cNvPr id="23556" name="Rectangle 2"/>
+          <p:cNvSpPr>
+            <a:spLocks noGrp="1" noChangeArrowheads="1"/>
+          </p:cNvSpPr>
+          <p:nvPr>
+            <p:ph type="title"/>
+          </p:nvPr>
+        </p:nvSpPr>
+        <p:spPr>
+          <a:xfrm>
+            <a:off x="682752" y="114300"/>
+            <a:ext cx="7772400" cy="838200"/>
+          </a:xfrm>
+        </p:spPr>
+        <p:txBody>
+          <a:bodyPr/>
+          <a:lstStyle/>
+          <a:p>
+            <a:r>
+              <a:rPr lang="en-US" sz="3600" dirty="0"/>
+              <a:t>Machine state (Intel x64)</a:t>
+            </a:r>
+          </a:p>
+        </p:txBody>
+      </p:sp>
+      <p:sp>
+        <p:nvSpPr>
+          <p:cNvPr id="8" name="Slide Number Placeholder 7"/>
+          <p:cNvSpPr>
+            <a:spLocks noGrp="1"/>
+          </p:cNvSpPr>
+          <p:nvPr>
+            <p:ph type="sldNum" sz="quarter" idx="12"/>
+          </p:nvPr>
+        </p:nvSpPr>
+        <p:spPr/>
+        <p:txBody>
+          <a:bodyPr/>
+          <a:lstStyle/>
+          <a:p>
+            <a:pPr>
+              <a:defRPr/>
+            </a:pPr>
+            <a:fld id="{8E09DF16-9352-46A7-97F1-1D13A8547ADD}" type="slidenum">
+              <a:rPr lang="en-US" smtClean="0"/>
+              <a:pPr>
+                <a:defRPr/>
+              </a:pPr>
+              <a:t>42</a:t>
+            </a:fld>
+            <a:endParaRPr lang="en-US"/>
+          </a:p>
+        </p:txBody>
+      </p:sp>
+      <p:sp>
+        <p:nvSpPr>
+          <p:cNvPr id="2" name="Rectangle 2">
+            <a:extLst>
+              <a:ext uri="{FF2B5EF4-FFF2-40B4-BE49-F238E27FC236}">
+                <a16:creationId xmlns:a16="http://schemas.microsoft.com/office/drawing/2014/main" id="{C0D3418F-80B0-844C-8418-6CC7A95790AB}"/>
+              </a:ext>
+            </a:extLst>
+          </p:cNvPr>
+          <p:cNvSpPr>
+            <a:spLocks noChangeArrowheads="1"/>
+          </p:cNvSpPr>
+          <p:nvPr/>
+        </p:nvSpPr>
+        <p:spPr bwMode="auto">
+          <a:xfrm>
+            <a:off x="0" y="0"/>
+            <a:ext cx="9144000" cy="0"/>
+          </a:xfrm>
+          <a:prstGeom prst="rect">
+            <a:avLst/>
+          </a:prstGeom>
+          <a:noFill/>
+          <a:ln>
+            <a:noFill/>
+          </a:ln>
+          <a:effectLst/>
+          <a:extLst>
+            <a:ext uri="{909E8E84-426E-40DD-AFC4-6F175D3DCCD1}">
+              <a14:hiddenFill xmlns:a14="http://schemas.microsoft.com/office/drawing/2010/main">
+                <a:solidFill>
+                  <a:schemeClr val="accent1"/>
+                </a:solidFill>
+              </a14:hiddenFill>
+            </a:ext>
+            <a:ext uri="{91240B29-F687-4F45-9708-019B960494DF}">
+              <a14:hiddenLine xmlns:a14="http://schemas.microsoft.com/office/drawing/2010/main" w="9525">
+                <a:solidFill>
+                  <a:schemeClr val="tx1"/>
+                </a:solidFill>
+                <a:miter lim="800000"/>
+                <a:headEnd/>
+                <a:tailEnd/>
+              </a14:hiddenLine>
+            </a:ext>
+            <a:ext uri="{AF507438-7753-43E0-B8FC-AC1667EBCBE1}">
+              <a14:hiddenEffects xmlns:a14="http://schemas.microsoft.com/office/drawing/2010/main">
+                <a:effectLst>
+                  <a:outerShdw dist="35921" dir="2700000" algn="ctr" rotWithShape="0">
+                    <a:schemeClr val="bg2"/>
+                  </a:outerShdw>
+                </a:effectLst>
+              </a14:hiddenEffects>
+            </a:ext>
+          </a:extLst>
+        </p:spPr>
+        <p:txBody>
+          <a:bodyPr vert="horz" wrap="none" lIns="91440" tIns="45720" rIns="91440" bIns="45720" numCol="1" anchor="ctr" anchorCtr="0" compatLnSpc="1">
+            <a:prstTxWarp prst="textNoShape">
+              <a:avLst/>
+            </a:prstTxWarp>
+            <a:spAutoFit/>
+          </a:bodyPr>
+          <a:lstStyle/>
+          <a:p>
+            <a:endParaRPr lang="en-US"/>
+          </a:p>
+        </p:txBody>
+      </p:sp>
+      <p:graphicFrame>
+        <p:nvGraphicFramePr>
+          <p:cNvPr id="5" name="Table 4">
+            <a:extLst>
+              <a:ext uri="{FF2B5EF4-FFF2-40B4-BE49-F238E27FC236}">
+                <a16:creationId xmlns:a16="http://schemas.microsoft.com/office/drawing/2014/main" id="{F0FF8CD8-3266-0B41-91D2-9CDC0EA25019}"/>
+              </a:ext>
+            </a:extLst>
+          </p:cNvPr>
+          <p:cNvGraphicFramePr>
+            <a:graphicFrameLocks noGrp="1"/>
+          </p:cNvGraphicFramePr>
+          <p:nvPr>
+            <p:extLst>
+              <p:ext uri="{D42A27DB-BD31-4B8C-83A1-F6EECF244321}">
+                <p14:modId xmlns:p14="http://schemas.microsoft.com/office/powerpoint/2010/main" val="2132829059"/>
+              </p:ext>
+            </p:extLst>
+          </p:nvPr>
+        </p:nvGraphicFramePr>
+        <p:xfrm>
+          <a:off x="457200" y="1676414"/>
+          <a:ext cx="8153400" cy="4267185"/>
+        </p:xfrm>
+        <a:graphic>
+          <a:graphicData uri="http://schemas.openxmlformats.org/drawingml/2006/table">
+            <a:tbl>
+              <a:tblPr firstRow="1" firstCol="1" bandRow="1">
+                <a:tableStyleId>{5C22544A-7EE6-4342-B048-85BDC9FD1C3A}</a:tableStyleId>
+              </a:tblPr>
+              <a:tblGrid>
+                <a:gridCol w="4191000">
+                  <a:extLst>
+                    <a:ext uri="{9D8B030D-6E8A-4147-A177-3AD203B41FA5}">
+                      <a16:colId xmlns:a16="http://schemas.microsoft.com/office/drawing/2014/main" val="191467620"/>
+                    </a:ext>
+                  </a:extLst>
+                </a:gridCol>
+                <a:gridCol w="3962400">
+                  <a:extLst>
+                    <a:ext uri="{9D8B030D-6E8A-4147-A177-3AD203B41FA5}">
+                      <a16:colId xmlns:a16="http://schemas.microsoft.com/office/drawing/2014/main" val="1193095984"/>
+                    </a:ext>
+                  </a:extLst>
+                </a:gridCol>
+              </a:tblGrid>
+              <a:tr h="284479">
+                <a:tc>
+                  <a:txBody>
+                    <a:bodyPr/>
+                    <a:lstStyle/>
+                    <a:p>
+                      <a:pPr marL="0" marR="0">
+                        <a:spcBef>
+                          <a:spcPts val="0"/>
+                        </a:spcBef>
+                        <a:spcAft>
+                          <a:spcPts val="0"/>
+                        </a:spcAft>
+                      </a:pPr>
+                      <a:r>
+                        <a:rPr lang="en-US" sz="1200" dirty="0">
+                          <a:solidFill>
+                            <a:schemeClr val="tx1"/>
+                          </a:solidFill>
+                          <a:effectLst/>
+                        </a:rPr>
+                        <a:t>Feature</a:t>
+                      </a:r>
+                      <a:endParaRPr lang="en-US" sz="1200" dirty="0">
+                        <a:solidFill>
+                          <a:schemeClr val="tx1"/>
+                        </a:solidFill>
+                        <a:effectLst/>
+                        <a:latin typeface="Calibri" panose="020F0502020204030204" pitchFamily="34" charset="0"/>
+                        <a:ea typeface="DengXian" panose="02010600030101010101" pitchFamily="2" charset="-122"/>
+                        <a:cs typeface="Arial" panose="020B0604020202020204" pitchFamily="34" charset="0"/>
+                      </a:endParaRPr>
+                    </a:p>
+                  </a:txBody>
+                  <a:tcPr marL="68580" marR="68580" marT="0" marB="0"/>
+                </a:tc>
+                <a:tc>
+                  <a:txBody>
+                    <a:bodyPr/>
+                    <a:lstStyle/>
+                    <a:p>
+                      <a:pPr marL="0" marR="0">
+                        <a:spcBef>
+                          <a:spcPts val="0"/>
+                        </a:spcBef>
+                        <a:spcAft>
+                          <a:spcPts val="0"/>
+                        </a:spcAft>
+                      </a:pPr>
+                      <a:r>
+                        <a:rPr lang="en-US" sz="1200" dirty="0">
+                          <a:solidFill>
+                            <a:schemeClr val="tx1"/>
+                          </a:solidFill>
+                          <a:effectLst/>
+                        </a:rPr>
+                        <a:t>Core i7</a:t>
+                      </a:r>
+                      <a:endParaRPr lang="en-US" sz="1200" dirty="0">
+                        <a:solidFill>
+                          <a:schemeClr val="tx1"/>
+                        </a:solidFill>
+                        <a:effectLst/>
+                        <a:latin typeface="Calibri" panose="020F0502020204030204" pitchFamily="34" charset="0"/>
+                        <a:ea typeface="DengXian" panose="02010600030101010101" pitchFamily="2" charset="-122"/>
+                        <a:cs typeface="Arial" panose="020B0604020202020204" pitchFamily="34" charset="0"/>
+                      </a:endParaRPr>
+                    </a:p>
+                  </a:txBody>
+                  <a:tcPr marL="68580" marR="68580" marT="0" marB="0"/>
+                </a:tc>
+                <a:extLst>
+                  <a:ext uri="{0D108BD9-81ED-4DB2-BD59-A6C34878D82A}">
+                    <a16:rowId xmlns:a16="http://schemas.microsoft.com/office/drawing/2014/main" val="1329257411"/>
+                  </a:ext>
+                </a:extLst>
+              </a:tr>
+              <a:tr h="284479">
+                <a:tc>
+                  <a:txBody>
+                    <a:bodyPr/>
+                    <a:lstStyle/>
+                    <a:p>
+                      <a:pPr marL="0" marR="0">
+                        <a:spcBef>
+                          <a:spcPts val="0"/>
+                        </a:spcBef>
+                        <a:spcAft>
+                          <a:spcPts val="0"/>
+                        </a:spcAft>
+                      </a:pPr>
+                      <a:r>
+                        <a:rPr lang="en-US" sz="1200" b="0">
+                          <a:solidFill>
+                            <a:schemeClr val="tx1"/>
+                          </a:solidFill>
+                          <a:effectLst/>
+                        </a:rPr>
+                        <a:t>Pipeline</a:t>
+                      </a:r>
+                      <a:endParaRPr lang="en-US" sz="1200" b="0">
+                        <a:solidFill>
+                          <a:schemeClr val="tx1"/>
+                        </a:solidFill>
+                        <a:effectLst/>
+                        <a:latin typeface="Calibri" panose="020F0502020204030204" pitchFamily="34" charset="0"/>
+                        <a:ea typeface="DengXian" panose="02010600030101010101" pitchFamily="2" charset="-122"/>
+                        <a:cs typeface="Arial" panose="020B0604020202020204" pitchFamily="34" charset="0"/>
+                      </a:endParaRPr>
+                    </a:p>
+                  </a:txBody>
+                  <a:tcPr marL="68580" marR="68580" marT="0" marB="0">
+                    <a:noFill/>
+                  </a:tcPr>
+                </a:tc>
+                <a:tc>
+                  <a:txBody>
+                    <a:bodyPr/>
+                    <a:lstStyle/>
+                    <a:p>
+                      <a:pPr marL="0" marR="0">
+                        <a:spcBef>
+                          <a:spcPts val="0"/>
+                        </a:spcBef>
+                        <a:spcAft>
+                          <a:spcPts val="0"/>
+                        </a:spcAft>
+                      </a:pPr>
+                      <a:r>
+                        <a:rPr lang="en-US" sz="1200">
+                          <a:effectLst/>
+                        </a:rPr>
+                        <a:t>OoO</a:t>
+                      </a:r>
+                      <a:endParaRPr lang="en-US" sz="1200">
+                        <a:effectLst/>
+                        <a:latin typeface="Calibri" panose="020F0502020204030204" pitchFamily="34" charset="0"/>
+                        <a:ea typeface="DengXian" panose="02010600030101010101" pitchFamily="2" charset="-122"/>
+                        <a:cs typeface="Arial" panose="020B0604020202020204" pitchFamily="34" charset="0"/>
+                      </a:endParaRPr>
+                    </a:p>
+                  </a:txBody>
+                  <a:tcPr marL="68580" marR="68580" marT="0" marB="0"/>
+                </a:tc>
+                <a:extLst>
+                  <a:ext uri="{0D108BD9-81ED-4DB2-BD59-A6C34878D82A}">
+                    <a16:rowId xmlns:a16="http://schemas.microsoft.com/office/drawing/2014/main" val="1610799187"/>
+                  </a:ext>
+                </a:extLst>
+              </a:tr>
+              <a:tr h="284479">
+                <a:tc>
+                  <a:txBody>
+                    <a:bodyPr/>
+                    <a:lstStyle/>
+                    <a:p>
+                      <a:pPr marL="0" marR="0">
+                        <a:spcBef>
+                          <a:spcPts val="0"/>
+                        </a:spcBef>
+                        <a:spcAft>
+                          <a:spcPts val="0"/>
+                        </a:spcAft>
+                      </a:pPr>
+                      <a:r>
+                        <a:rPr lang="en-US" sz="1200" b="0">
+                          <a:solidFill>
+                            <a:schemeClr val="tx1"/>
+                          </a:solidFill>
+                          <a:effectLst/>
+                        </a:rPr>
+                        <a:t>Number of stages</a:t>
+                      </a:r>
+                      <a:endParaRPr lang="en-US" sz="1200" b="0">
+                        <a:solidFill>
+                          <a:schemeClr val="tx1"/>
+                        </a:solidFill>
+                        <a:effectLst/>
+                        <a:latin typeface="Calibri" panose="020F0502020204030204" pitchFamily="34" charset="0"/>
+                        <a:ea typeface="DengXian" panose="02010600030101010101" pitchFamily="2" charset="-122"/>
+                        <a:cs typeface="Arial" panose="020B0604020202020204" pitchFamily="34" charset="0"/>
+                      </a:endParaRPr>
+                    </a:p>
+                  </a:txBody>
+                  <a:tcPr marL="68580" marR="68580" marT="0" marB="0">
+                    <a:noFill/>
+                  </a:tcPr>
+                </a:tc>
+                <a:tc>
+                  <a:txBody>
+                    <a:bodyPr/>
+                    <a:lstStyle/>
+                    <a:p>
+                      <a:pPr marL="0" marR="0">
+                        <a:spcBef>
+                          <a:spcPts val="0"/>
+                        </a:spcBef>
+                        <a:spcAft>
+                          <a:spcPts val="0"/>
+                        </a:spcAft>
+                      </a:pPr>
+                      <a:r>
+                        <a:rPr lang="en-US" sz="1200">
+                          <a:effectLst/>
+                        </a:rPr>
+                        <a:t>19</a:t>
+                      </a:r>
+                      <a:endParaRPr lang="en-US" sz="1200">
+                        <a:effectLst/>
+                        <a:latin typeface="Calibri" panose="020F0502020204030204" pitchFamily="34" charset="0"/>
+                        <a:ea typeface="DengXian" panose="02010600030101010101" pitchFamily="2" charset="-122"/>
+                        <a:cs typeface="Arial" panose="020B0604020202020204" pitchFamily="34" charset="0"/>
+                      </a:endParaRPr>
+                    </a:p>
+                  </a:txBody>
+                  <a:tcPr marL="68580" marR="68580" marT="0" marB="0"/>
+                </a:tc>
+                <a:extLst>
+                  <a:ext uri="{0D108BD9-81ED-4DB2-BD59-A6C34878D82A}">
+                    <a16:rowId xmlns:a16="http://schemas.microsoft.com/office/drawing/2014/main" val="785710591"/>
+                  </a:ext>
+                </a:extLst>
+              </a:tr>
+              <a:tr h="284479">
+                <a:tc>
+                  <a:txBody>
+                    <a:bodyPr/>
+                    <a:lstStyle/>
+                    <a:p>
+                      <a:pPr marL="0" marR="0">
+                        <a:spcBef>
+                          <a:spcPts val="0"/>
+                        </a:spcBef>
+                        <a:spcAft>
+                          <a:spcPts val="0"/>
+                        </a:spcAft>
+                      </a:pPr>
+                      <a:r>
+                        <a:rPr lang="en-US" sz="1200" b="0">
+                          <a:solidFill>
+                            <a:schemeClr val="tx1"/>
+                          </a:solidFill>
+                          <a:effectLst/>
+                        </a:rPr>
+                        <a:t>Width of fetch</a:t>
+                      </a:r>
+                      <a:endParaRPr lang="en-US" sz="1200" b="0">
+                        <a:solidFill>
+                          <a:schemeClr val="tx1"/>
+                        </a:solidFill>
+                        <a:effectLst/>
+                        <a:latin typeface="Calibri" panose="020F0502020204030204" pitchFamily="34" charset="0"/>
+                        <a:ea typeface="DengXian" panose="02010600030101010101" pitchFamily="2" charset="-122"/>
+                        <a:cs typeface="Arial" panose="020B0604020202020204" pitchFamily="34" charset="0"/>
+                      </a:endParaRPr>
+                    </a:p>
+                  </a:txBody>
+                  <a:tcPr marL="68580" marR="68580" marT="0" marB="0">
+                    <a:noFill/>
+                  </a:tcPr>
+                </a:tc>
+                <a:tc>
+                  <a:txBody>
+                    <a:bodyPr/>
+                    <a:lstStyle/>
+                    <a:p>
+                      <a:pPr marL="0" marR="0">
+                        <a:spcBef>
+                          <a:spcPts val="0"/>
+                        </a:spcBef>
+                        <a:spcAft>
+                          <a:spcPts val="0"/>
+                        </a:spcAft>
+                      </a:pPr>
+                      <a:r>
+                        <a:rPr lang="en-US" sz="1200">
+                          <a:effectLst/>
+                        </a:rPr>
+                        <a:t>6 instructions</a:t>
+                      </a:r>
+                      <a:endParaRPr lang="en-US" sz="1200">
+                        <a:effectLst/>
+                        <a:latin typeface="Calibri" panose="020F0502020204030204" pitchFamily="34" charset="0"/>
+                        <a:ea typeface="DengXian" panose="02010600030101010101" pitchFamily="2" charset="-122"/>
+                        <a:cs typeface="Arial" panose="020B0604020202020204" pitchFamily="34" charset="0"/>
+                      </a:endParaRPr>
+                    </a:p>
+                  </a:txBody>
+                  <a:tcPr marL="68580" marR="68580" marT="0" marB="0"/>
+                </a:tc>
+                <a:extLst>
+                  <a:ext uri="{0D108BD9-81ED-4DB2-BD59-A6C34878D82A}">
+                    <a16:rowId xmlns:a16="http://schemas.microsoft.com/office/drawing/2014/main" val="30975939"/>
+                  </a:ext>
+                </a:extLst>
+              </a:tr>
+              <a:tr h="284479">
+                <a:tc>
+                  <a:txBody>
+                    <a:bodyPr/>
+                    <a:lstStyle/>
+                    <a:p>
+                      <a:pPr marL="0" marR="0">
+                        <a:spcBef>
+                          <a:spcPts val="0"/>
+                        </a:spcBef>
+                        <a:spcAft>
+                          <a:spcPts val="0"/>
+                        </a:spcAft>
+                      </a:pPr>
+                      <a:r>
+                        <a:rPr lang="en-US" sz="1200" b="0">
+                          <a:solidFill>
+                            <a:schemeClr val="tx1"/>
+                          </a:solidFill>
+                          <a:effectLst/>
+                        </a:rPr>
+                        <a:t>Width of decode</a:t>
+                      </a:r>
+                      <a:endParaRPr lang="en-US" sz="1200" b="0">
+                        <a:solidFill>
+                          <a:schemeClr val="tx1"/>
+                        </a:solidFill>
+                        <a:effectLst/>
+                        <a:latin typeface="Calibri" panose="020F0502020204030204" pitchFamily="34" charset="0"/>
+                        <a:ea typeface="DengXian" panose="02010600030101010101" pitchFamily="2" charset="-122"/>
+                        <a:cs typeface="Arial" panose="020B0604020202020204" pitchFamily="34" charset="0"/>
+                      </a:endParaRPr>
+                    </a:p>
+                  </a:txBody>
+                  <a:tcPr marL="68580" marR="68580" marT="0" marB="0">
+                    <a:noFill/>
+                  </a:tcPr>
+                </a:tc>
+                <a:tc>
+                  <a:txBody>
+                    <a:bodyPr/>
+                    <a:lstStyle/>
+                    <a:p>
+                      <a:pPr marL="0" marR="0">
+                        <a:spcBef>
+                          <a:spcPts val="0"/>
+                        </a:spcBef>
+                        <a:spcAft>
+                          <a:spcPts val="0"/>
+                        </a:spcAft>
+                      </a:pPr>
+                      <a:r>
+                        <a:rPr lang="en-US" sz="1200">
+                          <a:effectLst/>
+                        </a:rPr>
+                        <a:t>4-7 fused u-ops</a:t>
+                      </a:r>
+                      <a:endParaRPr lang="en-US" sz="1200">
+                        <a:effectLst/>
+                        <a:latin typeface="Calibri" panose="020F0502020204030204" pitchFamily="34" charset="0"/>
+                        <a:ea typeface="DengXian" panose="02010600030101010101" pitchFamily="2" charset="-122"/>
+                        <a:cs typeface="Arial" panose="020B0604020202020204" pitchFamily="34" charset="0"/>
+                      </a:endParaRPr>
+                    </a:p>
+                  </a:txBody>
+                  <a:tcPr marL="68580" marR="68580" marT="0" marB="0"/>
+                </a:tc>
+                <a:extLst>
+                  <a:ext uri="{0D108BD9-81ED-4DB2-BD59-A6C34878D82A}">
+                    <a16:rowId xmlns:a16="http://schemas.microsoft.com/office/drawing/2014/main" val="3300885499"/>
+                  </a:ext>
+                </a:extLst>
+              </a:tr>
+              <a:tr h="284479">
+                <a:tc>
+                  <a:txBody>
+                    <a:bodyPr/>
+                    <a:lstStyle/>
+                    <a:p>
+                      <a:pPr marL="0" marR="0">
+                        <a:spcBef>
+                          <a:spcPts val="0"/>
+                        </a:spcBef>
+                        <a:spcAft>
+                          <a:spcPts val="0"/>
+                        </a:spcAft>
+                      </a:pPr>
+                      <a:r>
+                        <a:rPr lang="en-US" sz="1200" b="0">
+                          <a:solidFill>
+                            <a:schemeClr val="tx1"/>
+                          </a:solidFill>
+                          <a:effectLst/>
+                        </a:rPr>
+                        <a:t>Size of decode queue</a:t>
+                      </a:r>
+                      <a:endParaRPr lang="en-US" sz="1200" b="0">
+                        <a:solidFill>
+                          <a:schemeClr val="tx1"/>
+                        </a:solidFill>
+                        <a:effectLst/>
+                        <a:latin typeface="Calibri" panose="020F0502020204030204" pitchFamily="34" charset="0"/>
+                        <a:ea typeface="DengXian" panose="02010600030101010101" pitchFamily="2" charset="-122"/>
+                        <a:cs typeface="Arial" panose="020B0604020202020204" pitchFamily="34" charset="0"/>
+                      </a:endParaRPr>
+                    </a:p>
+                  </a:txBody>
+                  <a:tcPr marL="68580" marR="68580" marT="0" marB="0">
+                    <a:noFill/>
+                  </a:tcPr>
+                </a:tc>
+                <a:tc>
+                  <a:txBody>
+                    <a:bodyPr/>
+                    <a:lstStyle/>
+                    <a:p>
+                      <a:pPr marL="0" marR="0">
+                        <a:spcBef>
+                          <a:spcPts val="0"/>
+                        </a:spcBef>
+                        <a:spcAft>
+                          <a:spcPts val="0"/>
+                        </a:spcAft>
+                      </a:pPr>
+                      <a:r>
+                        <a:rPr lang="en-US" sz="1200">
+                          <a:effectLst/>
+                        </a:rPr>
+                        <a:t>56 entries</a:t>
+                      </a:r>
+                      <a:endParaRPr lang="en-US" sz="1200">
+                        <a:effectLst/>
+                        <a:latin typeface="Calibri" panose="020F0502020204030204" pitchFamily="34" charset="0"/>
+                        <a:ea typeface="DengXian" panose="02010600030101010101" pitchFamily="2" charset="-122"/>
+                        <a:cs typeface="Arial" panose="020B0604020202020204" pitchFamily="34" charset="0"/>
+                      </a:endParaRPr>
+                    </a:p>
+                  </a:txBody>
+                  <a:tcPr marL="68580" marR="68580" marT="0" marB="0"/>
+                </a:tc>
+                <a:extLst>
+                  <a:ext uri="{0D108BD9-81ED-4DB2-BD59-A6C34878D82A}">
+                    <a16:rowId xmlns:a16="http://schemas.microsoft.com/office/drawing/2014/main" val="828008180"/>
+                  </a:ext>
+                </a:extLst>
+              </a:tr>
+              <a:tr h="284479">
+                <a:tc>
+                  <a:txBody>
+                    <a:bodyPr/>
+                    <a:lstStyle/>
+                    <a:p>
+                      <a:pPr marL="0" marR="0">
+                        <a:spcBef>
+                          <a:spcPts val="0"/>
+                        </a:spcBef>
+                        <a:spcAft>
+                          <a:spcPts val="0"/>
+                        </a:spcAft>
+                      </a:pPr>
+                      <a:r>
+                        <a:rPr lang="en-US" sz="1200" b="0">
+                          <a:solidFill>
+                            <a:schemeClr val="tx1"/>
+                          </a:solidFill>
+                          <a:effectLst/>
+                        </a:rPr>
+                        <a:t>Width of reissue/rename</a:t>
+                      </a:r>
+                      <a:endParaRPr lang="en-US" sz="1200" b="0">
+                        <a:solidFill>
+                          <a:schemeClr val="tx1"/>
+                        </a:solidFill>
+                        <a:effectLst/>
+                        <a:latin typeface="Calibri" panose="020F0502020204030204" pitchFamily="34" charset="0"/>
+                        <a:ea typeface="DengXian" panose="02010600030101010101" pitchFamily="2" charset="-122"/>
+                        <a:cs typeface="Arial" panose="020B0604020202020204" pitchFamily="34" charset="0"/>
+                      </a:endParaRPr>
+                    </a:p>
+                  </a:txBody>
+                  <a:tcPr marL="68580" marR="68580" marT="0" marB="0">
+                    <a:noFill/>
+                  </a:tcPr>
+                </a:tc>
+                <a:tc>
+                  <a:txBody>
+                    <a:bodyPr/>
+                    <a:lstStyle/>
+                    <a:p>
+                      <a:pPr marL="0" marR="0">
+                        <a:spcBef>
+                          <a:spcPts val="0"/>
+                        </a:spcBef>
+                        <a:spcAft>
+                          <a:spcPts val="0"/>
+                        </a:spcAft>
+                      </a:pPr>
+                      <a:r>
+                        <a:rPr lang="en-US" sz="1200" dirty="0">
+                          <a:effectLst/>
+                        </a:rPr>
+                        <a:t>4 fused u-ops</a:t>
+                      </a:r>
+                      <a:endParaRPr lang="en-US" sz="1200" dirty="0">
+                        <a:effectLst/>
+                        <a:latin typeface="Calibri" panose="020F0502020204030204" pitchFamily="34" charset="0"/>
+                        <a:ea typeface="DengXian" panose="02010600030101010101" pitchFamily="2" charset="-122"/>
+                        <a:cs typeface="Arial" panose="020B0604020202020204" pitchFamily="34" charset="0"/>
+                      </a:endParaRPr>
+                    </a:p>
+                  </a:txBody>
+                  <a:tcPr marL="68580" marR="68580" marT="0" marB="0"/>
+                </a:tc>
+                <a:extLst>
+                  <a:ext uri="{0D108BD9-81ED-4DB2-BD59-A6C34878D82A}">
+                    <a16:rowId xmlns:a16="http://schemas.microsoft.com/office/drawing/2014/main" val="3991439578"/>
+                  </a:ext>
+                </a:extLst>
+              </a:tr>
+              <a:tr h="284479">
+                <a:tc>
+                  <a:txBody>
+                    <a:bodyPr/>
+                    <a:lstStyle/>
+                    <a:p>
+                      <a:pPr marL="0" marR="0">
+                        <a:spcBef>
+                          <a:spcPts val="0"/>
+                        </a:spcBef>
+                        <a:spcAft>
+                          <a:spcPts val="0"/>
+                        </a:spcAft>
+                      </a:pPr>
+                      <a:r>
+                        <a:rPr lang="en-US" sz="1200" b="0">
+                          <a:solidFill>
+                            <a:schemeClr val="tx1"/>
+                          </a:solidFill>
+                          <a:effectLst/>
+                        </a:rPr>
+                        <a:t>Width of dispatch</a:t>
+                      </a:r>
+                      <a:endParaRPr lang="en-US" sz="1200" b="0">
+                        <a:solidFill>
+                          <a:schemeClr val="tx1"/>
+                        </a:solidFill>
+                        <a:effectLst/>
+                        <a:latin typeface="Calibri" panose="020F0502020204030204" pitchFamily="34" charset="0"/>
+                        <a:ea typeface="DengXian" panose="02010600030101010101" pitchFamily="2" charset="-122"/>
+                        <a:cs typeface="Arial" panose="020B0604020202020204" pitchFamily="34" charset="0"/>
+                      </a:endParaRPr>
+                    </a:p>
+                  </a:txBody>
+                  <a:tcPr marL="68580" marR="68580" marT="0" marB="0">
+                    <a:noFill/>
+                  </a:tcPr>
+                </a:tc>
+                <a:tc>
+                  <a:txBody>
+                    <a:bodyPr/>
+                    <a:lstStyle/>
+                    <a:p>
+                      <a:pPr marL="0" marR="0">
+                        <a:spcBef>
+                          <a:spcPts val="0"/>
+                        </a:spcBef>
+                        <a:spcAft>
+                          <a:spcPts val="0"/>
+                        </a:spcAft>
+                      </a:pPr>
+                      <a:r>
+                        <a:rPr lang="en-US" sz="1200" dirty="0">
+                          <a:effectLst/>
+                        </a:rPr>
+                        <a:t>8 u ops</a:t>
+                      </a:r>
+                      <a:endParaRPr lang="en-US" sz="1200" dirty="0">
+                        <a:effectLst/>
+                        <a:latin typeface="Calibri" panose="020F0502020204030204" pitchFamily="34" charset="0"/>
+                        <a:ea typeface="DengXian" panose="02010600030101010101" pitchFamily="2" charset="-122"/>
+                        <a:cs typeface="Arial" panose="020B0604020202020204" pitchFamily="34" charset="0"/>
+                      </a:endParaRPr>
+                    </a:p>
+                  </a:txBody>
+                  <a:tcPr marL="68580" marR="68580" marT="0" marB="0"/>
+                </a:tc>
+                <a:extLst>
+                  <a:ext uri="{0D108BD9-81ED-4DB2-BD59-A6C34878D82A}">
+                    <a16:rowId xmlns:a16="http://schemas.microsoft.com/office/drawing/2014/main" val="887935868"/>
+                  </a:ext>
+                </a:extLst>
+              </a:tr>
+              <a:tr h="284479">
+                <a:tc>
+                  <a:txBody>
+                    <a:bodyPr/>
+                    <a:lstStyle/>
+                    <a:p>
+                      <a:pPr marL="0" marR="0">
+                        <a:spcBef>
+                          <a:spcPts val="0"/>
+                        </a:spcBef>
+                        <a:spcAft>
+                          <a:spcPts val="0"/>
+                        </a:spcAft>
+                      </a:pPr>
+                      <a:r>
+                        <a:rPr lang="en-US" sz="1200" b="0">
+                          <a:solidFill>
+                            <a:schemeClr val="tx1"/>
+                          </a:solidFill>
+                          <a:effectLst/>
+                        </a:rPr>
+                        <a:t>Width of commit</a:t>
+                      </a:r>
+                      <a:endParaRPr lang="en-US" sz="1200" b="0">
+                        <a:solidFill>
+                          <a:schemeClr val="tx1"/>
+                        </a:solidFill>
+                        <a:effectLst/>
+                        <a:latin typeface="Calibri" panose="020F0502020204030204" pitchFamily="34" charset="0"/>
+                        <a:ea typeface="DengXian" panose="02010600030101010101" pitchFamily="2" charset="-122"/>
+                        <a:cs typeface="Arial" panose="020B0604020202020204" pitchFamily="34" charset="0"/>
+                      </a:endParaRPr>
+                    </a:p>
+                  </a:txBody>
+                  <a:tcPr marL="68580" marR="68580" marT="0" marB="0">
+                    <a:noFill/>
+                  </a:tcPr>
+                </a:tc>
+                <a:tc>
+                  <a:txBody>
+                    <a:bodyPr/>
+                    <a:lstStyle/>
+                    <a:p>
+                      <a:pPr marL="0" marR="0">
+                        <a:spcBef>
+                          <a:spcPts val="0"/>
+                        </a:spcBef>
+                        <a:spcAft>
+                          <a:spcPts val="0"/>
+                        </a:spcAft>
+                      </a:pPr>
+                      <a:r>
+                        <a:rPr lang="en-US" sz="1200">
+                          <a:effectLst/>
+                        </a:rPr>
+                        <a:t>4 fused u-ops</a:t>
+                      </a:r>
+                      <a:endParaRPr lang="en-US" sz="1200">
+                        <a:effectLst/>
+                        <a:latin typeface="Calibri" panose="020F0502020204030204" pitchFamily="34" charset="0"/>
+                        <a:ea typeface="DengXian" panose="02010600030101010101" pitchFamily="2" charset="-122"/>
+                        <a:cs typeface="Arial" panose="020B0604020202020204" pitchFamily="34" charset="0"/>
+                      </a:endParaRPr>
+                    </a:p>
+                  </a:txBody>
+                  <a:tcPr marL="68580" marR="68580" marT="0" marB="0"/>
+                </a:tc>
+                <a:extLst>
+                  <a:ext uri="{0D108BD9-81ED-4DB2-BD59-A6C34878D82A}">
+                    <a16:rowId xmlns:a16="http://schemas.microsoft.com/office/drawing/2014/main" val="668003173"/>
+                  </a:ext>
+                </a:extLst>
+              </a:tr>
+              <a:tr h="284479">
+                <a:tc>
+                  <a:txBody>
+                    <a:bodyPr/>
+                    <a:lstStyle/>
+                    <a:p>
+                      <a:pPr marL="0" marR="0">
+                        <a:spcBef>
+                          <a:spcPts val="0"/>
+                        </a:spcBef>
+                        <a:spcAft>
+                          <a:spcPts val="0"/>
+                        </a:spcAft>
+                      </a:pPr>
+                      <a:r>
+                        <a:rPr lang="en-US" sz="1200" b="0" dirty="0">
+                          <a:solidFill>
+                            <a:schemeClr val="tx1"/>
+                          </a:solidFill>
+                          <a:effectLst/>
+                        </a:rPr>
+                        <a:t>Reservation station</a:t>
+                      </a:r>
+                      <a:endParaRPr lang="en-US" sz="1200" b="0" dirty="0">
+                        <a:solidFill>
+                          <a:schemeClr val="tx1"/>
+                        </a:solidFill>
+                        <a:effectLst/>
+                        <a:latin typeface="Calibri" panose="020F0502020204030204" pitchFamily="34" charset="0"/>
+                        <a:ea typeface="DengXian" panose="02010600030101010101" pitchFamily="2" charset="-122"/>
+                        <a:cs typeface="Arial" panose="020B0604020202020204" pitchFamily="34" charset="0"/>
+                      </a:endParaRPr>
+                    </a:p>
+                  </a:txBody>
+                  <a:tcPr marL="68580" marR="68580" marT="0" marB="0">
+                    <a:noFill/>
+                  </a:tcPr>
+                </a:tc>
+                <a:tc>
+                  <a:txBody>
+                    <a:bodyPr/>
+                    <a:lstStyle/>
+                    <a:p>
+                      <a:pPr marL="0" marR="0">
+                        <a:spcBef>
+                          <a:spcPts val="0"/>
+                        </a:spcBef>
+                        <a:spcAft>
+                          <a:spcPts val="0"/>
+                        </a:spcAft>
+                      </a:pPr>
+                      <a:r>
+                        <a:rPr lang="en-US" sz="1200">
+                          <a:effectLst/>
+                        </a:rPr>
+                        <a:t>60 u-ops</a:t>
+                      </a:r>
+                      <a:endParaRPr lang="en-US" sz="1200">
+                        <a:effectLst/>
+                        <a:latin typeface="Calibri" panose="020F0502020204030204" pitchFamily="34" charset="0"/>
+                        <a:ea typeface="DengXian" panose="02010600030101010101" pitchFamily="2" charset="-122"/>
+                        <a:cs typeface="Arial" panose="020B0604020202020204" pitchFamily="34" charset="0"/>
+                      </a:endParaRPr>
+                    </a:p>
+                  </a:txBody>
+                  <a:tcPr marL="68580" marR="68580" marT="0" marB="0"/>
+                </a:tc>
+                <a:extLst>
+                  <a:ext uri="{0D108BD9-81ED-4DB2-BD59-A6C34878D82A}">
+                    <a16:rowId xmlns:a16="http://schemas.microsoft.com/office/drawing/2014/main" val="1459024853"/>
+                  </a:ext>
+                </a:extLst>
+              </a:tr>
+              <a:tr h="284479">
+                <a:tc>
+                  <a:txBody>
+                    <a:bodyPr/>
+                    <a:lstStyle/>
+                    <a:p>
+                      <a:pPr marL="0" marR="0">
+                        <a:spcBef>
+                          <a:spcPts val="0"/>
+                        </a:spcBef>
+                        <a:spcAft>
+                          <a:spcPts val="0"/>
+                        </a:spcAft>
+                      </a:pPr>
+                      <a:r>
+                        <a:rPr lang="en-US" sz="1200" b="0">
+                          <a:solidFill>
+                            <a:schemeClr val="tx1"/>
+                          </a:solidFill>
+                          <a:effectLst/>
+                        </a:rPr>
+                        <a:t>Reorder buffer</a:t>
+                      </a:r>
+                      <a:endParaRPr lang="en-US" sz="1200" b="0">
+                        <a:solidFill>
+                          <a:schemeClr val="tx1"/>
+                        </a:solidFill>
+                        <a:effectLst/>
+                        <a:latin typeface="Calibri" panose="020F0502020204030204" pitchFamily="34" charset="0"/>
+                        <a:ea typeface="DengXian" panose="02010600030101010101" pitchFamily="2" charset="-122"/>
+                        <a:cs typeface="Arial" panose="020B0604020202020204" pitchFamily="34" charset="0"/>
+                      </a:endParaRPr>
+                    </a:p>
+                  </a:txBody>
+                  <a:tcPr marL="68580" marR="68580" marT="0" marB="0">
+                    <a:noFill/>
+                  </a:tcPr>
+                </a:tc>
+                <a:tc>
+                  <a:txBody>
+                    <a:bodyPr/>
+                    <a:lstStyle/>
+                    <a:p>
+                      <a:pPr marL="0" marR="0">
+                        <a:spcBef>
+                          <a:spcPts val="0"/>
+                        </a:spcBef>
+                        <a:spcAft>
+                          <a:spcPts val="0"/>
+                        </a:spcAft>
+                      </a:pPr>
+                      <a:r>
+                        <a:rPr lang="en-US" sz="1200">
+                          <a:effectLst/>
+                        </a:rPr>
+                        <a:t>192 u-ops</a:t>
+                      </a:r>
+                      <a:endParaRPr lang="en-US" sz="1200">
+                        <a:effectLst/>
+                        <a:latin typeface="Calibri" panose="020F0502020204030204" pitchFamily="34" charset="0"/>
+                        <a:ea typeface="DengXian" panose="02010600030101010101" pitchFamily="2" charset="-122"/>
+                        <a:cs typeface="Arial" panose="020B0604020202020204" pitchFamily="34" charset="0"/>
+                      </a:endParaRPr>
+                    </a:p>
+                  </a:txBody>
+                  <a:tcPr marL="68580" marR="68580" marT="0" marB="0"/>
+                </a:tc>
+                <a:extLst>
+                  <a:ext uri="{0D108BD9-81ED-4DB2-BD59-A6C34878D82A}">
+                    <a16:rowId xmlns:a16="http://schemas.microsoft.com/office/drawing/2014/main" val="1424327760"/>
+                  </a:ext>
+                </a:extLst>
+              </a:tr>
+              <a:tr h="284479">
+                <a:tc>
+                  <a:txBody>
+                    <a:bodyPr/>
+                    <a:lstStyle/>
+                    <a:p>
+                      <a:pPr marL="0" marR="0">
+                        <a:spcBef>
+                          <a:spcPts val="0"/>
+                        </a:spcBef>
+                        <a:spcAft>
+                          <a:spcPts val="0"/>
+                        </a:spcAft>
+                      </a:pPr>
+                      <a:r>
+                        <a:rPr lang="en-US" sz="1200" b="0" dirty="0">
+                          <a:solidFill>
+                            <a:schemeClr val="tx1"/>
+                          </a:solidFill>
+                          <a:effectLst/>
+                        </a:rPr>
+                        <a:t>L1 (Data cache)</a:t>
+                      </a:r>
+                      <a:endParaRPr lang="en-US" sz="1200" b="0" dirty="0">
+                        <a:solidFill>
+                          <a:schemeClr val="tx1"/>
+                        </a:solidFill>
+                        <a:effectLst/>
+                        <a:latin typeface="Calibri" panose="020F0502020204030204" pitchFamily="34" charset="0"/>
+                        <a:ea typeface="DengXian" panose="02010600030101010101" pitchFamily="2" charset="-122"/>
+                        <a:cs typeface="Arial" panose="020B0604020202020204" pitchFamily="34" charset="0"/>
+                      </a:endParaRPr>
+                    </a:p>
+                  </a:txBody>
+                  <a:tcPr marL="68580" marR="68580" marT="0" marB="0">
+                    <a:noFill/>
+                  </a:tcPr>
+                </a:tc>
+                <a:tc>
+                  <a:txBody>
+                    <a:bodyPr/>
+                    <a:lstStyle/>
+                    <a:p>
+                      <a:pPr marL="0" marR="0">
+                        <a:spcBef>
+                          <a:spcPts val="0"/>
+                        </a:spcBef>
+                        <a:spcAft>
+                          <a:spcPts val="0"/>
+                        </a:spcAft>
+                      </a:pPr>
+                      <a:r>
+                        <a:rPr lang="en-US" sz="1200" dirty="0">
+                          <a:effectLst/>
+                        </a:rPr>
+                        <a:t>8 way, 32KB</a:t>
+                      </a:r>
+                      <a:endParaRPr lang="en-US" sz="1200" dirty="0">
+                        <a:effectLst/>
+                        <a:latin typeface="Calibri" panose="020F0502020204030204" pitchFamily="34" charset="0"/>
+                        <a:ea typeface="DengXian" panose="02010600030101010101" pitchFamily="2" charset="-122"/>
+                        <a:cs typeface="Arial" panose="020B0604020202020204" pitchFamily="34" charset="0"/>
+                      </a:endParaRPr>
+                    </a:p>
+                  </a:txBody>
+                  <a:tcPr marL="68580" marR="68580" marT="0" marB="0"/>
+                </a:tc>
+                <a:extLst>
+                  <a:ext uri="{0D108BD9-81ED-4DB2-BD59-A6C34878D82A}">
+                    <a16:rowId xmlns:a16="http://schemas.microsoft.com/office/drawing/2014/main" val="1186988297"/>
+                  </a:ext>
+                </a:extLst>
+              </a:tr>
+              <a:tr h="284479">
+                <a:tc>
+                  <a:txBody>
+                    <a:bodyPr/>
+                    <a:lstStyle/>
+                    <a:p>
+                      <a:pPr marL="0" marR="0">
+                        <a:spcBef>
+                          <a:spcPts val="0"/>
+                        </a:spcBef>
+                        <a:spcAft>
+                          <a:spcPts val="0"/>
+                        </a:spcAft>
+                      </a:pPr>
+                      <a:r>
+                        <a:rPr lang="en-US" sz="1200" b="0" dirty="0">
+                          <a:solidFill>
+                            <a:schemeClr val="tx1"/>
+                          </a:solidFill>
+                          <a:effectLst/>
+                        </a:rPr>
+                        <a:t>L1 (Instruction cache)</a:t>
+                      </a:r>
+                      <a:endParaRPr lang="en-US" sz="1200" b="0" dirty="0">
+                        <a:solidFill>
+                          <a:schemeClr val="tx1"/>
+                        </a:solidFill>
+                        <a:effectLst/>
+                        <a:latin typeface="Calibri" panose="020F0502020204030204" pitchFamily="34" charset="0"/>
+                        <a:ea typeface="DengXian" panose="02010600030101010101" pitchFamily="2" charset="-122"/>
+                        <a:cs typeface="Arial" panose="020B0604020202020204" pitchFamily="34" charset="0"/>
+                      </a:endParaRPr>
+                    </a:p>
+                  </a:txBody>
+                  <a:tcPr marL="68580" marR="68580" marT="0" marB="0">
+                    <a:noFill/>
+                  </a:tcPr>
+                </a:tc>
+                <a:tc>
+                  <a:txBody>
+                    <a:bodyPr/>
+                    <a:lstStyle/>
+                    <a:p>
+                      <a:pPr marL="0" marR="0">
+                        <a:spcBef>
+                          <a:spcPts val="0"/>
+                        </a:spcBef>
+                        <a:spcAft>
+                          <a:spcPts val="0"/>
+                        </a:spcAft>
+                      </a:pPr>
+                      <a:r>
+                        <a:rPr lang="en-US" sz="1200">
+                          <a:effectLst/>
+                        </a:rPr>
+                        <a:t>8 way 32 KB</a:t>
+                      </a:r>
+                      <a:endParaRPr lang="en-US" sz="1200">
+                        <a:effectLst/>
+                        <a:latin typeface="Calibri" panose="020F0502020204030204" pitchFamily="34" charset="0"/>
+                        <a:ea typeface="DengXian" panose="02010600030101010101" pitchFamily="2" charset="-122"/>
+                        <a:cs typeface="Arial" panose="020B0604020202020204" pitchFamily="34" charset="0"/>
+                      </a:endParaRPr>
+                    </a:p>
+                  </a:txBody>
+                  <a:tcPr marL="68580" marR="68580" marT="0" marB="0"/>
+                </a:tc>
+                <a:extLst>
+                  <a:ext uri="{0D108BD9-81ED-4DB2-BD59-A6C34878D82A}">
+                    <a16:rowId xmlns:a16="http://schemas.microsoft.com/office/drawing/2014/main" val="2384858705"/>
+                  </a:ext>
+                </a:extLst>
+              </a:tr>
+              <a:tr h="284479">
+                <a:tc>
+                  <a:txBody>
+                    <a:bodyPr/>
+                    <a:lstStyle/>
+                    <a:p>
+                      <a:pPr marL="0" marR="0">
+                        <a:spcBef>
+                          <a:spcPts val="0"/>
+                        </a:spcBef>
+                        <a:spcAft>
+                          <a:spcPts val="0"/>
+                        </a:spcAft>
+                      </a:pPr>
+                      <a:r>
+                        <a:rPr lang="en-US" sz="1200" b="0">
+                          <a:solidFill>
+                            <a:schemeClr val="tx1"/>
+                          </a:solidFill>
+                          <a:effectLst/>
+                        </a:rPr>
+                        <a:t>L2</a:t>
+                      </a:r>
+                      <a:endParaRPr lang="en-US" sz="1200" b="0">
+                        <a:solidFill>
+                          <a:schemeClr val="tx1"/>
+                        </a:solidFill>
+                        <a:effectLst/>
+                        <a:latin typeface="Calibri" panose="020F0502020204030204" pitchFamily="34" charset="0"/>
+                        <a:ea typeface="DengXian" panose="02010600030101010101" pitchFamily="2" charset="-122"/>
+                        <a:cs typeface="Arial" panose="020B0604020202020204" pitchFamily="34" charset="0"/>
+                      </a:endParaRPr>
+                    </a:p>
+                  </a:txBody>
+                  <a:tcPr marL="68580" marR="68580" marT="0" marB="0">
+                    <a:noFill/>
+                  </a:tcPr>
+                </a:tc>
+                <a:tc>
+                  <a:txBody>
+                    <a:bodyPr/>
+                    <a:lstStyle/>
+                    <a:p>
+                      <a:pPr marL="0" marR="0">
+                        <a:spcBef>
+                          <a:spcPts val="0"/>
+                        </a:spcBef>
+                        <a:spcAft>
+                          <a:spcPts val="0"/>
+                        </a:spcAft>
+                      </a:pPr>
+                      <a:r>
+                        <a:rPr lang="en-US" sz="1200">
+                          <a:effectLst/>
+                        </a:rPr>
+                        <a:t>8 way, 256 KB</a:t>
+                      </a:r>
+                      <a:endParaRPr lang="en-US" sz="1200">
+                        <a:effectLst/>
+                        <a:latin typeface="Calibri" panose="020F0502020204030204" pitchFamily="34" charset="0"/>
+                        <a:ea typeface="DengXian" panose="02010600030101010101" pitchFamily="2" charset="-122"/>
+                        <a:cs typeface="Arial" panose="020B0604020202020204" pitchFamily="34" charset="0"/>
+                      </a:endParaRPr>
+                    </a:p>
+                  </a:txBody>
+                  <a:tcPr marL="68580" marR="68580" marT="0" marB="0"/>
+                </a:tc>
+                <a:extLst>
+                  <a:ext uri="{0D108BD9-81ED-4DB2-BD59-A6C34878D82A}">
+                    <a16:rowId xmlns:a16="http://schemas.microsoft.com/office/drawing/2014/main" val="3718167368"/>
+                  </a:ext>
+                </a:extLst>
+              </a:tr>
+              <a:tr h="284479">
+                <a:tc>
+                  <a:txBody>
+                    <a:bodyPr/>
+                    <a:lstStyle/>
+                    <a:p>
+                      <a:pPr marL="0" marR="0">
+                        <a:spcBef>
+                          <a:spcPts val="0"/>
+                        </a:spcBef>
+                        <a:spcAft>
+                          <a:spcPts val="0"/>
+                        </a:spcAft>
+                      </a:pPr>
+                      <a:r>
+                        <a:rPr lang="en-US" sz="1200" b="0" dirty="0">
+                          <a:solidFill>
+                            <a:schemeClr val="tx1"/>
+                          </a:solidFill>
+                          <a:effectLst/>
+                        </a:rPr>
+                        <a:t>L3</a:t>
+                      </a:r>
+                      <a:endParaRPr lang="en-US" sz="1200" b="0" dirty="0">
+                        <a:solidFill>
+                          <a:schemeClr val="tx1"/>
+                        </a:solidFill>
+                        <a:effectLst/>
+                        <a:latin typeface="Calibri" panose="020F0502020204030204" pitchFamily="34" charset="0"/>
+                        <a:ea typeface="DengXian" panose="02010600030101010101" pitchFamily="2" charset="-122"/>
+                        <a:cs typeface="Arial" panose="020B0604020202020204" pitchFamily="34" charset="0"/>
+                      </a:endParaRPr>
+                    </a:p>
+                  </a:txBody>
+                  <a:tcPr marL="68580" marR="68580" marT="0" marB="0">
+                    <a:noFill/>
+                  </a:tcPr>
+                </a:tc>
+                <a:tc>
+                  <a:txBody>
+                    <a:bodyPr/>
+                    <a:lstStyle/>
+                    <a:p>
+                      <a:pPr marL="0" marR="0">
+                        <a:spcBef>
+                          <a:spcPts val="0"/>
+                        </a:spcBef>
+                        <a:spcAft>
+                          <a:spcPts val="0"/>
+                        </a:spcAft>
+                      </a:pPr>
+                      <a:r>
+                        <a:rPr lang="en-US" sz="1200" dirty="0">
+                          <a:effectLst/>
+                        </a:rPr>
+                        <a:t>16 way, 16MB</a:t>
+                      </a:r>
+                      <a:endParaRPr lang="en-US" sz="1200" dirty="0">
+                        <a:effectLst/>
+                        <a:latin typeface="Calibri" panose="020F0502020204030204" pitchFamily="34" charset="0"/>
+                        <a:ea typeface="DengXian" panose="02010600030101010101" pitchFamily="2" charset="-122"/>
+                        <a:cs typeface="Arial" panose="020B0604020202020204" pitchFamily="34" charset="0"/>
+                      </a:endParaRPr>
+                    </a:p>
+                  </a:txBody>
+                  <a:tcPr marL="68580" marR="68580" marT="0" marB="0"/>
+                </a:tc>
+                <a:extLst>
+                  <a:ext uri="{0D108BD9-81ED-4DB2-BD59-A6C34878D82A}">
+                    <a16:rowId xmlns:a16="http://schemas.microsoft.com/office/drawing/2014/main" val="2718675191"/>
+                  </a:ext>
+                </a:extLst>
+              </a:tr>
+            </a:tbl>
+          </a:graphicData>
+        </a:graphic>
+      </p:graphicFrame>
+    </p:spTree>
+    <p:extLst>
+      <p:ext uri="{BB962C8B-B14F-4D97-AF65-F5344CB8AC3E}">
+        <p14:creationId xmlns:p14="http://schemas.microsoft.com/office/powerpoint/2010/main" val="260481863"/>
+      </p:ext>
+    </p:extLst>
+  </p:cSld>
+  <p:clrMapOvr>
+    <a:masterClrMapping/>
+  </p:clrMapOvr>
+  <p:transition/>
+</p:sld>
+</file>
+
+<file path=ppt/slides/slide43.xml><?xml version="1.0" encoding="utf-8"?>
+<p:sld xmlns:a="http://schemas.openxmlformats.org/drawingml/2006/main" xmlns:r="http://schemas.openxmlformats.org/officeDocument/2006/relationships" xmlns:p="http://schemas.openxmlformats.org/presentationml/2006/main">
+  <p:cSld>
+    <p:spTree>
+      <p:nvGrpSpPr>
+        <p:cNvPr id="1" name=""/>
+        <p:cNvGrpSpPr/>
+        <p:nvPr/>
+      </p:nvGrpSpPr>
+      <p:grpSpPr>
+        <a:xfrm>
+          <a:off x="0" y="0"/>
+          <a:ext cx="0" cy="0"/>
+          <a:chOff x="0" y="0"/>
+          <a:chExt cx="0" cy="0"/>
+        </a:xfrm>
+      </p:grpSpPr>
+      <p:sp>
+        <p:nvSpPr>
+          <p:cNvPr id="23556" name="Rectangle 2"/>
+          <p:cNvSpPr>
+            <a:spLocks noGrp="1" noChangeArrowheads="1"/>
+          </p:cNvSpPr>
+          <p:nvPr>
+            <p:ph type="title"/>
+          </p:nvPr>
+        </p:nvSpPr>
+        <p:spPr>
+          <a:xfrm>
+            <a:off x="682752" y="114300"/>
+            <a:ext cx="7772400" cy="838200"/>
+          </a:xfrm>
+        </p:spPr>
+        <p:txBody>
+          <a:bodyPr/>
+          <a:lstStyle/>
+          <a:p>
+            <a:r>
+              <a:rPr lang="en-US" sz="3600" dirty="0"/>
+              <a:t>Machine state (Intel x64)</a:t>
+            </a:r>
+          </a:p>
+        </p:txBody>
+      </p:sp>
+      <p:sp>
+        <p:nvSpPr>
+          <p:cNvPr id="8" name="Slide Number Placeholder 7"/>
+          <p:cNvSpPr>
+            <a:spLocks noGrp="1"/>
+          </p:cNvSpPr>
+          <p:nvPr>
+            <p:ph type="sldNum" sz="quarter" idx="12"/>
+          </p:nvPr>
+        </p:nvSpPr>
+        <p:spPr/>
+        <p:txBody>
+          <a:bodyPr/>
+          <a:lstStyle/>
+          <a:p>
+            <a:pPr>
+              <a:defRPr/>
+            </a:pPr>
+            <a:fld id="{8E09DF16-9352-46A7-97F1-1D13A8547ADD}" type="slidenum">
+              <a:rPr lang="en-US" smtClean="0"/>
+              <a:pPr>
+                <a:defRPr/>
+              </a:pPr>
+              <a:t>43</a:t>
+            </a:fld>
+            <a:endParaRPr lang="en-US"/>
+          </a:p>
+        </p:txBody>
+      </p:sp>
+      <p:sp>
+        <p:nvSpPr>
+          <p:cNvPr id="2" name="Rectangle 2">
+            <a:extLst>
+              <a:ext uri="{FF2B5EF4-FFF2-40B4-BE49-F238E27FC236}">
+                <a16:creationId xmlns:a16="http://schemas.microsoft.com/office/drawing/2014/main" id="{C0D3418F-80B0-844C-8418-6CC7A95790AB}"/>
+              </a:ext>
+            </a:extLst>
+          </p:cNvPr>
+          <p:cNvSpPr>
+            <a:spLocks noChangeArrowheads="1"/>
+          </p:cNvSpPr>
+          <p:nvPr/>
+        </p:nvSpPr>
+        <p:spPr bwMode="auto">
+          <a:xfrm>
+            <a:off x="0" y="0"/>
+            <a:ext cx="9144000" cy="0"/>
+          </a:xfrm>
+          <a:prstGeom prst="rect">
+            <a:avLst/>
+          </a:prstGeom>
+          <a:noFill/>
+          <a:ln>
+            <a:noFill/>
+          </a:ln>
+          <a:effectLst/>
+          <a:extLst>
+            <a:ext uri="{909E8E84-426E-40DD-AFC4-6F175D3DCCD1}">
+              <a14:hiddenFill xmlns:a14="http://schemas.microsoft.com/office/drawing/2010/main">
+                <a:solidFill>
+                  <a:schemeClr val="accent1"/>
+                </a:solidFill>
+              </a14:hiddenFill>
+            </a:ext>
+            <a:ext uri="{91240B29-F687-4F45-9708-019B960494DF}">
+              <a14:hiddenLine xmlns:a14="http://schemas.microsoft.com/office/drawing/2010/main" w="9525">
+                <a:solidFill>
+                  <a:schemeClr val="tx1"/>
+                </a:solidFill>
+                <a:miter lim="800000"/>
+                <a:headEnd/>
+                <a:tailEnd/>
+              </a14:hiddenLine>
+            </a:ext>
+            <a:ext uri="{AF507438-7753-43E0-B8FC-AC1667EBCBE1}">
+              <a14:hiddenEffects xmlns:a14="http://schemas.microsoft.com/office/drawing/2010/main">
+                <a:effectLst>
+                  <a:outerShdw dist="35921" dir="2700000" algn="ctr" rotWithShape="0">
+                    <a:schemeClr val="bg2"/>
+                  </a:outerShdw>
+                </a:effectLst>
+              </a14:hiddenEffects>
+            </a:ext>
+          </a:extLst>
+        </p:spPr>
+        <p:txBody>
+          <a:bodyPr vert="horz" wrap="none" lIns="91440" tIns="45720" rIns="91440" bIns="45720" numCol="1" anchor="ctr" anchorCtr="0" compatLnSpc="1">
+            <a:prstTxWarp prst="textNoShape">
+              <a:avLst/>
+            </a:prstTxWarp>
+            <a:spAutoFit/>
+          </a:bodyPr>
+          <a:lstStyle/>
+          <a:p>
+            <a:endParaRPr lang="en-US"/>
+          </a:p>
+        </p:txBody>
+      </p:sp>
+      <p:graphicFrame>
+        <p:nvGraphicFramePr>
+          <p:cNvPr id="3" name="Table 2">
+            <a:extLst>
+              <a:ext uri="{FF2B5EF4-FFF2-40B4-BE49-F238E27FC236}">
+                <a16:creationId xmlns:a16="http://schemas.microsoft.com/office/drawing/2014/main" id="{8EB235B7-E2F5-C44F-A3B3-6B25F0C02723}"/>
+              </a:ext>
+            </a:extLst>
+          </p:cNvPr>
+          <p:cNvGraphicFramePr>
+            <a:graphicFrameLocks noGrp="1"/>
+          </p:cNvGraphicFramePr>
+          <p:nvPr>
+            <p:extLst>
+              <p:ext uri="{D42A27DB-BD31-4B8C-83A1-F6EECF244321}">
+                <p14:modId xmlns:p14="http://schemas.microsoft.com/office/powerpoint/2010/main" val="391327718"/>
+              </p:ext>
+            </p:extLst>
+          </p:nvPr>
+        </p:nvGraphicFramePr>
+        <p:xfrm>
+          <a:off x="493776" y="1804320"/>
+          <a:ext cx="8150352" cy="3592260"/>
+        </p:xfrm>
+        <a:graphic>
+          <a:graphicData uri="http://schemas.openxmlformats.org/drawingml/2006/table">
+            <a:tbl>
+              <a:tblPr firstRow="1" firstCol="1" bandRow="1">
+                <a:tableStyleId>{5C22544A-7EE6-4342-B048-85BDC9FD1C3A}</a:tableStyleId>
+              </a:tblPr>
+              <a:tblGrid>
+                <a:gridCol w="3886200">
+                  <a:extLst>
+                    <a:ext uri="{9D8B030D-6E8A-4147-A177-3AD203B41FA5}">
+                      <a16:colId xmlns:a16="http://schemas.microsoft.com/office/drawing/2014/main" val="872588650"/>
+                    </a:ext>
+                  </a:extLst>
+                </a:gridCol>
+                <a:gridCol w="4264152">
+                  <a:extLst>
+                    <a:ext uri="{9D8B030D-6E8A-4147-A177-3AD203B41FA5}">
+                      <a16:colId xmlns:a16="http://schemas.microsoft.com/office/drawing/2014/main" val="1150892001"/>
+                    </a:ext>
+                  </a:extLst>
+                </a:gridCol>
+              </a:tblGrid>
+              <a:tr h="299355">
+                <a:tc>
+                  <a:txBody>
+                    <a:bodyPr/>
+                    <a:lstStyle/>
+                    <a:p>
+                      <a:pPr marL="0" marR="0">
+                        <a:spcBef>
+                          <a:spcPts val="0"/>
+                        </a:spcBef>
+                        <a:spcAft>
+                          <a:spcPts val="0"/>
+                        </a:spcAft>
+                      </a:pPr>
+                      <a:r>
+                        <a:rPr lang="en-US" sz="1200" dirty="0">
+                          <a:solidFill>
+                            <a:schemeClr val="tx1"/>
+                          </a:solidFill>
+                          <a:effectLst/>
+                        </a:rPr>
+                        <a:t>Feature</a:t>
+                      </a:r>
+                      <a:endParaRPr lang="en-US" sz="1200" dirty="0">
+                        <a:solidFill>
+                          <a:schemeClr val="tx1"/>
+                        </a:solidFill>
+                        <a:effectLst/>
+                        <a:latin typeface="Calibri" panose="020F0502020204030204" pitchFamily="34" charset="0"/>
+                        <a:ea typeface="DengXian" panose="02010600030101010101" pitchFamily="2" charset="-122"/>
+                        <a:cs typeface="Arial" panose="020B0604020202020204" pitchFamily="34" charset="0"/>
+                      </a:endParaRPr>
+                    </a:p>
+                  </a:txBody>
+                  <a:tcPr marL="68580" marR="68580" marT="0" marB="0"/>
+                </a:tc>
+                <a:tc>
+                  <a:txBody>
+                    <a:bodyPr/>
+                    <a:lstStyle/>
+                    <a:p>
+                      <a:pPr marL="0" marR="0">
+                        <a:spcBef>
+                          <a:spcPts val="0"/>
+                        </a:spcBef>
+                        <a:spcAft>
+                          <a:spcPts val="0"/>
+                        </a:spcAft>
+                      </a:pPr>
+                      <a:r>
+                        <a:rPr lang="en-US" sz="1200" dirty="0">
+                          <a:solidFill>
+                            <a:schemeClr val="tx1"/>
+                          </a:solidFill>
+                          <a:effectLst/>
+                        </a:rPr>
+                        <a:t>Core i7</a:t>
+                      </a:r>
+                      <a:endParaRPr lang="en-US" sz="1200" dirty="0">
+                        <a:solidFill>
+                          <a:schemeClr val="tx1"/>
+                        </a:solidFill>
+                        <a:effectLst/>
+                        <a:latin typeface="Calibri" panose="020F0502020204030204" pitchFamily="34" charset="0"/>
+                        <a:ea typeface="DengXian" panose="02010600030101010101" pitchFamily="2" charset="-122"/>
+                        <a:cs typeface="Arial" panose="020B0604020202020204" pitchFamily="34" charset="0"/>
+                      </a:endParaRPr>
+                    </a:p>
+                  </a:txBody>
+                  <a:tcPr marL="68580" marR="68580" marT="0" marB="0"/>
+                </a:tc>
+                <a:extLst>
+                  <a:ext uri="{0D108BD9-81ED-4DB2-BD59-A6C34878D82A}">
+                    <a16:rowId xmlns:a16="http://schemas.microsoft.com/office/drawing/2014/main" val="3098079186"/>
+                  </a:ext>
+                </a:extLst>
+              </a:tr>
+              <a:tr h="299355">
+                <a:tc>
+                  <a:txBody>
+                    <a:bodyPr/>
+                    <a:lstStyle/>
+                    <a:p>
+                      <a:pPr marL="0" marR="0">
+                        <a:spcBef>
+                          <a:spcPts val="0"/>
+                        </a:spcBef>
+                        <a:spcAft>
+                          <a:spcPts val="0"/>
+                        </a:spcAft>
+                      </a:pPr>
+                      <a:r>
+                        <a:rPr lang="en-US" sz="1200" b="0">
+                          <a:solidFill>
+                            <a:schemeClr val="tx1"/>
+                          </a:solidFill>
+                          <a:effectLst/>
+                        </a:rPr>
+                        <a:t>L1 latency</a:t>
+                      </a:r>
+                      <a:endParaRPr lang="en-US" sz="1200" b="0">
+                        <a:solidFill>
+                          <a:schemeClr val="tx1"/>
+                        </a:solidFill>
+                        <a:effectLst/>
+                        <a:latin typeface="Calibri" panose="020F0502020204030204" pitchFamily="34" charset="0"/>
+                        <a:ea typeface="DengXian" panose="02010600030101010101" pitchFamily="2" charset="-122"/>
+                        <a:cs typeface="Arial" panose="020B0604020202020204" pitchFamily="34" charset="0"/>
+                      </a:endParaRPr>
+                    </a:p>
+                  </a:txBody>
+                  <a:tcPr marL="68580" marR="68580" marT="0" marB="0">
+                    <a:noFill/>
+                  </a:tcPr>
+                </a:tc>
+                <a:tc>
+                  <a:txBody>
+                    <a:bodyPr/>
+                    <a:lstStyle/>
+                    <a:p>
+                      <a:pPr marL="0" marR="0">
+                        <a:spcBef>
+                          <a:spcPts val="0"/>
+                        </a:spcBef>
+                        <a:spcAft>
+                          <a:spcPts val="0"/>
+                        </a:spcAft>
+                      </a:pPr>
+                      <a:r>
+                        <a:rPr lang="en-US" sz="1200">
+                          <a:effectLst/>
+                        </a:rPr>
+                        <a:t>4 cycles</a:t>
+                      </a:r>
+                      <a:endParaRPr lang="en-US" sz="1200">
+                        <a:effectLst/>
+                        <a:latin typeface="Calibri" panose="020F0502020204030204" pitchFamily="34" charset="0"/>
+                        <a:ea typeface="DengXian" panose="02010600030101010101" pitchFamily="2" charset="-122"/>
+                        <a:cs typeface="Arial" panose="020B0604020202020204" pitchFamily="34" charset="0"/>
+                      </a:endParaRPr>
+                    </a:p>
+                  </a:txBody>
+                  <a:tcPr marL="68580" marR="68580" marT="0" marB="0"/>
+                </a:tc>
+                <a:extLst>
+                  <a:ext uri="{0D108BD9-81ED-4DB2-BD59-A6C34878D82A}">
+                    <a16:rowId xmlns:a16="http://schemas.microsoft.com/office/drawing/2014/main" val="744803261"/>
+                  </a:ext>
+                </a:extLst>
+              </a:tr>
+              <a:tr h="299355">
+                <a:tc>
+                  <a:txBody>
+                    <a:bodyPr/>
+                    <a:lstStyle/>
+                    <a:p>
+                      <a:pPr marL="0" marR="0">
+                        <a:spcBef>
+                          <a:spcPts val="0"/>
+                        </a:spcBef>
+                        <a:spcAft>
+                          <a:spcPts val="0"/>
+                        </a:spcAft>
+                      </a:pPr>
+                      <a:r>
+                        <a:rPr lang="en-US" sz="1200" b="0">
+                          <a:solidFill>
+                            <a:schemeClr val="tx1"/>
+                          </a:solidFill>
+                          <a:effectLst/>
+                        </a:rPr>
+                        <a:t>L2 latency</a:t>
+                      </a:r>
+                      <a:endParaRPr lang="en-US" sz="1200" b="0">
+                        <a:solidFill>
+                          <a:schemeClr val="tx1"/>
+                        </a:solidFill>
+                        <a:effectLst/>
+                        <a:latin typeface="Calibri" panose="020F0502020204030204" pitchFamily="34" charset="0"/>
+                        <a:ea typeface="DengXian" panose="02010600030101010101" pitchFamily="2" charset="-122"/>
+                        <a:cs typeface="Arial" panose="020B0604020202020204" pitchFamily="34" charset="0"/>
+                      </a:endParaRPr>
+                    </a:p>
+                  </a:txBody>
+                  <a:tcPr marL="68580" marR="68580" marT="0" marB="0">
+                    <a:noFill/>
+                  </a:tcPr>
+                </a:tc>
+                <a:tc>
+                  <a:txBody>
+                    <a:bodyPr/>
+                    <a:lstStyle/>
+                    <a:p>
+                      <a:pPr marL="0" marR="0">
+                        <a:spcBef>
+                          <a:spcPts val="0"/>
+                        </a:spcBef>
+                        <a:spcAft>
+                          <a:spcPts val="0"/>
+                        </a:spcAft>
+                      </a:pPr>
+                      <a:r>
+                        <a:rPr lang="en-US" sz="1200">
+                          <a:effectLst/>
+                        </a:rPr>
+                        <a:t>12 cycles</a:t>
+                      </a:r>
+                      <a:endParaRPr lang="en-US" sz="1200">
+                        <a:effectLst/>
+                        <a:latin typeface="Calibri" panose="020F0502020204030204" pitchFamily="34" charset="0"/>
+                        <a:ea typeface="DengXian" panose="02010600030101010101" pitchFamily="2" charset="-122"/>
+                        <a:cs typeface="Arial" panose="020B0604020202020204" pitchFamily="34" charset="0"/>
+                      </a:endParaRPr>
+                    </a:p>
+                  </a:txBody>
+                  <a:tcPr marL="68580" marR="68580" marT="0" marB="0"/>
+                </a:tc>
+                <a:extLst>
+                  <a:ext uri="{0D108BD9-81ED-4DB2-BD59-A6C34878D82A}">
+                    <a16:rowId xmlns:a16="http://schemas.microsoft.com/office/drawing/2014/main" val="4141616736"/>
+                  </a:ext>
+                </a:extLst>
+              </a:tr>
+              <a:tr h="299355">
+                <a:tc>
+                  <a:txBody>
+                    <a:bodyPr/>
+                    <a:lstStyle/>
+                    <a:p>
+                      <a:pPr marL="0" marR="0">
+                        <a:spcBef>
+                          <a:spcPts val="0"/>
+                        </a:spcBef>
+                        <a:spcAft>
+                          <a:spcPts val="0"/>
+                        </a:spcAft>
+                      </a:pPr>
+                      <a:r>
+                        <a:rPr lang="en-US" sz="1200" b="0">
+                          <a:solidFill>
+                            <a:schemeClr val="tx1"/>
+                          </a:solidFill>
+                          <a:effectLst/>
+                        </a:rPr>
+                        <a:t>L3 latency</a:t>
+                      </a:r>
+                      <a:endParaRPr lang="en-US" sz="1200" b="0">
+                        <a:solidFill>
+                          <a:schemeClr val="tx1"/>
+                        </a:solidFill>
+                        <a:effectLst/>
+                        <a:latin typeface="Calibri" panose="020F0502020204030204" pitchFamily="34" charset="0"/>
+                        <a:ea typeface="DengXian" panose="02010600030101010101" pitchFamily="2" charset="-122"/>
+                        <a:cs typeface="Arial" panose="020B0604020202020204" pitchFamily="34" charset="0"/>
+                      </a:endParaRPr>
+                    </a:p>
+                  </a:txBody>
+                  <a:tcPr marL="68580" marR="68580" marT="0" marB="0">
+                    <a:noFill/>
+                  </a:tcPr>
+                </a:tc>
+                <a:tc>
+                  <a:txBody>
+                    <a:bodyPr/>
+                    <a:lstStyle/>
+                    <a:p>
+                      <a:pPr marL="0" marR="0">
+                        <a:spcBef>
+                          <a:spcPts val="0"/>
+                        </a:spcBef>
+                        <a:spcAft>
+                          <a:spcPts val="0"/>
+                        </a:spcAft>
+                      </a:pPr>
+                      <a:r>
+                        <a:rPr lang="en-US" sz="1200">
+                          <a:effectLst/>
+                        </a:rPr>
+                        <a:t>36 cycles</a:t>
+                      </a:r>
+                      <a:endParaRPr lang="en-US" sz="1200">
+                        <a:effectLst/>
+                        <a:latin typeface="Calibri" panose="020F0502020204030204" pitchFamily="34" charset="0"/>
+                        <a:ea typeface="DengXian" panose="02010600030101010101" pitchFamily="2" charset="-122"/>
+                        <a:cs typeface="Arial" panose="020B0604020202020204" pitchFamily="34" charset="0"/>
+                      </a:endParaRPr>
+                    </a:p>
+                  </a:txBody>
+                  <a:tcPr marL="68580" marR="68580" marT="0" marB="0"/>
+                </a:tc>
+                <a:extLst>
+                  <a:ext uri="{0D108BD9-81ED-4DB2-BD59-A6C34878D82A}">
+                    <a16:rowId xmlns:a16="http://schemas.microsoft.com/office/drawing/2014/main" val="150939457"/>
+                  </a:ext>
+                </a:extLst>
+              </a:tr>
+              <a:tr h="299355">
+                <a:tc>
+                  <a:txBody>
+                    <a:bodyPr/>
+                    <a:lstStyle/>
+                    <a:p>
+                      <a:pPr marL="0" marR="0">
+                        <a:spcBef>
+                          <a:spcPts val="0"/>
+                        </a:spcBef>
+                        <a:spcAft>
+                          <a:spcPts val="0"/>
+                        </a:spcAft>
+                      </a:pPr>
+                      <a:r>
+                        <a:rPr lang="en-US" sz="1200" b="0">
+                          <a:solidFill>
+                            <a:schemeClr val="tx1"/>
+                          </a:solidFill>
+                          <a:effectLst/>
+                        </a:rPr>
+                        <a:t>Size of cache block</a:t>
+                      </a:r>
+                      <a:endParaRPr lang="en-US" sz="1200" b="0">
+                        <a:solidFill>
+                          <a:schemeClr val="tx1"/>
+                        </a:solidFill>
+                        <a:effectLst/>
+                        <a:latin typeface="Calibri" panose="020F0502020204030204" pitchFamily="34" charset="0"/>
+                        <a:ea typeface="DengXian" panose="02010600030101010101" pitchFamily="2" charset="-122"/>
+                        <a:cs typeface="Arial" panose="020B0604020202020204" pitchFamily="34" charset="0"/>
+                      </a:endParaRPr>
+                    </a:p>
+                  </a:txBody>
+                  <a:tcPr marL="68580" marR="68580" marT="0" marB="0">
+                    <a:noFill/>
+                  </a:tcPr>
+                </a:tc>
+                <a:tc>
+                  <a:txBody>
+                    <a:bodyPr/>
+                    <a:lstStyle/>
+                    <a:p>
+                      <a:pPr marL="0" marR="0">
+                        <a:spcBef>
+                          <a:spcPts val="0"/>
+                        </a:spcBef>
+                        <a:spcAft>
+                          <a:spcPts val="0"/>
+                        </a:spcAft>
+                      </a:pPr>
+                      <a:r>
+                        <a:rPr lang="en-US" sz="1200">
+                          <a:effectLst/>
+                        </a:rPr>
+                        <a:t>64Bytes</a:t>
+                      </a:r>
+                      <a:endParaRPr lang="en-US" sz="1200">
+                        <a:effectLst/>
+                        <a:latin typeface="Calibri" panose="020F0502020204030204" pitchFamily="34" charset="0"/>
+                        <a:ea typeface="DengXian" panose="02010600030101010101" pitchFamily="2" charset="-122"/>
+                        <a:cs typeface="Arial" panose="020B0604020202020204" pitchFamily="34" charset="0"/>
+                      </a:endParaRPr>
+                    </a:p>
+                  </a:txBody>
+                  <a:tcPr marL="68580" marR="68580" marT="0" marB="0"/>
+                </a:tc>
+                <a:extLst>
+                  <a:ext uri="{0D108BD9-81ED-4DB2-BD59-A6C34878D82A}">
+                    <a16:rowId xmlns:a16="http://schemas.microsoft.com/office/drawing/2014/main" val="879061659"/>
+                  </a:ext>
+                </a:extLst>
+              </a:tr>
+              <a:tr h="299355">
+                <a:tc>
+                  <a:txBody>
+                    <a:bodyPr/>
+                    <a:lstStyle/>
+                    <a:p>
+                      <a:pPr marL="0" marR="0">
+                        <a:spcBef>
+                          <a:spcPts val="0"/>
+                        </a:spcBef>
+                        <a:spcAft>
+                          <a:spcPts val="0"/>
+                        </a:spcAft>
+                      </a:pPr>
+                      <a:r>
+                        <a:rPr lang="en-US" sz="1200" b="0">
+                          <a:solidFill>
+                            <a:schemeClr val="tx1"/>
+                          </a:solidFill>
+                          <a:effectLst/>
+                        </a:rPr>
+                        <a:t>BTB associativity</a:t>
+                      </a:r>
+                      <a:endParaRPr lang="en-US" sz="1200" b="0">
+                        <a:solidFill>
+                          <a:schemeClr val="tx1"/>
+                        </a:solidFill>
+                        <a:effectLst/>
+                        <a:latin typeface="Calibri" panose="020F0502020204030204" pitchFamily="34" charset="0"/>
+                        <a:ea typeface="DengXian" panose="02010600030101010101" pitchFamily="2" charset="-122"/>
+                        <a:cs typeface="Arial" panose="020B0604020202020204" pitchFamily="34" charset="0"/>
+                      </a:endParaRPr>
+                    </a:p>
+                  </a:txBody>
+                  <a:tcPr marL="68580" marR="68580" marT="0" marB="0">
+                    <a:noFill/>
+                  </a:tcPr>
+                </a:tc>
+                <a:tc>
+                  <a:txBody>
+                    <a:bodyPr/>
+                    <a:lstStyle/>
+                    <a:p>
+                      <a:pPr marL="0" marR="0">
+                        <a:spcBef>
+                          <a:spcPts val="0"/>
+                        </a:spcBef>
+                        <a:spcAft>
+                          <a:spcPts val="0"/>
+                        </a:spcAft>
+                      </a:pPr>
+                      <a:r>
+                        <a:rPr lang="en-US" sz="1200" dirty="0">
+                          <a:effectLst/>
+                        </a:rPr>
+                        <a:t>4096, 4 way</a:t>
+                      </a:r>
+                      <a:endParaRPr lang="en-US" sz="1200" dirty="0">
+                        <a:effectLst/>
+                        <a:latin typeface="Calibri" panose="020F0502020204030204" pitchFamily="34" charset="0"/>
+                        <a:ea typeface="DengXian" panose="02010600030101010101" pitchFamily="2" charset="-122"/>
+                        <a:cs typeface="Arial" panose="020B0604020202020204" pitchFamily="34" charset="0"/>
+                      </a:endParaRPr>
+                    </a:p>
+                  </a:txBody>
+                  <a:tcPr marL="68580" marR="68580" marT="0" marB="0"/>
+                </a:tc>
+                <a:extLst>
+                  <a:ext uri="{0D108BD9-81ED-4DB2-BD59-A6C34878D82A}">
+                    <a16:rowId xmlns:a16="http://schemas.microsoft.com/office/drawing/2014/main" val="1508163588"/>
+                  </a:ext>
+                </a:extLst>
+              </a:tr>
+              <a:tr h="299355">
+                <a:tc>
+                  <a:txBody>
+                    <a:bodyPr/>
+                    <a:lstStyle/>
+                    <a:p>
+                      <a:pPr marL="0" marR="0">
+                        <a:spcBef>
+                          <a:spcPts val="0"/>
+                        </a:spcBef>
+                        <a:spcAft>
+                          <a:spcPts val="0"/>
+                        </a:spcAft>
+                      </a:pPr>
+                      <a:r>
+                        <a:rPr lang="en-US" sz="1200" b="0">
+                          <a:solidFill>
+                            <a:schemeClr val="tx1"/>
+                          </a:solidFill>
+                          <a:effectLst/>
+                        </a:rPr>
+                        <a:t>RAS</a:t>
+                      </a:r>
+                      <a:endParaRPr lang="en-US" sz="1200" b="0">
+                        <a:solidFill>
+                          <a:schemeClr val="tx1"/>
+                        </a:solidFill>
+                        <a:effectLst/>
+                        <a:latin typeface="Calibri" panose="020F0502020204030204" pitchFamily="34" charset="0"/>
+                        <a:ea typeface="DengXian" panose="02010600030101010101" pitchFamily="2" charset="-122"/>
+                        <a:cs typeface="Arial" panose="020B0604020202020204" pitchFamily="34" charset="0"/>
+                      </a:endParaRPr>
+                    </a:p>
+                  </a:txBody>
+                  <a:tcPr marL="68580" marR="68580" marT="0" marB="0">
+                    <a:noFill/>
+                  </a:tcPr>
+                </a:tc>
+                <a:tc>
+                  <a:txBody>
+                    <a:bodyPr/>
+                    <a:lstStyle/>
+                    <a:p>
+                      <a:pPr marL="0" marR="0">
+                        <a:spcBef>
+                          <a:spcPts val="0"/>
+                        </a:spcBef>
+                        <a:spcAft>
+                          <a:spcPts val="0"/>
+                        </a:spcAft>
+                      </a:pPr>
+                      <a:r>
+                        <a:rPr lang="en-US" sz="1200" dirty="0">
+                          <a:effectLst/>
+                        </a:rPr>
+                        <a:t>16 entries</a:t>
+                      </a:r>
+                      <a:endParaRPr lang="en-US" sz="1200" dirty="0">
+                        <a:effectLst/>
+                        <a:latin typeface="Calibri" panose="020F0502020204030204" pitchFamily="34" charset="0"/>
+                        <a:ea typeface="DengXian" panose="02010600030101010101" pitchFamily="2" charset="-122"/>
+                        <a:cs typeface="Arial" panose="020B0604020202020204" pitchFamily="34" charset="0"/>
+                      </a:endParaRPr>
+                    </a:p>
+                  </a:txBody>
+                  <a:tcPr marL="68580" marR="68580" marT="0" marB="0"/>
+                </a:tc>
+                <a:extLst>
+                  <a:ext uri="{0D108BD9-81ED-4DB2-BD59-A6C34878D82A}">
+                    <a16:rowId xmlns:a16="http://schemas.microsoft.com/office/drawing/2014/main" val="757283273"/>
+                  </a:ext>
+                </a:extLst>
+              </a:tr>
+              <a:tr h="299355">
+                <a:tc>
+                  <a:txBody>
+                    <a:bodyPr/>
+                    <a:lstStyle/>
+                    <a:p>
+                      <a:pPr marL="0" marR="0">
+                        <a:spcBef>
+                          <a:spcPts val="0"/>
+                        </a:spcBef>
+                        <a:spcAft>
+                          <a:spcPts val="0"/>
+                        </a:spcAft>
+                      </a:pPr>
+                      <a:r>
+                        <a:rPr lang="en-US" sz="1200" b="0">
+                          <a:solidFill>
+                            <a:schemeClr val="tx1"/>
+                          </a:solidFill>
+                          <a:effectLst/>
+                        </a:rPr>
+                        <a:t>Branch mispredict penalty</a:t>
+                      </a:r>
+                      <a:endParaRPr lang="en-US" sz="1200" b="0">
+                        <a:solidFill>
+                          <a:schemeClr val="tx1"/>
+                        </a:solidFill>
+                        <a:effectLst/>
+                        <a:latin typeface="Calibri" panose="020F0502020204030204" pitchFamily="34" charset="0"/>
+                        <a:ea typeface="DengXian" panose="02010600030101010101" pitchFamily="2" charset="-122"/>
+                        <a:cs typeface="Arial" panose="020B0604020202020204" pitchFamily="34" charset="0"/>
+                      </a:endParaRPr>
+                    </a:p>
+                  </a:txBody>
+                  <a:tcPr marL="68580" marR="68580" marT="0" marB="0">
+                    <a:noFill/>
+                  </a:tcPr>
+                </a:tc>
+                <a:tc>
+                  <a:txBody>
+                    <a:bodyPr/>
+                    <a:lstStyle/>
+                    <a:p>
+                      <a:pPr marL="0" marR="0">
+                        <a:spcBef>
+                          <a:spcPts val="0"/>
+                        </a:spcBef>
+                        <a:spcAft>
+                          <a:spcPts val="0"/>
+                        </a:spcAft>
+                      </a:pPr>
+                      <a:r>
+                        <a:rPr lang="en-US" sz="1200">
+                          <a:effectLst/>
+                        </a:rPr>
+                        <a:t>14 cycles</a:t>
+                      </a:r>
+                      <a:endParaRPr lang="en-US" sz="1200">
+                        <a:effectLst/>
+                        <a:latin typeface="Calibri" panose="020F0502020204030204" pitchFamily="34" charset="0"/>
+                        <a:ea typeface="DengXian" panose="02010600030101010101" pitchFamily="2" charset="-122"/>
+                        <a:cs typeface="Arial" panose="020B0604020202020204" pitchFamily="34" charset="0"/>
+                      </a:endParaRPr>
+                    </a:p>
+                  </a:txBody>
+                  <a:tcPr marL="68580" marR="68580" marT="0" marB="0"/>
+                </a:tc>
+                <a:extLst>
+                  <a:ext uri="{0D108BD9-81ED-4DB2-BD59-A6C34878D82A}">
+                    <a16:rowId xmlns:a16="http://schemas.microsoft.com/office/drawing/2014/main" val="4027538635"/>
+                  </a:ext>
+                </a:extLst>
+              </a:tr>
+              <a:tr h="299355">
+                <a:tc>
+                  <a:txBody>
+                    <a:bodyPr/>
+                    <a:lstStyle/>
+                    <a:p>
+                      <a:pPr marL="0" marR="0">
+                        <a:spcBef>
+                          <a:spcPts val="0"/>
+                        </a:spcBef>
+                        <a:spcAft>
+                          <a:spcPts val="0"/>
+                        </a:spcAft>
+                      </a:pPr>
+                      <a:r>
+                        <a:rPr lang="en-US" sz="1200" b="0">
+                          <a:solidFill>
+                            <a:schemeClr val="tx1"/>
+                          </a:solidFill>
+                          <a:effectLst/>
+                        </a:rPr>
+                        <a:t>Integer/float registers</a:t>
+                      </a:r>
+                      <a:endParaRPr lang="en-US" sz="1200" b="0">
+                        <a:solidFill>
+                          <a:schemeClr val="tx1"/>
+                        </a:solidFill>
+                        <a:effectLst/>
+                        <a:latin typeface="Calibri" panose="020F0502020204030204" pitchFamily="34" charset="0"/>
+                        <a:ea typeface="DengXian" panose="02010600030101010101" pitchFamily="2" charset="-122"/>
+                        <a:cs typeface="Arial" panose="020B0604020202020204" pitchFamily="34" charset="0"/>
+                      </a:endParaRPr>
+                    </a:p>
+                  </a:txBody>
+                  <a:tcPr marL="68580" marR="68580" marT="0" marB="0">
+                    <a:noFill/>
+                  </a:tcPr>
+                </a:tc>
+                <a:tc>
+                  <a:txBody>
+                    <a:bodyPr/>
+                    <a:lstStyle/>
+                    <a:p>
+                      <a:pPr marL="0" marR="0">
+                        <a:spcBef>
+                          <a:spcPts val="0"/>
+                        </a:spcBef>
+                        <a:spcAft>
+                          <a:spcPts val="0"/>
+                        </a:spcAft>
+                      </a:pPr>
+                      <a:r>
+                        <a:rPr lang="en-US" sz="1200">
+                          <a:effectLst/>
+                        </a:rPr>
+                        <a:t>168/168</a:t>
+                      </a:r>
+                      <a:endParaRPr lang="en-US" sz="1200">
+                        <a:effectLst/>
+                        <a:latin typeface="Calibri" panose="020F0502020204030204" pitchFamily="34" charset="0"/>
+                        <a:ea typeface="DengXian" panose="02010600030101010101" pitchFamily="2" charset="-122"/>
+                        <a:cs typeface="Arial" panose="020B0604020202020204" pitchFamily="34" charset="0"/>
+                      </a:endParaRPr>
+                    </a:p>
+                  </a:txBody>
+                  <a:tcPr marL="68580" marR="68580" marT="0" marB="0"/>
+                </a:tc>
+                <a:extLst>
+                  <a:ext uri="{0D108BD9-81ED-4DB2-BD59-A6C34878D82A}">
+                    <a16:rowId xmlns:a16="http://schemas.microsoft.com/office/drawing/2014/main" val="4145350275"/>
+                  </a:ext>
+                </a:extLst>
+              </a:tr>
+              <a:tr h="299355">
+                <a:tc>
+                  <a:txBody>
+                    <a:bodyPr/>
+                    <a:lstStyle/>
+                    <a:p>
+                      <a:pPr marL="0" marR="0">
+                        <a:spcBef>
+                          <a:spcPts val="0"/>
+                        </a:spcBef>
+                        <a:spcAft>
+                          <a:spcPts val="0"/>
+                        </a:spcAft>
+                      </a:pPr>
+                      <a:r>
+                        <a:rPr lang="en-US" sz="1200" b="0">
+                          <a:solidFill>
+                            <a:schemeClr val="tx1"/>
+                          </a:solidFill>
+                          <a:effectLst/>
+                        </a:rPr>
+                        <a:t>Instruction TLB</a:t>
+                      </a:r>
+                      <a:endParaRPr lang="en-US" sz="1200" b="0">
+                        <a:solidFill>
+                          <a:schemeClr val="tx1"/>
+                        </a:solidFill>
+                        <a:effectLst/>
+                        <a:latin typeface="Calibri" panose="020F0502020204030204" pitchFamily="34" charset="0"/>
+                        <a:ea typeface="DengXian" panose="02010600030101010101" pitchFamily="2" charset="-122"/>
+                        <a:cs typeface="Arial" panose="020B0604020202020204" pitchFamily="34" charset="0"/>
+                      </a:endParaRPr>
+                    </a:p>
+                  </a:txBody>
+                  <a:tcPr marL="68580" marR="68580" marT="0" marB="0">
+                    <a:noFill/>
+                  </a:tcPr>
+                </a:tc>
+                <a:tc>
+                  <a:txBody>
+                    <a:bodyPr/>
+                    <a:lstStyle/>
+                    <a:p>
+                      <a:pPr marL="0" marR="0">
+                        <a:spcBef>
+                          <a:spcPts val="0"/>
+                        </a:spcBef>
+                        <a:spcAft>
+                          <a:spcPts val="0"/>
+                        </a:spcAft>
+                      </a:pPr>
+                      <a:r>
+                        <a:rPr lang="en-US" sz="1200" dirty="0">
+                          <a:effectLst/>
+                        </a:rPr>
+                        <a:t>128 entries</a:t>
+                      </a:r>
+                      <a:endParaRPr lang="en-US" sz="1200" dirty="0">
+                        <a:effectLst/>
+                        <a:latin typeface="Calibri" panose="020F0502020204030204" pitchFamily="34" charset="0"/>
+                        <a:ea typeface="DengXian" panose="02010600030101010101" pitchFamily="2" charset="-122"/>
+                        <a:cs typeface="Arial" panose="020B0604020202020204" pitchFamily="34" charset="0"/>
+                      </a:endParaRPr>
+                    </a:p>
+                  </a:txBody>
+                  <a:tcPr marL="68580" marR="68580" marT="0" marB="0"/>
+                </a:tc>
+                <a:extLst>
+                  <a:ext uri="{0D108BD9-81ED-4DB2-BD59-A6C34878D82A}">
+                    <a16:rowId xmlns:a16="http://schemas.microsoft.com/office/drawing/2014/main" val="1079634515"/>
+                  </a:ext>
+                </a:extLst>
+              </a:tr>
+              <a:tr h="299355">
+                <a:tc>
+                  <a:txBody>
+                    <a:bodyPr/>
+                    <a:lstStyle/>
+                    <a:p>
+                      <a:pPr marL="0" marR="0">
+                        <a:spcBef>
+                          <a:spcPts val="0"/>
+                        </a:spcBef>
+                        <a:spcAft>
+                          <a:spcPts val="0"/>
+                        </a:spcAft>
+                      </a:pPr>
+                      <a:r>
+                        <a:rPr lang="en-US" sz="1200" b="0">
+                          <a:solidFill>
+                            <a:schemeClr val="tx1"/>
+                          </a:solidFill>
+                          <a:effectLst/>
+                        </a:rPr>
+                        <a:t>Data TLB, associativity</a:t>
+                      </a:r>
+                      <a:endParaRPr lang="en-US" sz="1200" b="0">
+                        <a:solidFill>
+                          <a:schemeClr val="tx1"/>
+                        </a:solidFill>
+                        <a:effectLst/>
+                        <a:latin typeface="Calibri" panose="020F0502020204030204" pitchFamily="34" charset="0"/>
+                        <a:ea typeface="DengXian" panose="02010600030101010101" pitchFamily="2" charset="-122"/>
+                        <a:cs typeface="Arial" panose="020B0604020202020204" pitchFamily="34" charset="0"/>
+                      </a:endParaRPr>
+                    </a:p>
+                  </a:txBody>
+                  <a:tcPr marL="68580" marR="68580" marT="0" marB="0">
+                    <a:noFill/>
+                  </a:tcPr>
+                </a:tc>
+                <a:tc>
+                  <a:txBody>
+                    <a:bodyPr/>
+                    <a:lstStyle/>
+                    <a:p>
+                      <a:pPr marL="0" marR="0">
+                        <a:spcBef>
+                          <a:spcPts val="0"/>
+                        </a:spcBef>
+                        <a:spcAft>
+                          <a:spcPts val="0"/>
+                        </a:spcAft>
+                      </a:pPr>
+                      <a:r>
+                        <a:rPr lang="en-US" sz="1200">
+                          <a:effectLst/>
+                        </a:rPr>
+                        <a:t>64, 4 way</a:t>
+                      </a:r>
+                      <a:endParaRPr lang="en-US" sz="1200">
+                        <a:effectLst/>
+                        <a:latin typeface="Calibri" panose="020F0502020204030204" pitchFamily="34" charset="0"/>
+                        <a:ea typeface="DengXian" panose="02010600030101010101" pitchFamily="2" charset="-122"/>
+                        <a:cs typeface="Arial" panose="020B0604020202020204" pitchFamily="34" charset="0"/>
+                      </a:endParaRPr>
+                    </a:p>
+                  </a:txBody>
+                  <a:tcPr marL="68580" marR="68580" marT="0" marB="0"/>
+                </a:tc>
+                <a:extLst>
+                  <a:ext uri="{0D108BD9-81ED-4DB2-BD59-A6C34878D82A}">
+                    <a16:rowId xmlns:a16="http://schemas.microsoft.com/office/drawing/2014/main" val="1549102822"/>
+                  </a:ext>
+                </a:extLst>
+              </a:tr>
+              <a:tr h="299355">
+                <a:tc>
+                  <a:txBody>
+                    <a:bodyPr/>
+                    <a:lstStyle/>
+                    <a:p>
+                      <a:pPr marL="0" marR="0">
+                        <a:spcBef>
+                          <a:spcPts val="0"/>
+                        </a:spcBef>
+                        <a:spcAft>
+                          <a:spcPts val="0"/>
+                        </a:spcAft>
+                      </a:pPr>
+                      <a:r>
+                        <a:rPr lang="en-US" sz="1200" b="0" dirty="0">
+                          <a:solidFill>
+                            <a:schemeClr val="tx1"/>
+                          </a:solidFill>
+                          <a:effectLst/>
+                        </a:rPr>
+                        <a:t>L2 TLB size, associativity</a:t>
+                      </a:r>
+                      <a:endParaRPr lang="en-US" sz="1200" b="0" dirty="0">
+                        <a:solidFill>
+                          <a:schemeClr val="tx1"/>
+                        </a:solidFill>
+                        <a:effectLst/>
+                        <a:latin typeface="Calibri" panose="020F0502020204030204" pitchFamily="34" charset="0"/>
+                        <a:ea typeface="DengXian" panose="02010600030101010101" pitchFamily="2" charset="-122"/>
+                        <a:cs typeface="Arial" panose="020B0604020202020204" pitchFamily="34" charset="0"/>
+                      </a:endParaRPr>
+                    </a:p>
+                  </a:txBody>
+                  <a:tcPr marL="68580" marR="68580" marT="0" marB="0">
+                    <a:noFill/>
+                  </a:tcPr>
+                </a:tc>
+                <a:tc>
+                  <a:txBody>
+                    <a:bodyPr/>
+                    <a:lstStyle/>
+                    <a:p>
+                      <a:pPr marL="0" marR="0">
+                        <a:spcBef>
+                          <a:spcPts val="0"/>
+                        </a:spcBef>
+                        <a:spcAft>
+                          <a:spcPts val="0"/>
+                        </a:spcAft>
+                      </a:pPr>
+                      <a:r>
+                        <a:rPr lang="en-US" sz="1200" dirty="0">
+                          <a:effectLst/>
+                        </a:rPr>
+                        <a:t>1024 entries, 8 way</a:t>
+                      </a:r>
+                      <a:endParaRPr lang="en-US" sz="1200" dirty="0">
+                        <a:effectLst/>
+                        <a:latin typeface="Calibri" panose="020F0502020204030204" pitchFamily="34" charset="0"/>
+                        <a:ea typeface="DengXian" panose="02010600030101010101" pitchFamily="2" charset="-122"/>
+                        <a:cs typeface="Arial" panose="020B0604020202020204" pitchFamily="34" charset="0"/>
+                      </a:endParaRPr>
+                    </a:p>
+                  </a:txBody>
+                  <a:tcPr marL="68580" marR="68580" marT="0" marB="0"/>
+                </a:tc>
+                <a:extLst>
+                  <a:ext uri="{0D108BD9-81ED-4DB2-BD59-A6C34878D82A}">
+                    <a16:rowId xmlns:a16="http://schemas.microsoft.com/office/drawing/2014/main" val="3752851328"/>
+                  </a:ext>
+                </a:extLst>
+              </a:tr>
+            </a:tbl>
+          </a:graphicData>
+        </a:graphic>
+      </p:graphicFrame>
+    </p:spTree>
+    <p:extLst>
+      <p:ext uri="{BB962C8B-B14F-4D97-AF65-F5344CB8AC3E}">
+        <p14:creationId xmlns:p14="http://schemas.microsoft.com/office/powerpoint/2010/main" val="2437164257"/>
+      </p:ext>
+    </p:extLst>
+  </p:cSld>
+  <p:clrMapOvr>
+    <a:masterClrMapping/>
+  </p:clrMapOvr>
+  <p:transition/>
+</p:sld>
+</file>
+
+<file path=ppt/slides/slide44.xml><?xml version="1.0" encoding="utf-8"?>
+<p:sld xmlns:a="http://schemas.openxmlformats.org/drawingml/2006/main" xmlns:r="http://schemas.openxmlformats.org/officeDocument/2006/relationships" xmlns:p="http://schemas.openxmlformats.org/presentationml/2006/main">
+  <p:cSld>
+    <p:spTree>
+      <p:nvGrpSpPr>
+        <p:cNvPr id="1" name=""/>
+        <p:cNvGrpSpPr/>
+        <p:nvPr/>
+      </p:nvGrpSpPr>
+      <p:grpSpPr>
+        <a:xfrm>
+          <a:off x="0" y="0"/>
+          <a:ext cx="0" cy="0"/>
+          <a:chOff x="0" y="0"/>
+          <a:chExt cx="0" cy="0"/>
+        </a:xfrm>
+      </p:grpSpPr>
+      <p:sp>
+        <p:nvSpPr>
+          <p:cNvPr id="23556" name="Rectangle 2"/>
+          <p:cNvSpPr>
+            <a:spLocks noGrp="1" noChangeArrowheads="1"/>
+          </p:cNvSpPr>
+          <p:nvPr>
+            <p:ph type="title"/>
+          </p:nvPr>
+        </p:nvSpPr>
+        <p:spPr>
+          <a:xfrm>
+            <a:off x="682752" y="114300"/>
+            <a:ext cx="7772400" cy="838200"/>
+          </a:xfrm>
+        </p:spPr>
+        <p:txBody>
+          <a:bodyPr/>
+          <a:lstStyle/>
+          <a:p>
+            <a:r>
+              <a:rPr lang="en-US" sz="3600" dirty="0"/>
+              <a:t>Machine state (Intel x64)</a:t>
+            </a:r>
+          </a:p>
+        </p:txBody>
+      </p:sp>
+      <p:sp>
+        <p:nvSpPr>
+          <p:cNvPr id="23557" name="Rectangle 3"/>
+          <p:cNvSpPr>
+            <a:spLocks noGrp="1" noChangeArrowheads="1"/>
+          </p:cNvSpPr>
+          <p:nvPr>
+            <p:ph type="body" idx="1"/>
+          </p:nvPr>
+        </p:nvSpPr>
+        <p:spPr>
+          <a:xfrm>
+            <a:off x="228600" y="1295400"/>
+            <a:ext cx="8226552" cy="4953000"/>
+          </a:xfrm>
+        </p:spPr>
+        <p:txBody>
+          <a:bodyPr/>
+          <a:lstStyle/>
+          <a:p>
+            <a:pPr>
+              <a:lnSpc>
+                <a:spcPct val="90000"/>
+              </a:lnSpc>
+            </a:pPr>
+            <a:r>
+              <a:rPr lang="en-US" sz="2000" dirty="0">
+                <a:latin typeface="Arial" panose="020B0604020202020204" pitchFamily="34" charset="0"/>
+                <a:cs typeface="Arial" panose="020B0604020202020204" pitchFamily="34" charset="0"/>
+              </a:rPr>
+              <a:t>Time of day clock</a:t>
+            </a:r>
+          </a:p>
+          <a:p>
+            <a:pPr>
+              <a:lnSpc>
+                <a:spcPct val="90000"/>
+              </a:lnSpc>
+            </a:pPr>
+            <a:r>
+              <a:rPr lang="en-US" sz="2000" dirty="0">
+                <a:latin typeface="Arial" panose="020B0604020202020204" pitchFamily="34" charset="0"/>
+                <a:cs typeface="Arial" panose="020B0604020202020204" pitchFamily="34" charset="0"/>
+              </a:rPr>
+              <a:t>CPU cycle rate</a:t>
+            </a:r>
+          </a:p>
+          <a:p>
+            <a:pPr>
+              <a:lnSpc>
+                <a:spcPct val="90000"/>
+              </a:lnSpc>
+            </a:pPr>
+            <a:r>
+              <a:rPr lang="en-US" sz="2000" dirty="0">
+                <a:latin typeface="Arial" panose="020B0604020202020204" pitchFamily="34" charset="0"/>
+                <a:cs typeface="Arial" panose="020B0604020202020204" pitchFamily="34" charset="0"/>
+              </a:rPr>
+              <a:t>DRAM cycle and refresh rates</a:t>
+            </a:r>
+          </a:p>
+          <a:p>
+            <a:pPr lvl="0"/>
+            <a:r>
+              <a:rPr lang="en-US" sz="2000" dirty="0"/>
+              <a:t>CPU instruction pipelines fill level </a:t>
+            </a:r>
+          </a:p>
+          <a:p>
+            <a:pPr lvl="0"/>
+            <a:r>
+              <a:rPr lang="en-US" sz="2000" dirty="0"/>
+              <a:t> Wait states for the synchronization of memory access adds to time variances</a:t>
+            </a:r>
+          </a:p>
+          <a:p>
+            <a:pPr lvl="0"/>
+            <a:r>
+              <a:rPr lang="en-US" sz="2000" dirty="0"/>
+              <a:t>The CPU frequency scaling</a:t>
+            </a:r>
+          </a:p>
+          <a:p>
+            <a:pPr lvl="0"/>
+            <a:r>
+              <a:rPr lang="en-US" sz="2000" dirty="0"/>
+              <a:t>The CPU power management may disable CPU features. </a:t>
+            </a:r>
+          </a:p>
+          <a:p>
+            <a:pPr lvl="0"/>
+            <a:r>
+              <a:rPr lang="en-US" sz="2000" dirty="0"/>
+              <a:t>Instruction and data caches</a:t>
+            </a:r>
+          </a:p>
+          <a:p>
+            <a:pPr lvl="0"/>
+            <a:r>
+              <a:rPr lang="en-US" sz="2000" dirty="0"/>
+              <a:t>TLB</a:t>
+            </a:r>
+          </a:p>
+        </p:txBody>
+      </p:sp>
+      <p:sp>
+        <p:nvSpPr>
+          <p:cNvPr id="8" name="Slide Number Placeholder 7"/>
+          <p:cNvSpPr>
+            <a:spLocks noGrp="1"/>
+          </p:cNvSpPr>
+          <p:nvPr>
+            <p:ph type="sldNum" sz="quarter" idx="12"/>
+          </p:nvPr>
+        </p:nvSpPr>
+        <p:spPr/>
+        <p:txBody>
+          <a:bodyPr/>
+          <a:lstStyle/>
+          <a:p>
+            <a:pPr>
+              <a:defRPr/>
+            </a:pPr>
+            <a:fld id="{8E09DF16-9352-46A7-97F1-1D13A8547ADD}" type="slidenum">
+              <a:rPr lang="en-US" smtClean="0"/>
+              <a:pPr>
+                <a:defRPr/>
+              </a:pPr>
+              <a:t>44</a:t>
+            </a:fld>
+            <a:endParaRPr lang="en-US"/>
+          </a:p>
+        </p:txBody>
+      </p:sp>
+    </p:spTree>
+    <p:extLst>
+      <p:ext uri="{BB962C8B-B14F-4D97-AF65-F5344CB8AC3E}">
+        <p14:creationId xmlns:p14="http://schemas.microsoft.com/office/powerpoint/2010/main" val="2390703824"/>
+      </p:ext>
+    </p:extLst>
+  </p:cSld>
+  <p:clrMapOvr>
+    <a:masterClrMapping/>
+  </p:clrMapOvr>
+  <p:transition/>
+</p:sld>
+</file>
+
+<file path=ppt/slides/slide45.xml><?xml version="1.0" encoding="utf-8"?>
+<p:sld xmlns:a="http://schemas.openxmlformats.org/drawingml/2006/main" xmlns:r="http://schemas.openxmlformats.org/officeDocument/2006/relationships" xmlns:p="http://schemas.openxmlformats.org/presentationml/2006/main">
+  <p:cSld>
+    <p:spTree>
+      <p:nvGrpSpPr>
+        <p:cNvPr id="1" name=""/>
+        <p:cNvGrpSpPr/>
+        <p:nvPr/>
+      </p:nvGrpSpPr>
+      <p:grpSpPr>
+        <a:xfrm>
+          <a:off x="0" y="0"/>
+          <a:ext cx="0" cy="0"/>
+          <a:chOff x="0" y="0"/>
+          <a:chExt cx="0" cy="0"/>
+        </a:xfrm>
+      </p:grpSpPr>
+      <p:sp>
+        <p:nvSpPr>
+          <p:cNvPr id="23556" name="Rectangle 2"/>
+          <p:cNvSpPr>
+            <a:spLocks noGrp="1" noChangeArrowheads="1"/>
+          </p:cNvSpPr>
+          <p:nvPr>
+            <p:ph type="title"/>
+          </p:nvPr>
+        </p:nvSpPr>
+        <p:spPr>
+          <a:xfrm>
+            <a:off x="682752" y="114300"/>
+            <a:ext cx="7772400" cy="838200"/>
+          </a:xfrm>
+        </p:spPr>
+        <p:txBody>
+          <a:bodyPr/>
+          <a:lstStyle/>
+          <a:p>
+            <a:r>
+              <a:rPr lang="en-US" sz="3600" dirty="0"/>
+              <a:t>Machine state (Intel x64)</a:t>
+            </a:r>
+          </a:p>
+        </p:txBody>
+      </p:sp>
+      <p:sp>
+        <p:nvSpPr>
+          <p:cNvPr id="23557" name="Rectangle 3"/>
+          <p:cNvSpPr>
+            <a:spLocks noGrp="1" noChangeArrowheads="1"/>
+          </p:cNvSpPr>
+          <p:nvPr>
+            <p:ph type="body" idx="1"/>
+          </p:nvPr>
+        </p:nvSpPr>
+        <p:spPr>
+          <a:xfrm>
+            <a:off x="228600" y="1295400"/>
+            <a:ext cx="8610600" cy="4953000"/>
+          </a:xfrm>
+        </p:spPr>
+        <p:txBody>
+          <a:bodyPr/>
+          <a:lstStyle/>
+          <a:p>
+            <a:pPr lvl="0"/>
+            <a:r>
+              <a:rPr lang="en-US" sz="2000" dirty="0"/>
+              <a:t>CPU topology and caches used jointly by multiple CPUs affect execution time.</a:t>
+            </a:r>
+          </a:p>
+          <a:p>
+            <a:pPr lvl="0"/>
+            <a:r>
+              <a:rPr lang="en-US" sz="2000" dirty="0"/>
+              <a:t>Branch prediction units</a:t>
+            </a:r>
+          </a:p>
+          <a:p>
+            <a:pPr lvl="0"/>
+            <a:r>
+              <a:rPr lang="en-US" sz="2000" dirty="0"/>
+              <a:t>Kernel locks/barriers</a:t>
+            </a:r>
+          </a:p>
+          <a:p>
+            <a:pPr lvl="0"/>
+            <a:r>
+              <a:rPr lang="en-US" sz="2000" dirty="0"/>
+              <a:t>CPU configuration on multi-core machine</a:t>
+            </a:r>
+          </a:p>
+          <a:p>
+            <a:r>
+              <a:rPr lang="en-US" sz="2000" dirty="0"/>
+              <a:t>Hardware interrupts (See /proc/interrupts, /proc/stat, /proc/interrupts) </a:t>
+            </a:r>
+            <a:endParaRPr lang="en-US" sz="2000" dirty="0">
+              <a:latin typeface="Arial" panose="020B0604020202020204" pitchFamily="34" charset="0"/>
+              <a:cs typeface="Arial" panose="020B0604020202020204" pitchFamily="34" charset="0"/>
+            </a:endParaRPr>
+          </a:p>
+        </p:txBody>
+      </p:sp>
+      <p:sp>
+        <p:nvSpPr>
+          <p:cNvPr id="8" name="Slide Number Placeholder 7"/>
+          <p:cNvSpPr>
+            <a:spLocks noGrp="1"/>
+          </p:cNvSpPr>
+          <p:nvPr>
+            <p:ph type="sldNum" sz="quarter" idx="12"/>
+          </p:nvPr>
+        </p:nvSpPr>
+        <p:spPr/>
+        <p:txBody>
+          <a:bodyPr/>
+          <a:lstStyle/>
+          <a:p>
+            <a:pPr>
+              <a:defRPr/>
+            </a:pPr>
+            <a:fld id="{8E09DF16-9352-46A7-97F1-1D13A8547ADD}" type="slidenum">
+              <a:rPr lang="en-US" smtClean="0"/>
+              <a:pPr>
+                <a:defRPr/>
+              </a:pPr>
+              <a:t>45</a:t>
+            </a:fld>
+            <a:endParaRPr lang="en-US"/>
+          </a:p>
+        </p:txBody>
+      </p:sp>
+      <p:sp>
+        <p:nvSpPr>
+          <p:cNvPr id="2" name="Rectangle 2">
+            <a:extLst>
+              <a:ext uri="{FF2B5EF4-FFF2-40B4-BE49-F238E27FC236}">
+                <a16:creationId xmlns:a16="http://schemas.microsoft.com/office/drawing/2014/main" id="{C0D3418F-80B0-844C-8418-6CC7A95790AB}"/>
+              </a:ext>
+            </a:extLst>
+          </p:cNvPr>
+          <p:cNvSpPr>
+            <a:spLocks noChangeArrowheads="1"/>
+          </p:cNvSpPr>
+          <p:nvPr/>
+        </p:nvSpPr>
+        <p:spPr bwMode="auto">
+          <a:xfrm>
+            <a:off x="0" y="0"/>
+            <a:ext cx="9144000" cy="0"/>
+          </a:xfrm>
+          <a:prstGeom prst="rect">
+            <a:avLst/>
+          </a:prstGeom>
+          <a:noFill/>
+          <a:ln>
+            <a:noFill/>
+          </a:ln>
+          <a:effectLst/>
+          <a:extLst>
+            <a:ext uri="{909E8E84-426E-40DD-AFC4-6F175D3DCCD1}">
+              <a14:hiddenFill xmlns:a14="http://schemas.microsoft.com/office/drawing/2010/main">
+                <a:solidFill>
+                  <a:schemeClr val="accent1"/>
+                </a:solidFill>
+              </a14:hiddenFill>
+            </a:ext>
+            <a:ext uri="{91240B29-F687-4F45-9708-019B960494DF}">
+              <a14:hiddenLine xmlns:a14="http://schemas.microsoft.com/office/drawing/2010/main" w="9525">
+                <a:solidFill>
+                  <a:schemeClr val="tx1"/>
+                </a:solidFill>
+                <a:miter lim="800000"/>
+                <a:headEnd/>
+                <a:tailEnd/>
+              </a14:hiddenLine>
+            </a:ext>
+            <a:ext uri="{AF507438-7753-43E0-B8FC-AC1667EBCBE1}">
+              <a14:hiddenEffects xmlns:a14="http://schemas.microsoft.com/office/drawing/2010/main">
+                <a:effectLst>
+                  <a:outerShdw dist="35921" dir="2700000" algn="ctr" rotWithShape="0">
+                    <a:schemeClr val="bg2"/>
+                  </a:outerShdw>
+                </a:effectLst>
+              </a14:hiddenEffects>
+            </a:ext>
+          </a:extLst>
+        </p:spPr>
+        <p:txBody>
+          <a:bodyPr vert="horz" wrap="none" lIns="91440" tIns="45720" rIns="91440" bIns="45720" numCol="1" anchor="ctr" anchorCtr="0" compatLnSpc="1">
+            <a:prstTxWarp prst="textNoShape">
+              <a:avLst/>
+            </a:prstTxWarp>
+            <a:spAutoFit/>
+          </a:bodyPr>
+          <a:lstStyle/>
+          <a:p>
+            <a:endParaRPr lang="en-US"/>
+          </a:p>
+        </p:txBody>
+      </p:sp>
+    </p:spTree>
+    <p:extLst>
+      <p:ext uri="{BB962C8B-B14F-4D97-AF65-F5344CB8AC3E}">
+        <p14:creationId xmlns:p14="http://schemas.microsoft.com/office/powerpoint/2010/main" val="818219017"/>
+      </p:ext>
+    </p:extLst>
+  </p:cSld>
+  <p:clrMapOvr>
+    <a:masterClrMapping/>
+  </p:clrMapOvr>
+  <p:transition/>
+</p:sld>
+</file>
+
 <file path=ppt/slides/slide5.xml><?xml version="1.0" encoding="utf-8"?>
 <p:sld xmlns:a="http://schemas.openxmlformats.org/drawingml/2006/main" xmlns:r="http://schemas.openxmlformats.org/officeDocument/2006/relationships" xmlns:p="http://schemas.openxmlformats.org/presentationml/2006/main">
   <p:cSld>

</xml_diff>

<commit_message>
a little more perf data
</commit_message>
<xml_diff>
--- a/BerkeleyClass/CS290Spring2013/Lectures/entropy_talk.pptx
+++ b/BerkeleyClass/CS290Spring2013/Lectures/entropy_talk.pptx
@@ -5,10 +5,10 @@
     <p:sldMasterId id="2147483649" r:id="rId1"/>
   </p:sldMasterIdLst>
   <p:notesMasterIdLst>
-    <p:notesMasterId r:id="rId48"/>
+    <p:notesMasterId r:id="rId47"/>
   </p:notesMasterIdLst>
   <p:handoutMasterIdLst>
-    <p:handoutMasterId r:id="rId49"/>
+    <p:handoutMasterId r:id="rId48"/>
   </p:handoutMasterIdLst>
   <p:sldIdLst>
     <p:sldId id="3175" r:id="rId2"/>
@@ -55,8 +55,7 @@
     <p:sldId id="3809" r:id="rId43"/>
     <p:sldId id="3812" r:id="rId44"/>
     <p:sldId id="3807" r:id="rId45"/>
-    <p:sldId id="3810" r:id="rId46"/>
-    <p:sldId id="3813" r:id="rId47"/>
+    <p:sldId id="3813" r:id="rId46"/>
   </p:sldIdLst>
   <p:sldSz cx="9144000" cy="6858000" type="screen4x3"/>
   <p:notesSz cx="7010400" cy="9296400"/>
@@ -4450,106 +4449,6 @@
               <a:rPr lang="en-US" smtClean="0"/>
               <a:pPr/>
               <a:t>45</a:t>
-            </a:fld>
-            <a:endParaRPr lang="en-US"/>
-          </a:p>
-        </p:txBody>
-      </p:sp>
-      <p:sp>
-        <p:nvSpPr>
-          <p:cNvPr id="95235" name="Rectangle 2"/>
-          <p:cNvSpPr>
-            <a:spLocks noGrp="1" noRot="1" noChangeAspect="1" noChangeArrowheads="1" noTextEdit="1"/>
-          </p:cNvSpPr>
-          <p:nvPr>
-            <p:ph type="sldImg"/>
-          </p:nvPr>
-        </p:nvSpPr>
-        <p:spPr>
-          <a:xfrm>
-            <a:off x="1169988" y="687388"/>
-            <a:ext cx="4673600" cy="3505200"/>
-          </a:xfrm>
-          <a:ln/>
-        </p:spPr>
-      </p:sp>
-      <p:sp>
-        <p:nvSpPr>
-          <p:cNvPr id="95236" name="Rectangle 3"/>
-          <p:cNvSpPr>
-            <a:spLocks noGrp="1" noChangeArrowheads="1"/>
-          </p:cNvSpPr>
-          <p:nvPr>
-            <p:ph type="body" idx="1"/>
-          </p:nvPr>
-        </p:nvSpPr>
-        <p:spPr>
-          <a:xfrm>
-            <a:off x="914400" y="4421188"/>
-            <a:ext cx="5184775" cy="4191000"/>
-          </a:xfrm>
-          <a:noFill/>
-          <a:ln w="9525"/>
-        </p:spPr>
-        <p:txBody>
-          <a:bodyPr/>
-          <a:lstStyle/>
-          <a:p>
-            <a:endParaRPr lang="en-US"/>
-          </a:p>
-        </p:txBody>
-      </p:sp>
-    </p:spTree>
-    <p:extLst>
-      <p:ext uri="{BB962C8B-B14F-4D97-AF65-F5344CB8AC3E}">
-        <p14:creationId xmlns:p14="http://schemas.microsoft.com/office/powerpoint/2010/main" val="1296706833"/>
-      </p:ext>
-    </p:extLst>
-  </p:cSld>
-  <p:clrMapOvr>
-    <a:masterClrMapping/>
-  </p:clrMapOvr>
-</p:notes>
-</file>
-
-<file path=ppt/notesSlides/notesSlide42.xml><?xml version="1.0" encoding="utf-8"?>
-<p:notes xmlns:a="http://schemas.openxmlformats.org/drawingml/2006/main" xmlns:r="http://schemas.openxmlformats.org/officeDocument/2006/relationships" xmlns:p="http://schemas.openxmlformats.org/presentationml/2006/main">
-  <p:cSld>
-    <p:spTree>
-      <p:nvGrpSpPr>
-        <p:cNvPr id="1" name=""/>
-        <p:cNvGrpSpPr/>
-        <p:nvPr/>
-      </p:nvGrpSpPr>
-      <p:grpSpPr>
-        <a:xfrm>
-          <a:off x="0" y="0"/>
-          <a:ext cx="0" cy="0"/>
-          <a:chOff x="0" y="0"/>
-          <a:chExt cx="0" cy="0"/>
-        </a:xfrm>
-      </p:grpSpPr>
-      <p:sp>
-        <p:nvSpPr>
-          <p:cNvPr id="95234" name="Rectangle 7"/>
-          <p:cNvSpPr>
-            <a:spLocks noGrp="1" noChangeArrowheads="1"/>
-          </p:cNvSpPr>
-          <p:nvPr>
-            <p:ph type="sldNum" sz="quarter" idx="5"/>
-          </p:nvPr>
-        </p:nvSpPr>
-        <p:spPr>
-          <a:noFill/>
-        </p:spPr>
-        <p:txBody>
-          <a:bodyPr/>
-          <a:lstStyle/>
-          <a:p>
-            <a:fld id="{86016DC7-F49B-4F50-9A32-E9E9CFA38878}" type="slidenum">
-              <a:rPr lang="en-US" smtClean="0"/>
-              <a:pPr/>
-              <a:t>46</a:t>
             </a:fld>
             <a:endParaRPr lang="en-US"/>
           </a:p>
@@ -21476,38 +21375,6 @@
       </p:sp>
       <p:sp>
         <p:nvSpPr>
-          <p:cNvPr id="23557" name="Rectangle 3"/>
-          <p:cNvSpPr>
-            <a:spLocks noGrp="1" noChangeArrowheads="1"/>
-          </p:cNvSpPr>
-          <p:nvPr>
-            <p:ph type="body" idx="1"/>
-          </p:nvPr>
-        </p:nvSpPr>
-        <p:spPr>
-          <a:xfrm>
-            <a:off x="304800" y="2095500"/>
-            <a:ext cx="2743200" cy="2667000"/>
-          </a:xfrm>
-        </p:spPr>
-        <p:txBody>
-          <a:bodyPr/>
-          <a:lstStyle/>
-          <a:p>
-            <a:pPr lvl="0"/>
-            <a:r>
-              <a:rPr lang="en-US" sz="2000" dirty="0"/>
-              <a:t>x</a:t>
-            </a:r>
-            <a:endParaRPr lang="en-US" sz="2000" dirty="0">
-              <a:latin typeface="Arial" panose="020B0604020202020204" pitchFamily="34" charset="0"/>
-              <a:cs typeface="Arial" panose="020B0604020202020204" pitchFamily="34" charset="0"/>
-            </a:endParaRPr>
-          </a:p>
-        </p:txBody>
-      </p:sp>
-      <p:sp>
-        <p:nvSpPr>
           <p:cNvPr id="8" name="Slide Number Placeholder 7"/>
           <p:cNvSpPr>
             <a:spLocks noGrp="1"/>
@@ -21699,8 +21566,8 @@
         </p:blipFill>
         <p:spPr>
           <a:xfrm>
-            <a:off x="2490675" y="1064260"/>
-            <a:ext cx="5943600" cy="4803140"/>
+            <a:off x="914400" y="1027430"/>
+            <a:ext cx="6477000" cy="5068570"/>
           </a:xfrm>
           <a:prstGeom prst="rect">
             <a:avLst/>
@@ -24440,7 +24307,7 @@
         </p:nvSpPr>
         <p:spPr>
           <a:xfrm>
-            <a:off x="228600" y="1295400"/>
+            <a:off x="455676" y="1447800"/>
             <a:ext cx="8226552" cy="4953000"/>
           </a:xfrm>
         </p:spPr>
@@ -24500,13 +24367,6 @@
             <a:pPr lvl="0"/>
             <a:r>
               <a:rPr lang="en-US" sz="2000" dirty="0"/>
-              <a:t> Wait states for the synchronization of memory access adds to time variances</a:t>
-            </a:r>
-          </a:p>
-          <a:p>
-            <a:pPr lvl="0"/>
-            <a:r>
-              <a:rPr lang="en-US" sz="2000" dirty="0"/>
               <a:t>The CPU frequency scaling</a:t>
             </a:r>
           </a:p>
@@ -24528,8 +24388,52 @@
             <a:pPr lvl="0"/>
             <a:r>
               <a:rPr lang="en-US" sz="2000" dirty="0"/>
-              <a:t>TLB</a:t>
-            </a:r>
+              <a:t>TLB (Miss penalty: 9 cycles)</a:t>
+            </a:r>
+          </a:p>
+          <a:p>
+            <a:pPr lvl="0"/>
+            <a:r>
+              <a:rPr lang="en-US" sz="2000" dirty="0"/>
+              <a:t>CPU topology and caches used jointly by multiple CPUs affect execution time.</a:t>
+            </a:r>
+          </a:p>
+          <a:p>
+            <a:pPr lvl="0"/>
+            <a:r>
+              <a:rPr lang="en-US" sz="2000" dirty="0"/>
+              <a:t>Branch prediction (Mis-predict penalty between 10 and 40 cycles)</a:t>
+            </a:r>
+          </a:p>
+          <a:p>
+            <a:pPr lvl="0"/>
+            <a:r>
+              <a:rPr lang="en-US" sz="2000" dirty="0"/>
+              <a:t>Kernel locks/barriers</a:t>
+            </a:r>
+          </a:p>
+          <a:p>
+            <a:pPr lvl="0"/>
+            <a:r>
+              <a:rPr lang="en-US" sz="2000" dirty="0"/>
+              <a:t>CPU configuration on multi-core machine</a:t>
+            </a:r>
+          </a:p>
+          <a:p>
+            <a:r>
+              <a:rPr lang="en-US" sz="2000" dirty="0"/>
+              <a:t>Hardware interrupts</a:t>
+            </a:r>
+            <a:endParaRPr lang="en-US" sz="2000" dirty="0">
+              <a:latin typeface="Arial" panose="020B0604020202020204" pitchFamily="34" charset="0"/>
+              <a:cs typeface="Arial" panose="020B0604020202020204" pitchFamily="34" charset="0"/>
+            </a:endParaRPr>
+          </a:p>
+          <a:p>
+            <a:pPr marL="0" lvl="0" indent="0">
+              <a:buNone/>
+            </a:pPr>
+            <a:endParaRPr lang="en-US" sz="2000" dirty="0"/>
           </a:p>
         </p:txBody>
       </p:sp>
@@ -24615,70 +24519,298 @@
           <a:p>
             <a:r>
               <a:rPr lang="en-US" sz="3600" dirty="0"/>
-              <a:t>Machine state (Intel x64)</a:t>
-            </a:r>
-          </a:p>
-        </p:txBody>
-      </p:sp>
-      <p:sp>
-        <p:nvSpPr>
-          <p:cNvPr id="23557" name="Rectangle 3"/>
-          <p:cNvSpPr>
-            <a:spLocks noGrp="1" noChangeArrowheads="1"/>
-          </p:cNvSpPr>
-          <p:nvPr>
-            <p:ph type="body" idx="1"/>
-          </p:nvPr>
-        </p:nvSpPr>
-        <p:spPr>
-          <a:xfrm>
-            <a:off x="228600" y="1295400"/>
-            <a:ext cx="8610600" cy="4953000"/>
-          </a:xfrm>
-        </p:spPr>
-        <p:txBody>
-          <a:bodyPr/>
-          <a:lstStyle/>
-          <a:p>
-            <a:pPr lvl="0"/>
-            <a:r>
-              <a:rPr lang="en-US" sz="2000" dirty="0"/>
-              <a:t>CPU topology and caches used jointly by multiple CPUs affect execution time.</a:t>
-            </a:r>
-          </a:p>
-          <a:p>
-            <a:pPr lvl="0"/>
-            <a:r>
-              <a:rPr lang="en-US" sz="2000" dirty="0"/>
-              <a:t>Branch prediction units</a:t>
-            </a:r>
-          </a:p>
-          <a:p>
-            <a:pPr lvl="0"/>
-            <a:r>
-              <a:rPr lang="en-US" sz="2000" dirty="0"/>
-              <a:t>Kernel locks/barriers</a:t>
-            </a:r>
-          </a:p>
-          <a:p>
-            <a:pPr lvl="0"/>
-            <a:r>
-              <a:rPr lang="en-US" sz="2000" dirty="0"/>
-              <a:t>CPU configuration on multi-core machine</a:t>
-            </a:r>
-          </a:p>
-          <a:p>
-            <a:r>
-              <a:rPr lang="en-US" sz="2000" dirty="0"/>
-              <a:t>Hardware interrupts (See /proc/interrupts, /proc/stat, /proc/interrupts) </a:t>
-            </a:r>
-            <a:endParaRPr lang="en-US" sz="2000" dirty="0">
-              <a:latin typeface="Arial" panose="020B0604020202020204" pitchFamily="34" charset="0"/>
-              <a:cs typeface="Arial" panose="020B0604020202020204" pitchFamily="34" charset="0"/>
-            </a:endParaRPr>
-          </a:p>
-        </p:txBody>
-      </p:sp>
+              <a:t>Machine Data</a:t>
+            </a:r>
+          </a:p>
+        </p:txBody>
+      </p:sp>
+      <mc:AlternateContent xmlns:mc="http://schemas.openxmlformats.org/markup-compatibility/2006">
+        <mc:Choice xmlns:a14="http://schemas.microsoft.com/office/drawing/2010/main" Requires="a14">
+          <p:sp>
+            <p:nvSpPr>
+              <p:cNvPr id="23557" name="Rectangle 3"/>
+              <p:cNvSpPr>
+                <a:spLocks noGrp="1" noChangeArrowheads="1"/>
+              </p:cNvSpPr>
+              <p:nvPr>
+                <p:ph type="body" idx="1"/>
+              </p:nvPr>
+            </p:nvSpPr>
+            <p:spPr>
+              <a:xfrm>
+                <a:off x="228600" y="1295400"/>
+                <a:ext cx="8610600" cy="4953000"/>
+              </a:xfrm>
+            </p:spPr>
+            <p:txBody>
+              <a:bodyPr/>
+              <a:lstStyle/>
+              <a:p>
+                <a:pPr lvl="0"/>
+                <a:r>
+                  <a:rPr lang="en-US" sz="2000" dirty="0"/>
+                  <a:t>Client Intel i7-8650 @ 1.9GHz</a:t>
+                </a:r>
+              </a:p>
+              <a:p>
+                <a:pPr lvl="0"/>
+                <a:r>
+                  <a:rPr lang="en-US" sz="2000" dirty="0">
+                    <a:latin typeface="Arial" panose="020B0604020202020204" pitchFamily="34" charset="0"/>
+                    <a:cs typeface="Arial" panose="020B0604020202020204" pitchFamily="34" charset="0"/>
+                  </a:rPr>
+                  <a:t>CPU MHz: 947-1710MHz</a:t>
+                </a:r>
+              </a:p>
+              <a:p>
+                <a:pPr lvl="0"/>
+                <a:r>
+                  <a:rPr lang="en-US" sz="2000" dirty="0">
+                    <a:latin typeface="Arial" panose="020B0604020202020204" pitchFamily="34" charset="0"/>
+                    <a:cs typeface="Arial" panose="020B0604020202020204" pitchFamily="34" charset="0"/>
+                  </a:rPr>
+                  <a:t>8KB cache</a:t>
+                </a:r>
+              </a:p>
+              <a:p>
+                <a:pPr lvl="0"/>
+                <a:r>
+                  <a:rPr lang="en-US" sz="2000" dirty="0">
+                    <a:latin typeface="Arial" panose="020B0604020202020204" pitchFamily="34" charset="0"/>
+                    <a:cs typeface="Arial" panose="020B0604020202020204" pitchFamily="34" charset="0"/>
+                  </a:rPr>
+                  <a:t>Quiet system</a:t>
+                </a:r>
+              </a:p>
+              <a:p>
+                <a:r>
+                  <a:rPr lang="en-US" sz="2000" dirty="0">
+                    <a:latin typeface="Arial" panose="020B0604020202020204" pitchFamily="34" charset="0"/>
+                    <a:cs typeface="Arial" panose="020B0604020202020204" pitchFamily="34" charset="0"/>
+                  </a:rPr>
+                  <a:t>253 soft </a:t>
+                </a:r>
+                <a:r>
+                  <a:rPr lang="en-US" sz="2000" dirty="0" err="1">
+                    <a:latin typeface="Arial" panose="020B0604020202020204" pitchFamily="34" charset="0"/>
+                    <a:cs typeface="Arial" panose="020B0604020202020204" pitchFamily="34" charset="0"/>
+                  </a:rPr>
+                  <a:t>irqs</a:t>
+                </a:r>
+                <a:r>
+                  <a:rPr lang="en-US" sz="2000" dirty="0">
+                    <a:latin typeface="Arial" panose="020B0604020202020204" pitchFamily="34" charset="0"/>
+                    <a:cs typeface="Arial" panose="020B0604020202020204" pitchFamily="34" charset="0"/>
+                  </a:rPr>
+                  <a:t>/sec, .25/</a:t>
+                </a:r>
+                <a:r>
+                  <a:rPr lang="en-US" sz="2000" dirty="0" err="1">
+                    <a:latin typeface="Arial" panose="020B0604020202020204" pitchFamily="34" charset="0"/>
+                    <a:cs typeface="Arial" panose="020B0604020202020204" pitchFamily="34" charset="0"/>
+                  </a:rPr>
+                  <a:t>ms</a:t>
+                </a:r>
+                <a:r>
+                  <a:rPr lang="en-US" sz="2000" dirty="0">
+                    <a:latin typeface="Arial" panose="020B0604020202020204" pitchFamily="34" charset="0"/>
+                    <a:cs typeface="Arial" panose="020B0604020202020204" pitchFamily="34" charset="0"/>
+                  </a:rPr>
+                  <a:t> (250 </a:t>
+                </a:r>
+                <a14:m>
+                  <m:oMath xmlns:m="http://schemas.openxmlformats.org/officeDocument/2006/math">
+                    <m:r>
+                      <a:rPr lang="en-US" sz="2000" i="1">
+                        <a:latin typeface="Cambria Math" panose="02040503050406030204" pitchFamily="18" charset="0"/>
+                        <a:ea typeface="Cambria Math" panose="02040503050406030204" pitchFamily="18" charset="0"/>
+                        <a:cs typeface="Arial" panose="020B0604020202020204" pitchFamily="34" charset="0"/>
+                      </a:rPr>
+                      <m:t>𝜇</m:t>
+                    </m:r>
+                    <m:r>
+                      <a:rPr lang="en-US" sz="2000" i="1">
+                        <a:latin typeface="Cambria Math" panose="02040503050406030204" pitchFamily="18" charset="0"/>
+                        <a:ea typeface="Cambria Math" panose="02040503050406030204" pitchFamily="18" charset="0"/>
+                        <a:cs typeface="Arial" panose="020B0604020202020204" pitchFamily="34" charset="0"/>
+                      </a:rPr>
+                      <m:t>𝑠𝑒𝑐</m:t>
+                    </m:r>
+                  </m:oMath>
+                </a14:m>
+                <a:r>
+                  <a:rPr lang="en-US" sz="2000" dirty="0">
+                    <a:latin typeface="Arial" panose="020B0604020202020204" pitchFamily="34" charset="0"/>
+                    <a:cs typeface="Arial" panose="020B0604020202020204" pitchFamily="34" charset="0"/>
+                  </a:rPr>
+                  <a:t>)</a:t>
+                </a:r>
+              </a:p>
+              <a:p>
+                <a:r>
+                  <a:rPr lang="en-US" sz="2000" dirty="0">
+                    <a:latin typeface="Arial" panose="020B0604020202020204" pitchFamily="34" charset="0"/>
+                    <a:cs typeface="Arial" panose="020B0604020202020204" pitchFamily="34" charset="0"/>
+                  </a:rPr>
+                  <a:t>509 interrupts/sec, .51/</a:t>
+                </a:r>
+                <a:r>
+                  <a:rPr lang="en-US" sz="2000" dirty="0" err="1">
+                    <a:latin typeface="Arial" panose="020B0604020202020204" pitchFamily="34" charset="0"/>
+                    <a:cs typeface="Arial" panose="020B0604020202020204" pitchFamily="34" charset="0"/>
+                  </a:rPr>
+                  <a:t>ms</a:t>
+                </a:r>
+                <a:r>
+                  <a:rPr lang="en-US" sz="2000" dirty="0">
+                    <a:latin typeface="Arial" panose="020B0604020202020204" pitchFamily="34" charset="0"/>
+                    <a:cs typeface="Arial" panose="020B0604020202020204" pitchFamily="34" charset="0"/>
+                  </a:rPr>
+                  <a:t> (510 </a:t>
+                </a:r>
+                <a14:m>
+                  <m:oMath xmlns:m="http://schemas.openxmlformats.org/officeDocument/2006/math">
+                    <m:r>
+                      <a:rPr lang="en-US" sz="2000" i="1">
+                        <a:latin typeface="Cambria Math" panose="02040503050406030204" pitchFamily="18" charset="0"/>
+                        <a:ea typeface="Cambria Math" panose="02040503050406030204" pitchFamily="18" charset="0"/>
+                        <a:cs typeface="Arial" panose="020B0604020202020204" pitchFamily="34" charset="0"/>
+                      </a:rPr>
+                      <m:t>𝜇</m:t>
+                    </m:r>
+                    <m:r>
+                      <a:rPr lang="en-US" sz="2000" i="1">
+                        <a:latin typeface="Cambria Math" panose="02040503050406030204" pitchFamily="18" charset="0"/>
+                        <a:ea typeface="Cambria Math" panose="02040503050406030204" pitchFamily="18" charset="0"/>
+                        <a:cs typeface="Arial" panose="020B0604020202020204" pitchFamily="34" charset="0"/>
+                      </a:rPr>
+                      <m:t>𝑠𝑒𝑐</m:t>
+                    </m:r>
+                  </m:oMath>
+                </a14:m>
+                <a:r>
+                  <a:rPr lang="en-US" sz="2000" dirty="0">
+                    <a:latin typeface="Arial" panose="020B0604020202020204" pitchFamily="34" charset="0"/>
+                    <a:cs typeface="Arial" panose="020B0604020202020204" pitchFamily="34" charset="0"/>
+                  </a:rPr>
+                  <a:t>)</a:t>
+                </a:r>
+              </a:p>
+              <a:p>
+                <a:pPr lvl="0"/>
+                <a:r>
+                  <a:rPr lang="en-US" sz="2000" dirty="0">
+                    <a:latin typeface="Arial" panose="020B0604020202020204" pitchFamily="34" charset="0"/>
+                    <a:cs typeface="Arial" panose="020B0604020202020204" pitchFamily="34" charset="0"/>
+                  </a:rPr>
+                  <a:t>For, say, hash jitter, what is the average running time?</a:t>
+                </a:r>
+              </a:p>
+              <a:p>
+                <a:pPr lvl="1"/>
+                <a:r>
+                  <a:rPr lang="en-US" sz="2000" dirty="0">
+                    <a:latin typeface="Arial" panose="020B0604020202020204" pitchFamily="34" charset="0"/>
+                    <a:cs typeface="Arial" panose="020B0604020202020204" pitchFamily="34" charset="0"/>
+                  </a:rPr>
+                  <a:t>For has test with 10 repeats: 19200 cycles (19 </a:t>
+                </a:r>
+                <a14:m>
+                  <m:oMath xmlns:m="http://schemas.openxmlformats.org/officeDocument/2006/math">
+                    <m:r>
+                      <a:rPr lang="en-US" sz="2000" i="1" smtClean="0">
+                        <a:latin typeface="Cambria Math" panose="02040503050406030204" pitchFamily="18" charset="0"/>
+                        <a:ea typeface="Cambria Math" panose="02040503050406030204" pitchFamily="18" charset="0"/>
+                        <a:cs typeface="Arial" panose="020B0604020202020204" pitchFamily="34" charset="0"/>
+                      </a:rPr>
+                      <m:t>𝜇</m:t>
+                    </m:r>
+                    <m:r>
+                      <a:rPr lang="en-US" sz="2000" b="0" i="1" smtClean="0">
+                        <a:latin typeface="Cambria Math" panose="02040503050406030204" pitchFamily="18" charset="0"/>
+                        <a:ea typeface="Cambria Math" panose="02040503050406030204" pitchFamily="18" charset="0"/>
+                        <a:cs typeface="Arial" panose="020B0604020202020204" pitchFamily="34" charset="0"/>
+                      </a:rPr>
+                      <m:t>𝑠𝑒𝑐</m:t>
+                    </m:r>
+                  </m:oMath>
+                </a14:m>
+                <a:r>
+                  <a:rPr lang="en-US" sz="2000" dirty="0">
+                    <a:latin typeface="Arial" panose="020B0604020202020204" pitchFamily="34" charset="0"/>
+                    <a:cs typeface="Arial" panose="020B0604020202020204" pitchFamily="34" charset="0"/>
+                  </a:rPr>
+                  <a:t>)</a:t>
+                </a:r>
+              </a:p>
+              <a:p>
+                <a:pPr lvl="0"/>
+                <a:r>
+                  <a:rPr lang="en-US" sz="2000" dirty="0">
+                    <a:latin typeface="Arial" panose="020B0604020202020204" pitchFamily="34" charset="0"/>
+                    <a:cs typeface="Arial" panose="020B0604020202020204" pitchFamily="34" charset="0"/>
+                  </a:rPr>
+                  <a:t>What is the probability of an interrupt during a run?</a:t>
+                </a:r>
+              </a:p>
+              <a:p>
+                <a:pPr lvl="1"/>
+                <a:endParaRPr lang="en-US" sz="2000" dirty="0">
+                  <a:latin typeface="Arial" panose="020B0604020202020204" pitchFamily="34" charset="0"/>
+                  <a:cs typeface="Arial" panose="020B0604020202020204" pitchFamily="34" charset="0"/>
+                </a:endParaRPr>
+              </a:p>
+              <a:p>
+                <a:pPr lvl="0"/>
+                <a:r>
+                  <a:rPr lang="en-US" sz="2000" dirty="0">
+                    <a:latin typeface="Arial" panose="020B0604020202020204" pitchFamily="34" charset="0"/>
+                    <a:cs typeface="Arial" panose="020B0604020202020204" pitchFamily="34" charset="0"/>
+                  </a:rPr>
+                  <a:t>Need to know what CPU services interrupt</a:t>
+                </a:r>
+              </a:p>
+            </p:txBody>
+          </p:sp>
+        </mc:Choice>
+        <mc:Fallback>
+          <p:sp>
+            <p:nvSpPr>
+              <p:cNvPr id="23557" name="Rectangle 3"/>
+              <p:cNvSpPr>
+                <a:spLocks noGrp="1" noRot="1" noChangeAspect="1" noMove="1" noResize="1" noEditPoints="1" noAdjustHandles="1" noChangeArrowheads="1" noChangeShapeType="1" noTextEdit="1"/>
+              </p:cNvSpPr>
+              <p:nvPr>
+                <p:ph type="body" idx="1"/>
+              </p:nvPr>
+            </p:nvSpPr>
+            <p:spPr>
+              <a:xfrm>
+                <a:off x="228600" y="1295400"/>
+                <a:ext cx="8610600" cy="4953000"/>
+              </a:xfrm>
+              <a:blipFill>
+                <a:blip r:embed="rId3"/>
+                <a:stretch>
+                  <a:fillRect l="-737" t="-767"/>
+                </a:stretch>
+              </a:blipFill>
+            </p:spPr>
+            <p:txBody>
+              <a:bodyPr/>
+              <a:lstStyle/>
+              <a:p>
+                <a:r>
+                  <a:rPr lang="en-US">
+                    <a:noFill/>
+                  </a:rPr>
+                  <a:t> </a:t>
+                </a:r>
+              </a:p>
+            </p:txBody>
+          </p:sp>
+        </mc:Fallback>
+      </mc:AlternateContent>
       <p:sp>
         <p:nvSpPr>
           <p:cNvPr id="8" name="Slide Number Placeholder 7"/>
@@ -24703,313 +24835,6 @@
                 <a:defRPr/>
               </a:pPr>
               <a:t>45</a:t>
-            </a:fld>
-            <a:endParaRPr lang="en-US"/>
-          </a:p>
-        </p:txBody>
-      </p:sp>
-      <p:sp>
-        <p:nvSpPr>
-          <p:cNvPr id="2" name="Rectangle 2">
-            <a:extLst>
-              <a:ext uri="{FF2B5EF4-FFF2-40B4-BE49-F238E27FC236}">
-                <a16:creationId xmlns:a16="http://schemas.microsoft.com/office/drawing/2014/main" id="{C0D3418F-80B0-844C-8418-6CC7A95790AB}"/>
-              </a:ext>
-            </a:extLst>
-          </p:cNvPr>
-          <p:cNvSpPr>
-            <a:spLocks noChangeArrowheads="1"/>
-          </p:cNvSpPr>
-          <p:nvPr/>
-        </p:nvSpPr>
-        <p:spPr bwMode="auto">
-          <a:xfrm>
-            <a:off x="0" y="0"/>
-            <a:ext cx="9144000" cy="0"/>
-          </a:xfrm>
-          <a:prstGeom prst="rect">
-            <a:avLst/>
-          </a:prstGeom>
-          <a:noFill/>
-          <a:ln>
-            <a:noFill/>
-          </a:ln>
-          <a:effectLst/>
-          <a:extLst>
-            <a:ext uri="{909E8E84-426E-40DD-AFC4-6F175D3DCCD1}">
-              <a14:hiddenFill xmlns:a14="http://schemas.microsoft.com/office/drawing/2010/main">
-                <a:solidFill>
-                  <a:schemeClr val="accent1"/>
-                </a:solidFill>
-              </a14:hiddenFill>
-            </a:ext>
-            <a:ext uri="{91240B29-F687-4F45-9708-019B960494DF}">
-              <a14:hiddenLine xmlns:a14="http://schemas.microsoft.com/office/drawing/2010/main" w="9525">
-                <a:solidFill>
-                  <a:schemeClr val="tx1"/>
-                </a:solidFill>
-                <a:miter lim="800000"/>
-                <a:headEnd/>
-                <a:tailEnd/>
-              </a14:hiddenLine>
-            </a:ext>
-            <a:ext uri="{AF507438-7753-43E0-B8FC-AC1667EBCBE1}">
-              <a14:hiddenEffects xmlns:a14="http://schemas.microsoft.com/office/drawing/2010/main">
-                <a:effectLst>
-                  <a:outerShdw dist="35921" dir="2700000" algn="ctr" rotWithShape="0">
-                    <a:schemeClr val="bg2"/>
-                  </a:outerShdw>
-                </a:effectLst>
-              </a14:hiddenEffects>
-            </a:ext>
-          </a:extLst>
-        </p:spPr>
-        <p:txBody>
-          <a:bodyPr vert="horz" wrap="none" lIns="91440" tIns="45720" rIns="91440" bIns="45720" numCol="1" anchor="ctr" anchorCtr="0" compatLnSpc="1">
-            <a:prstTxWarp prst="textNoShape">
-              <a:avLst/>
-            </a:prstTxWarp>
-            <a:spAutoFit/>
-          </a:bodyPr>
-          <a:lstStyle/>
-          <a:p>
-            <a:endParaRPr lang="en-US"/>
-          </a:p>
-        </p:txBody>
-      </p:sp>
-    </p:spTree>
-    <p:extLst>
-      <p:ext uri="{BB962C8B-B14F-4D97-AF65-F5344CB8AC3E}">
-        <p14:creationId xmlns:p14="http://schemas.microsoft.com/office/powerpoint/2010/main" val="818219017"/>
-      </p:ext>
-    </p:extLst>
-  </p:cSld>
-  <p:clrMapOvr>
-    <a:masterClrMapping/>
-  </p:clrMapOvr>
-  <p:transition/>
-</p:sld>
-</file>
-
-<file path=ppt/slides/slide46.xml><?xml version="1.0" encoding="utf-8"?>
-<p:sld xmlns:a="http://schemas.openxmlformats.org/drawingml/2006/main" xmlns:r="http://schemas.openxmlformats.org/officeDocument/2006/relationships" xmlns:p="http://schemas.openxmlformats.org/presentationml/2006/main">
-  <p:cSld>
-    <p:spTree>
-      <p:nvGrpSpPr>
-        <p:cNvPr id="1" name=""/>
-        <p:cNvGrpSpPr/>
-        <p:nvPr/>
-      </p:nvGrpSpPr>
-      <p:grpSpPr>
-        <a:xfrm>
-          <a:off x="0" y="0"/>
-          <a:ext cx="0" cy="0"/>
-          <a:chOff x="0" y="0"/>
-          <a:chExt cx="0" cy="0"/>
-        </a:xfrm>
-      </p:grpSpPr>
-      <p:sp>
-        <p:nvSpPr>
-          <p:cNvPr id="23556" name="Rectangle 2"/>
-          <p:cNvSpPr>
-            <a:spLocks noGrp="1" noChangeArrowheads="1"/>
-          </p:cNvSpPr>
-          <p:nvPr>
-            <p:ph type="title"/>
-          </p:nvPr>
-        </p:nvSpPr>
-        <p:spPr>
-          <a:xfrm>
-            <a:off x="682752" y="114300"/>
-            <a:ext cx="7772400" cy="838200"/>
-          </a:xfrm>
-        </p:spPr>
-        <p:txBody>
-          <a:bodyPr/>
-          <a:lstStyle/>
-          <a:p>
-            <a:r>
-              <a:rPr lang="en-US" sz="3600" dirty="0"/>
-              <a:t>Machine Data</a:t>
-            </a:r>
-          </a:p>
-        </p:txBody>
-      </p:sp>
-      <p:sp>
-        <p:nvSpPr>
-          <p:cNvPr id="23557" name="Rectangle 3"/>
-          <p:cNvSpPr>
-            <a:spLocks noGrp="1" noChangeArrowheads="1"/>
-          </p:cNvSpPr>
-          <p:nvPr>
-            <p:ph type="body" idx="1"/>
-          </p:nvPr>
-        </p:nvSpPr>
-        <p:spPr>
-          <a:xfrm>
-            <a:off x="228600" y="1295400"/>
-            <a:ext cx="8610600" cy="4953000"/>
-          </a:xfrm>
-        </p:spPr>
-        <p:txBody>
-          <a:bodyPr/>
-          <a:lstStyle/>
-          <a:p>
-            <a:pPr lvl="0"/>
-            <a:r>
-              <a:rPr lang="en-US" sz="2000" dirty="0"/>
-              <a:t>Intel i7-8650 @ 1.9GHz</a:t>
-            </a:r>
-          </a:p>
-          <a:p>
-            <a:pPr lvl="0"/>
-            <a:r>
-              <a:rPr lang="en-US" sz="2000" dirty="0">
-                <a:latin typeface="Arial" panose="020B0604020202020204" pitchFamily="34" charset="0"/>
-                <a:cs typeface="Arial" panose="020B0604020202020204" pitchFamily="34" charset="0"/>
-              </a:rPr>
-              <a:t>CPU MHz: 947-1710MHz</a:t>
-            </a:r>
-          </a:p>
-          <a:p>
-            <a:pPr lvl="0"/>
-            <a:r>
-              <a:rPr lang="en-US" sz="2000" dirty="0">
-                <a:latin typeface="Arial" panose="020B0604020202020204" pitchFamily="34" charset="0"/>
-                <a:cs typeface="Arial" panose="020B0604020202020204" pitchFamily="34" charset="0"/>
-              </a:rPr>
-              <a:t>8KB cache</a:t>
-            </a:r>
-          </a:p>
-          <a:p>
-            <a:pPr lvl="0"/>
-            <a:r>
-              <a:rPr lang="en-US" sz="2000" dirty="0">
-                <a:latin typeface="Arial" panose="020B0604020202020204" pitchFamily="34" charset="0"/>
-                <a:cs typeface="Arial" panose="020B0604020202020204" pitchFamily="34" charset="0"/>
-              </a:rPr>
-              <a:t>Quiet system</a:t>
-            </a:r>
-          </a:p>
-          <a:p>
-            <a:pPr lvl="0"/>
-            <a:r>
-              <a:rPr lang="en-US" sz="2000" dirty="0">
-                <a:latin typeface="Arial" panose="020B0604020202020204" pitchFamily="34" charset="0"/>
-                <a:cs typeface="Arial" panose="020B0604020202020204" pitchFamily="34" charset="0"/>
-              </a:rPr>
-              <a:t>253 soft </a:t>
-            </a:r>
-            <a:r>
-              <a:rPr lang="en-US" sz="2000" dirty="0" err="1">
-                <a:latin typeface="Arial" panose="020B0604020202020204" pitchFamily="34" charset="0"/>
-                <a:cs typeface="Arial" panose="020B0604020202020204" pitchFamily="34" charset="0"/>
-              </a:rPr>
-              <a:t>irqs</a:t>
-            </a:r>
-            <a:r>
-              <a:rPr lang="en-US" sz="2000" dirty="0">
-                <a:latin typeface="Arial" panose="020B0604020202020204" pitchFamily="34" charset="0"/>
-                <a:cs typeface="Arial" panose="020B0604020202020204" pitchFamily="34" charset="0"/>
-              </a:rPr>
-              <a:t>/sec, .25/</a:t>
-            </a:r>
-            <a:r>
-              <a:rPr lang="en-US" sz="2000" dirty="0" err="1">
-                <a:latin typeface="Arial" panose="020B0604020202020204" pitchFamily="34" charset="0"/>
-                <a:cs typeface="Arial" panose="020B0604020202020204" pitchFamily="34" charset="0"/>
-              </a:rPr>
-              <a:t>ms</a:t>
-            </a:r>
-            <a:endParaRPr lang="en-US" sz="2000" dirty="0">
-              <a:latin typeface="Arial" panose="020B0604020202020204" pitchFamily="34" charset="0"/>
-              <a:cs typeface="Arial" panose="020B0604020202020204" pitchFamily="34" charset="0"/>
-            </a:endParaRPr>
-          </a:p>
-          <a:p>
-            <a:pPr lvl="0"/>
-            <a:r>
-              <a:rPr lang="en-US" sz="2000" dirty="0">
-                <a:latin typeface="Arial" panose="020B0604020202020204" pitchFamily="34" charset="0"/>
-                <a:cs typeface="Arial" panose="020B0604020202020204" pitchFamily="34" charset="0"/>
-              </a:rPr>
-              <a:t>509 interrupts/sec, .51/</a:t>
-            </a:r>
-            <a:r>
-              <a:rPr lang="en-US" sz="2000" dirty="0" err="1">
-                <a:latin typeface="Arial" panose="020B0604020202020204" pitchFamily="34" charset="0"/>
-                <a:cs typeface="Arial" panose="020B0604020202020204" pitchFamily="34" charset="0"/>
-              </a:rPr>
-              <a:t>ms</a:t>
-            </a:r>
-            <a:endParaRPr lang="en-US" sz="2000" dirty="0">
-              <a:latin typeface="Arial" panose="020B0604020202020204" pitchFamily="34" charset="0"/>
-              <a:cs typeface="Arial" panose="020B0604020202020204" pitchFamily="34" charset="0"/>
-            </a:endParaRPr>
-          </a:p>
-          <a:p>
-            <a:pPr lvl="0"/>
-            <a:endParaRPr lang="en-US" sz="2000" dirty="0">
-              <a:latin typeface="Arial" panose="020B0604020202020204" pitchFamily="34" charset="0"/>
-              <a:cs typeface="Arial" panose="020B0604020202020204" pitchFamily="34" charset="0"/>
-            </a:endParaRPr>
-          </a:p>
-          <a:p>
-            <a:pPr lvl="0"/>
-            <a:r>
-              <a:rPr lang="en-US" sz="2000" dirty="0">
-                <a:latin typeface="Arial" panose="020B0604020202020204" pitchFamily="34" charset="0"/>
-                <a:cs typeface="Arial" panose="020B0604020202020204" pitchFamily="34" charset="0"/>
-              </a:rPr>
-              <a:t>For, say, hash jitter, what is the average running time?</a:t>
-            </a:r>
-          </a:p>
-          <a:p>
-            <a:pPr lvl="1"/>
-            <a:r>
-              <a:rPr lang="en-US" sz="1600" dirty="0">
-                <a:latin typeface="Arial" panose="020B0604020202020204" pitchFamily="34" charset="0"/>
-                <a:cs typeface="Arial" panose="020B0604020202020204" pitchFamily="34" charset="0"/>
-              </a:rPr>
-              <a:t>For has test with 10 repeats: 19200 cycles</a:t>
-            </a:r>
-          </a:p>
-          <a:p>
-            <a:pPr lvl="0"/>
-            <a:r>
-              <a:rPr lang="en-US" sz="2000" dirty="0">
-                <a:latin typeface="Arial" panose="020B0604020202020204" pitchFamily="34" charset="0"/>
-                <a:cs typeface="Arial" panose="020B0604020202020204" pitchFamily="34" charset="0"/>
-              </a:rPr>
-              <a:t>What is the probability of an interrupt during a run?</a:t>
-            </a:r>
-          </a:p>
-        </p:txBody>
-      </p:sp>
-      <p:sp>
-        <p:nvSpPr>
-          <p:cNvPr id="8" name="Slide Number Placeholder 7"/>
-          <p:cNvSpPr>
-            <a:spLocks noGrp="1"/>
-          </p:cNvSpPr>
-          <p:nvPr>
-            <p:ph type="sldNum" sz="quarter" idx="12"/>
-          </p:nvPr>
-        </p:nvSpPr>
-        <p:spPr/>
-        <p:txBody>
-          <a:bodyPr/>
-          <a:lstStyle/>
-          <a:p>
-            <a:pPr>
-              <a:defRPr/>
-            </a:pPr>
-            <a:fld id="{8E09DF16-9352-46A7-97F1-1D13A8547ADD}" type="slidenum">
-              <a:rPr lang="en-US" smtClean="0"/>
-              <a:pPr>
-                <a:defRPr/>
-              </a:pPr>
-              <a:t>46</a:t>
             </a:fld>
             <a:endParaRPr lang="en-US"/>
           </a:p>

</xml_diff>

<commit_message>
fixed entropy slide, added inductor example calculation
</commit_message>
<xml_diff>
--- a/BerkeleyClass/CS290Spring2013/Lectures/entropy_talk.pptx
+++ b/BerkeleyClass/CS290Spring2013/Lectures/entropy_talk.pptx
@@ -12331,8 +12331,8 @@
           </a:p>
         </p:txBody>
       </p:sp>
-      <mc:AlternateContent xmlns:mc="http://schemas.openxmlformats.org/markup-compatibility/2006">
-        <mc:Choice xmlns:a14="http://schemas.microsoft.com/office/drawing/2010/main" Requires="a14">
+      <mc:AlternateContent xmlns:mc="http://schemas.openxmlformats.org/markup-compatibility/2006" xmlns:a14="http://schemas.microsoft.com/office/drawing/2010/main">
+        <mc:Choice Requires="a14">
           <p:sp>
             <p:nvSpPr>
               <p:cNvPr id="24581" name="Rectangle 3"/>
@@ -13666,7 +13666,7 @@
             </p:txBody>
           </p:sp>
         </mc:Choice>
-        <mc:Fallback>
+        <mc:Fallback xmlns="">
           <p:sp>
             <p:nvSpPr>
               <p:cNvPr id="24581" name="Rectangle 3"/>
@@ -15205,8 +15205,8 @@
           </a:p>
         </p:txBody>
       </p:sp>
-      <mc:AlternateContent xmlns:mc="http://schemas.openxmlformats.org/markup-compatibility/2006">
-        <mc:Choice xmlns:a14="http://schemas.microsoft.com/office/drawing/2010/main" Requires="a14">
+      <mc:AlternateContent xmlns:mc="http://schemas.openxmlformats.org/markup-compatibility/2006" xmlns:a14="http://schemas.microsoft.com/office/drawing/2010/main">
+        <mc:Choice Requires="a14">
           <p:sp>
             <p:nvSpPr>
               <p:cNvPr id="23557" name="Rectangle 3"/>
@@ -15603,7 +15603,7 @@
             </p:txBody>
           </p:sp>
         </mc:Choice>
-        <mc:Fallback>
+        <mc:Fallback xmlns="">
           <p:sp>
             <p:nvSpPr>
               <p:cNvPr id="23557" name="Rectangle 3"/>
@@ -16603,7 +16603,7 @@
                 <a:latin typeface="Calibri" panose="020F0502020204030204" pitchFamily="34" charset="0"/>
                 <a:cs typeface="Calibri" panose="020F0502020204030204" pitchFamily="34" charset="0"/>
               </a:rPr>
-              <a:t>We want to show that the evolution of the machine state as modified by “unpredictable” events in recreating execution jitter purporting to provide n bits of entropy requires 2</a:t>
+              <a:t>We want to show that the evolution of the machine state as modified by “unpredictable” events which need to be modelled to recreate the execution jitter purporting to provide n bits of entropy requires 2</a:t>
             </a:r>
             <a:r>
               <a:rPr lang="en-US" sz="2000" baseline="30000" dirty="0">
@@ -16631,8 +16631,19 @@
                 <a:latin typeface="Calibri" panose="020F0502020204030204" pitchFamily="34" charset="0"/>
                 <a:cs typeface="Calibri" panose="020F0502020204030204" pitchFamily="34" charset="0"/>
               </a:rPr>
-              <a:t>Reduction to scheduling problem (given actual physical jitter)</a:t>
-            </a:r>
+              <a:t>Reduction to a scheduling problem for deterministic differences in state and actual physical jitter affecting </a:t>
+            </a:r>
+            <a:r>
+              <a:rPr lang="en-US" sz="1800">
+                <a:latin typeface="Calibri" panose="020F0502020204030204" pitchFamily="34" charset="0"/>
+                <a:cs typeface="Calibri" panose="020F0502020204030204" pitchFamily="34" charset="0"/>
+              </a:rPr>
+              <a:t>machine state.</a:t>
+            </a:r>
+            <a:endParaRPr lang="en-US" sz="1800" dirty="0">
+              <a:latin typeface="Calibri" panose="020F0502020204030204" pitchFamily="34" charset="0"/>
+              <a:cs typeface="Calibri" panose="020F0502020204030204" pitchFamily="34" charset="0"/>
+            </a:endParaRPr>
           </a:p>
           <a:p>
             <a:pPr lvl="1">

</xml_diff>

<commit_message>
mall typo in talk
</commit_message>
<xml_diff>
--- a/BerkeleyClass/CS290Spring2013/Lectures/entropy_talk.pptx
+++ b/BerkeleyClass/CS290Spring2013/Lectures/entropy_talk.pptx
@@ -15225,8 +15225,8 @@
           </a:p>
         </p:txBody>
       </p:sp>
-      <mc:AlternateContent xmlns:mc="http://schemas.openxmlformats.org/markup-compatibility/2006">
-        <mc:Choice xmlns:a14="http://schemas.microsoft.com/office/drawing/2010/main" Requires="a14">
+      <mc:AlternateContent xmlns:mc="http://schemas.openxmlformats.org/markup-compatibility/2006" xmlns:a14="http://schemas.microsoft.com/office/drawing/2010/main">
+        <mc:Choice Requires="a14">
           <p:sp>
             <p:nvSpPr>
               <p:cNvPr id="23557" name="Rectangle 3"/>
@@ -15623,7 +15623,7 @@
             </p:txBody>
           </p:sp>
         </mc:Choice>
-        <mc:Fallback>
+        <mc:Fallback xmlns="">
           <p:sp>
             <p:nvSpPr>
               <p:cNvPr id="23557" name="Rectangle 3"/>
@@ -15721,8 +15721,8 @@
           <a:chExt cx="0" cy="0"/>
         </a:xfrm>
       </p:grpSpPr>
-      <mc:AlternateContent xmlns:mc="http://schemas.openxmlformats.org/markup-compatibility/2006">
-        <mc:Choice xmlns:a14="http://schemas.microsoft.com/office/drawing/2010/main" Requires="a14">
+      <mc:AlternateContent xmlns:mc="http://schemas.openxmlformats.org/markup-compatibility/2006" xmlns:a14="http://schemas.microsoft.com/office/drawing/2010/main">
+        <mc:Choice Requires="a14">
           <p:sp>
             <p:nvSpPr>
               <p:cNvPr id="23556" name="Rectangle 2"/>
@@ -15760,7 +15760,7 @@
                     <m:sSub>
                       <m:sSubPr>
                         <m:ctrlPr>
-                          <a:rPr lang="el-GR" sz="3600">
+                          <a:rPr lang="el-GR" sz="3600" i="1">
                             <a:latin typeface="Cambria Math" panose="02040503050406030204" pitchFamily="18" charset="0"/>
                             <a:ea typeface="Cambria Math" panose="02040503050406030204" pitchFamily="18" charset="0"/>
                           </a:rPr>
@@ -15808,7 +15808,7 @@
             </p:txBody>
           </p:sp>
         </mc:Choice>
-        <mc:Fallback>
+        <mc:Fallback xmlns="">
           <p:sp>
             <p:nvSpPr>
               <p:cNvPr id="23556" name="Rectangle 2"/>
@@ -23010,7 +23010,21 @@
                 <a:latin typeface="Calibri" panose="020F0502020204030204" pitchFamily="34" charset="0"/>
                 <a:cs typeface="Calibri" panose="020F0502020204030204" pitchFamily="34" charset="0"/>
               </a:rPr>
-              <a:t>We want to use these to show an adversary must do 2n units of work to recreate the machine state that produces n bits of jitter execution entropy.</a:t>
+              <a:t>We want to use these to show an adversary must do 2</a:t>
+            </a:r>
+            <a:r>
+              <a:rPr lang="en-US" sz="2000" baseline="30000" dirty="0">
+                <a:latin typeface="Calibri" panose="020F0502020204030204" pitchFamily="34" charset="0"/>
+                <a:cs typeface="Calibri" panose="020F0502020204030204" pitchFamily="34" charset="0"/>
+              </a:rPr>
+              <a:t>n</a:t>
+            </a:r>
+            <a:r>
+              <a:rPr lang="en-US" sz="2000" dirty="0">
+                <a:latin typeface="Calibri" panose="020F0502020204030204" pitchFamily="34" charset="0"/>
+                <a:cs typeface="Calibri" panose="020F0502020204030204" pitchFamily="34" charset="0"/>
+              </a:rPr>
+              <a:t> units of work to recreate the machine state that produces n bits of jitter execution entropy.</a:t>
             </a:r>
           </a:p>
         </p:txBody>
@@ -27609,8 +27623,8 @@
           </a:p>
         </p:txBody>
       </p:sp>
-      <mc:AlternateContent xmlns:mc="http://schemas.openxmlformats.org/markup-compatibility/2006">
-        <mc:Choice xmlns:a14="http://schemas.microsoft.com/office/drawing/2010/main" Requires="a14">
+      <mc:AlternateContent xmlns:mc="http://schemas.openxmlformats.org/markup-compatibility/2006" xmlns:a14="http://schemas.microsoft.com/office/drawing/2010/main">
+        <mc:Choice Requires="a14">
           <p:sp>
             <p:nvSpPr>
               <p:cNvPr id="23557" name="Rectangle 3"/>
@@ -27730,7 +27744,7 @@
             </p:txBody>
           </p:sp>
         </mc:Choice>
-        <mc:Fallback>
+        <mc:Fallback xmlns="">
           <p:sp>
             <p:nvSpPr>
               <p:cNvPr id="23557" name="Rectangle 3"/>

</xml_diff>